<commit_message>
add testing/requirements placeholder slide
</commit_message>
<xml_diff>
--- a/Documentation/Presentations/CS499 Final Presentation.pptx
+++ b/Documentation/Presentations/CS499 Final Presentation.pptx
@@ -5,22 +5,23 @@
     <p:sldMasterId id="2147483808" r:id="rId2"/>
   </p:sldMasterIdLst>
   <p:notesMasterIdLst>
-    <p:notesMasterId r:id="rId13"/>
+    <p:notesMasterId r:id="rId14"/>
   </p:notesMasterIdLst>
   <p:handoutMasterIdLst>
-    <p:handoutMasterId r:id="rId14"/>
+    <p:handoutMasterId r:id="rId15"/>
   </p:handoutMasterIdLst>
   <p:sldIdLst>
     <p:sldId id="259" r:id="rId3"/>
     <p:sldId id="260" r:id="rId4"/>
     <p:sldId id="280" r:id="rId5"/>
     <p:sldId id="266" r:id="rId6"/>
-    <p:sldId id="282" r:id="rId7"/>
-    <p:sldId id="281" r:id="rId8"/>
-    <p:sldId id="270" r:id="rId9"/>
-    <p:sldId id="283" r:id="rId10"/>
-    <p:sldId id="271" r:id="rId11"/>
-    <p:sldId id="278" r:id="rId12"/>
+    <p:sldId id="284" r:id="rId7"/>
+    <p:sldId id="282" r:id="rId8"/>
+    <p:sldId id="281" r:id="rId9"/>
+    <p:sldId id="270" r:id="rId10"/>
+    <p:sldId id="283" r:id="rId11"/>
+    <p:sldId id="271" r:id="rId12"/>
+    <p:sldId id="278" r:id="rId13"/>
   </p:sldIdLst>
   <p:sldSz cx="12188825" cy="6858000"/>
   <p:notesSz cx="6858000" cy="9144000"/>
@@ -7553,6 +7554,97 @@
       </p:grpSpPr>
       <p:sp>
         <p:nvSpPr>
+          <p:cNvPr id="2" name="Title 1"/>
+          <p:cNvSpPr>
+            <a:spLocks noGrp="1"/>
+          </p:cNvSpPr>
+          <p:nvPr>
+            <p:ph type="title"/>
+          </p:nvPr>
+        </p:nvSpPr>
+        <p:spPr/>
+        <p:txBody>
+          <a:bodyPr/>
+          <a:lstStyle/>
+          <a:p>
+            <a:pPr algn="ctr"/>
+            <a:r>
+              <a:rPr lang="en-US" dirty="0" smtClean="0"/>
+              <a:t>Post-Mortem/Key Take Away/ not Accomplished</a:t>
+            </a:r>
+            <a:endParaRPr lang="en-US" dirty="0"/>
+          </a:p>
+        </p:txBody>
+      </p:sp>
+      <p:sp>
+        <p:nvSpPr>
+          <p:cNvPr id="3" name="Content Placeholder 2"/>
+          <p:cNvSpPr>
+            <a:spLocks noGrp="1"/>
+          </p:cNvSpPr>
+          <p:nvPr>
+            <p:ph idx="1"/>
+          </p:nvPr>
+        </p:nvSpPr>
+        <p:spPr/>
+        <p:txBody>
+          <a:bodyPr/>
+          <a:lstStyle/>
+          <a:p>
+            <a:r>
+              <a:rPr lang="en-US" sz="3200" dirty="0" smtClean="0"/>
+              <a:t>Good:</a:t>
+            </a:r>
+          </a:p>
+          <a:p>
+            <a:pPr lvl="1"/>
+            <a:r>
+              <a:rPr lang="en-US" sz="3200" dirty="0" smtClean="0"/>
+              <a:t>Completed our project fully.</a:t>
+            </a:r>
+          </a:p>
+          <a:p>
+            <a:pPr lvl="1"/>
+            <a:r>
+              <a:rPr lang="en-US" sz="3200" dirty="0" smtClean="0"/>
+              <a:t>Learned some great technologies on the way.</a:t>
+            </a:r>
+          </a:p>
+          <a:p>
+            <a:pPr lvl="1"/>
+            <a:endParaRPr lang="en-US" sz="3200" dirty="0"/>
+          </a:p>
+          <a:p>
+            <a:pPr lvl="1"/>
+            <a:endParaRPr lang="en-US" sz="3200" dirty="0"/>
+          </a:p>
+          <a:p>
+            <a:r>
+              <a:rPr lang="en-US" sz="3200" dirty="0" smtClean="0"/>
+              <a:t>Bad:</a:t>
+            </a:r>
+          </a:p>
+          <a:p>
+            <a:pPr lvl="1"/>
+            <a:r>
+              <a:rPr lang="en-US" sz="3200" dirty="0" smtClean="0"/>
+              <a:t>We wish we had longer to work on it!</a:t>
+            </a:r>
+          </a:p>
+          <a:p>
+            <a:pPr marL="228532" lvl="1" indent="0">
+              <a:buNone/>
+            </a:pPr>
+            <a:endParaRPr lang="en-US" dirty="0" smtClean="0"/>
+          </a:p>
+          <a:p>
+            <a:pPr lvl="1"/>
+            <a:endParaRPr lang="en-US" dirty="0"/>
+          </a:p>
+        </p:txBody>
+      </p:sp>
+      <p:sp>
+        <p:nvSpPr>
           <p:cNvPr id="4" name="Date Placeholder 3"/>
           <p:cNvSpPr>
             <a:spLocks noGrp="1"/>
@@ -7615,6 +7707,124 @@
             <a:fld id="{E5FD5434-F838-4DD4-A17B-1CB1A1850DF4}" type="slidenum">
               <a:rPr lang="en-US" smtClean="0"/>
               <a:t>10</a:t>
+            </a:fld>
+            <a:endParaRPr lang="en-US"/>
+          </a:p>
+        </p:txBody>
+      </p:sp>
+    </p:spTree>
+    <p:extLst>
+      <p:ext uri="{BB962C8B-B14F-4D97-AF65-F5344CB8AC3E}">
+        <p14:creationId xmlns:p14="http://schemas.microsoft.com/office/powerpoint/2010/main" val="3671086265"/>
+      </p:ext>
+    </p:extLst>
+  </p:cSld>
+  <p:clrMapOvr>
+    <a:masterClrMapping/>
+  </p:clrMapOvr>
+  <mc:AlternateContent xmlns:mc="http://schemas.openxmlformats.org/markup-compatibility/2006" xmlns:p14="http://schemas.microsoft.com/office/powerpoint/2010/main">
+    <mc:Choice Requires="p14">
+      <p:transition spd="med" p14:dur="700">
+        <p:fade/>
+      </p:transition>
+    </mc:Choice>
+    <mc:Fallback xmlns="">
+      <p:transition spd="med">
+        <p:fade/>
+      </p:transition>
+    </mc:Fallback>
+  </mc:AlternateContent>
+  <p:timing>
+    <p:tnLst>
+      <p:par>
+        <p:cTn xmlns:p14="http://schemas.microsoft.com/office/powerpoint/2010/main" id="1" dur="indefinite" restart="never" nodeType="tmRoot"/>
+      </p:par>
+    </p:tnLst>
+  </p:timing>
+</p:sld>
+</file>
+
+<file path=ppt/slides/slide11.xml><?xml version="1.0" encoding="utf-8"?>
+<p:sld xmlns:a="http://schemas.openxmlformats.org/drawingml/2006/main" xmlns:r="http://schemas.openxmlformats.org/officeDocument/2006/relationships" xmlns:p="http://schemas.openxmlformats.org/presentationml/2006/main">
+  <p:cSld>
+    <p:spTree>
+      <p:nvGrpSpPr>
+        <p:cNvPr id="1" name=""/>
+        <p:cNvGrpSpPr/>
+        <p:nvPr/>
+      </p:nvGrpSpPr>
+      <p:grpSpPr>
+        <a:xfrm>
+          <a:off x="0" y="0"/>
+          <a:ext cx="0" cy="0"/>
+          <a:chOff x="0" y="0"/>
+          <a:chExt cx="0" cy="0"/>
+        </a:xfrm>
+      </p:grpSpPr>
+      <p:sp>
+        <p:nvSpPr>
+          <p:cNvPr id="4" name="Date Placeholder 3"/>
+          <p:cNvSpPr>
+            <a:spLocks noGrp="1"/>
+          </p:cNvSpPr>
+          <p:nvPr>
+            <p:ph type="dt" sz="half" idx="10"/>
+          </p:nvPr>
+        </p:nvSpPr>
+        <p:spPr/>
+        <p:txBody>
+          <a:bodyPr/>
+          <a:lstStyle/>
+          <a:p>
+            <a:r>
+              <a:rPr lang="en-US" sz="1200" smtClean="0"/>
+              <a:t>04/15/2016</a:t>
+            </a:r>
+            <a:endParaRPr lang="en-US" sz="1200" dirty="0"/>
+          </a:p>
+        </p:txBody>
+      </p:sp>
+      <p:sp>
+        <p:nvSpPr>
+          <p:cNvPr id="5" name="Footer Placeholder 4"/>
+          <p:cNvSpPr>
+            <a:spLocks noGrp="1"/>
+          </p:cNvSpPr>
+          <p:nvPr>
+            <p:ph type="ftr" sz="quarter" idx="11"/>
+          </p:nvPr>
+        </p:nvSpPr>
+        <p:spPr/>
+        <p:txBody>
+          <a:bodyPr/>
+          <a:lstStyle/>
+          <a:p>
+            <a:r>
+              <a:rPr lang="en-US" sz="1200" smtClean="0"/>
+              <a:t>CS499 Team Hotspotter</a:t>
+            </a:r>
+            <a:endParaRPr lang="en-US" sz="1200" dirty="0"/>
+          </a:p>
+        </p:txBody>
+      </p:sp>
+      <p:sp>
+        <p:nvSpPr>
+          <p:cNvPr id="6" name="Slide Number Placeholder 5"/>
+          <p:cNvSpPr>
+            <a:spLocks noGrp="1"/>
+          </p:cNvSpPr>
+          <p:nvPr>
+            <p:ph type="sldNum" sz="quarter" idx="12"/>
+          </p:nvPr>
+        </p:nvSpPr>
+        <p:spPr/>
+        <p:txBody>
+          <a:bodyPr/>
+          <a:lstStyle/>
+          <a:p>
+            <a:fld id="{E5FD5434-F838-4DD4-A17B-1CB1A1850DF4}" type="slidenum">
+              <a:rPr lang="en-US" smtClean="0"/>
+              <a:t>11</a:t>
             </a:fld>
             <a:endParaRPr lang="en-US" dirty="0"/>
           </a:p>
@@ -8365,6 +8575,157 @@
             <p:ph type="title"/>
           </p:nvPr>
         </p:nvSpPr>
+        <p:spPr>
+          <a:xfrm>
+            <a:off x="1217612" y="35611"/>
+            <a:ext cx="9781532" cy="1508760"/>
+          </a:xfrm>
+        </p:spPr>
+        <p:txBody>
+          <a:bodyPr/>
+          <a:lstStyle/>
+          <a:p>
+            <a:pPr algn="ctr"/>
+            <a:r>
+              <a:rPr lang="en-US" smtClean="0"/>
+              <a:t>Testing/Requirements </a:t>
+            </a:r>
+            <a:r>
+              <a:rPr lang="en-US" dirty="0" smtClean="0"/>
+              <a:t>Met</a:t>
+            </a:r>
+            <a:endParaRPr lang="en-US" dirty="0"/>
+          </a:p>
+        </p:txBody>
+      </p:sp>
+      <p:sp>
+        <p:nvSpPr>
+          <p:cNvPr id="4" name="Date Placeholder 3"/>
+          <p:cNvSpPr>
+            <a:spLocks noGrp="1"/>
+          </p:cNvSpPr>
+          <p:nvPr>
+            <p:ph type="dt" sz="half" idx="10"/>
+          </p:nvPr>
+        </p:nvSpPr>
+        <p:spPr/>
+        <p:txBody>
+          <a:bodyPr/>
+          <a:lstStyle/>
+          <a:p>
+            <a:r>
+              <a:rPr lang="en-US" sz="1200" smtClean="0"/>
+              <a:t>04/15/2016</a:t>
+            </a:r>
+            <a:endParaRPr lang="en-US" sz="1200" dirty="0"/>
+          </a:p>
+        </p:txBody>
+      </p:sp>
+      <p:sp>
+        <p:nvSpPr>
+          <p:cNvPr id="5" name="Footer Placeholder 4"/>
+          <p:cNvSpPr>
+            <a:spLocks noGrp="1"/>
+          </p:cNvSpPr>
+          <p:nvPr>
+            <p:ph type="ftr" sz="quarter" idx="11"/>
+          </p:nvPr>
+        </p:nvSpPr>
+        <p:spPr/>
+        <p:txBody>
+          <a:bodyPr/>
+          <a:lstStyle/>
+          <a:p>
+            <a:r>
+              <a:rPr lang="en-US" sz="1200" smtClean="0"/>
+              <a:t>CS499 Team Hotspotter</a:t>
+            </a:r>
+            <a:endParaRPr lang="en-US" sz="1200" dirty="0"/>
+          </a:p>
+        </p:txBody>
+      </p:sp>
+      <p:sp>
+        <p:nvSpPr>
+          <p:cNvPr id="6" name="Slide Number Placeholder 5"/>
+          <p:cNvSpPr>
+            <a:spLocks noGrp="1"/>
+          </p:cNvSpPr>
+          <p:nvPr>
+            <p:ph type="sldNum" sz="quarter" idx="12"/>
+          </p:nvPr>
+        </p:nvSpPr>
+        <p:spPr/>
+        <p:txBody>
+          <a:bodyPr/>
+          <a:lstStyle/>
+          <a:p>
+            <a:fld id="{E5FD5434-F838-4DD4-A17B-1CB1A1850DF4}" type="slidenum">
+              <a:rPr lang="en-US" smtClean="0"/>
+              <a:t>5</a:t>
+            </a:fld>
+            <a:endParaRPr lang="en-US"/>
+          </a:p>
+        </p:txBody>
+      </p:sp>
+    </p:spTree>
+    <p:extLst>
+      <p:ext uri="{BB962C8B-B14F-4D97-AF65-F5344CB8AC3E}">
+        <p14:creationId xmlns:p14="http://schemas.microsoft.com/office/powerpoint/2010/main" val="709433349"/>
+      </p:ext>
+    </p:extLst>
+  </p:cSld>
+  <p:clrMapOvr>
+    <a:masterClrMapping/>
+  </p:clrMapOvr>
+  <mc:AlternateContent xmlns:mc="http://schemas.openxmlformats.org/markup-compatibility/2006" xmlns:p14="http://schemas.microsoft.com/office/powerpoint/2010/main">
+    <mc:Choice Requires="p14">
+      <p:transition spd="med" p14:dur="700">
+        <p:fade/>
+      </p:transition>
+    </mc:Choice>
+    <mc:Fallback xmlns="">
+      <p:transition spd="med">
+        <p:fade/>
+      </p:transition>
+    </mc:Fallback>
+  </mc:AlternateContent>
+  <p:timing>
+    <p:tnLst>
+      <p:par>
+        <p:cTn xmlns:p14="http://schemas.microsoft.com/office/powerpoint/2010/main" id="1" dur="indefinite" restart="never" nodeType="tmRoot"/>
+      </p:par>
+    </p:tnLst>
+  </p:timing>
+</p:sld>
+</file>
+
+<file path=ppt/slides/slide6.xml><?xml version="1.0" encoding="utf-8"?>
+<p:sld xmlns:a="http://schemas.openxmlformats.org/drawingml/2006/main" xmlns:r="http://schemas.openxmlformats.org/officeDocument/2006/relationships" xmlns:p="http://schemas.openxmlformats.org/presentationml/2006/main">
+  <p:cSld>
+    <p:spTree>
+      <p:nvGrpSpPr>
+        <p:cNvPr id="1" name=""/>
+        <p:cNvGrpSpPr/>
+        <p:nvPr/>
+      </p:nvGrpSpPr>
+      <p:grpSpPr>
+        <a:xfrm>
+          <a:off x="0" y="0"/>
+          <a:ext cx="0" cy="0"/>
+          <a:chOff x="0" y="0"/>
+          <a:chExt cx="0" cy="0"/>
+        </a:xfrm>
+      </p:grpSpPr>
+      <p:sp>
+        <p:nvSpPr>
+          <p:cNvPr id="2" name="Title 1"/>
+          <p:cNvSpPr>
+            <a:spLocks noGrp="1"/>
+          </p:cNvSpPr>
+          <p:nvPr>
+            <p:ph type="title"/>
+          </p:nvPr>
+        </p:nvSpPr>
         <p:spPr/>
         <p:txBody>
           <a:bodyPr/>
@@ -8442,7 +8803,7 @@
             <a:fld id="{E5FD5434-F838-4DD4-A17B-1CB1A1850DF4}" type="slidenum">
               <a:rPr lang="en-US" smtClean="0"/>
               <a:pPr/>
-              <a:t>5</a:t>
+              <a:t>6</a:t>
             </a:fld>
             <a:endParaRPr lang="en-US"/>
           </a:p>
@@ -8592,7 +8953,7 @@
 </p:sld>
 </file>
 
-<file path=ppt/slides/slide6.xml><?xml version="1.0" encoding="utf-8"?>
+<file path=ppt/slides/slide7.xml><?xml version="1.0" encoding="utf-8"?>
 <p:sld xmlns:a="http://schemas.openxmlformats.org/drawingml/2006/main" xmlns:r="http://schemas.openxmlformats.org/officeDocument/2006/relationships" xmlns:p="http://schemas.openxmlformats.org/presentationml/2006/main">
   <p:cSld>
     <p:spTree>
@@ -8729,7 +9090,7 @@
             <a:fld id="{E5FD5434-F838-4DD4-A17B-1CB1A1850DF4}" type="slidenum">
               <a:rPr lang="en-US" smtClean="0"/>
               <a:pPr/>
-              <a:t>6</a:t>
+              <a:t>7</a:t>
             </a:fld>
             <a:endParaRPr lang="en-US"/>
           </a:p>
@@ -8760,173 +9121,6 @@
 </p:sld>
 </file>
 
-<file path=ppt/slides/slide7.xml><?xml version="1.0" encoding="utf-8"?>
-<p:sld xmlns:a="http://schemas.openxmlformats.org/drawingml/2006/main" xmlns:r="http://schemas.openxmlformats.org/officeDocument/2006/relationships" xmlns:p="http://schemas.openxmlformats.org/presentationml/2006/main">
-  <p:cSld>
-    <p:spTree>
-      <p:nvGrpSpPr>
-        <p:cNvPr id="1" name=""/>
-        <p:cNvGrpSpPr/>
-        <p:nvPr/>
-      </p:nvGrpSpPr>
-      <p:grpSpPr>
-        <a:xfrm>
-          <a:off x="0" y="0"/>
-          <a:ext cx="0" cy="0"/>
-          <a:chOff x="0" y="0"/>
-          <a:chExt cx="0" cy="0"/>
-        </a:xfrm>
-      </p:grpSpPr>
-      <p:sp>
-        <p:nvSpPr>
-          <p:cNvPr id="2" name="Title 1"/>
-          <p:cNvSpPr>
-            <a:spLocks noGrp="1"/>
-          </p:cNvSpPr>
-          <p:nvPr>
-            <p:ph type="title"/>
-          </p:nvPr>
-        </p:nvSpPr>
-        <p:spPr/>
-        <p:txBody>
-          <a:bodyPr/>
-          <a:lstStyle/>
-          <a:p>
-            <a:pPr algn="ctr"/>
-            <a:r>
-              <a:rPr lang="en-US" dirty="0" smtClean="0"/>
-              <a:t>Team Burndown/ Velocity Chart</a:t>
-            </a:r>
-            <a:endParaRPr lang="en-US" dirty="0"/>
-          </a:p>
-        </p:txBody>
-      </p:sp>
-      <p:sp>
-        <p:nvSpPr>
-          <p:cNvPr id="4" name="Date Placeholder 3"/>
-          <p:cNvSpPr>
-            <a:spLocks noGrp="1"/>
-          </p:cNvSpPr>
-          <p:nvPr>
-            <p:ph type="dt" sz="half" idx="10"/>
-          </p:nvPr>
-        </p:nvSpPr>
-        <p:spPr/>
-        <p:txBody>
-          <a:bodyPr/>
-          <a:lstStyle/>
-          <a:p>
-            <a:r>
-              <a:rPr lang="en-US" sz="1200" smtClean="0"/>
-              <a:t>04/15/2016</a:t>
-            </a:r>
-            <a:endParaRPr lang="en-US" sz="1200" dirty="0"/>
-          </a:p>
-        </p:txBody>
-      </p:sp>
-      <p:sp>
-        <p:nvSpPr>
-          <p:cNvPr id="5" name="Footer Placeholder 4"/>
-          <p:cNvSpPr>
-            <a:spLocks noGrp="1"/>
-          </p:cNvSpPr>
-          <p:nvPr>
-            <p:ph type="ftr" sz="quarter" idx="11"/>
-          </p:nvPr>
-        </p:nvSpPr>
-        <p:spPr/>
-        <p:txBody>
-          <a:bodyPr/>
-          <a:lstStyle/>
-          <a:p>
-            <a:r>
-              <a:rPr lang="en-US" sz="1200" smtClean="0"/>
-              <a:t>CS499 Team Hotspotter</a:t>
-            </a:r>
-            <a:endParaRPr lang="en-US" sz="1200" dirty="0"/>
-          </a:p>
-        </p:txBody>
-      </p:sp>
-      <p:sp>
-        <p:nvSpPr>
-          <p:cNvPr id="6" name="Slide Number Placeholder 5"/>
-          <p:cNvSpPr>
-            <a:spLocks noGrp="1"/>
-          </p:cNvSpPr>
-          <p:nvPr>
-            <p:ph type="sldNum" sz="quarter" idx="12"/>
-          </p:nvPr>
-        </p:nvSpPr>
-        <p:spPr/>
-        <p:txBody>
-          <a:bodyPr/>
-          <a:lstStyle/>
-          <a:p>
-            <a:fld id="{E5FD5434-F838-4DD4-A17B-1CB1A1850DF4}" type="slidenum">
-              <a:rPr lang="en-US" smtClean="0"/>
-              <a:t>7</a:t>
-            </a:fld>
-            <a:endParaRPr lang="en-US"/>
-          </a:p>
-        </p:txBody>
-      </p:sp>
-      <p:graphicFrame>
-        <p:nvGraphicFramePr>
-          <p:cNvPr id="7" name="Content Placeholder 6"/>
-          <p:cNvGraphicFramePr>
-            <a:graphicFrameLocks noGrp="1"/>
-          </p:cNvGraphicFramePr>
-          <p:nvPr>
-            <p:ph idx="1"/>
-            <p:extLst>
-              <p:ext uri="{D42A27DB-BD31-4B8C-83A1-F6EECF244321}">
-                <p14:modId xmlns:p14="http://schemas.microsoft.com/office/powerpoint/2010/main" val="57911693"/>
-              </p:ext>
-            </p:extLst>
-          </p:nvPr>
-        </p:nvGraphicFramePr>
-        <p:xfrm>
-          <a:off x="893950" y="1752600"/>
-          <a:ext cx="10398844" cy="4680111"/>
-        </p:xfrm>
-        <a:graphic>
-          <a:graphicData uri="http://schemas.openxmlformats.org/drawingml/2006/chart">
-            <c:chart xmlns:c="http://schemas.openxmlformats.org/drawingml/2006/chart" xmlns:r="http://schemas.openxmlformats.org/officeDocument/2006/relationships" r:id="rId2"/>
-          </a:graphicData>
-        </a:graphic>
-      </p:graphicFrame>
-    </p:spTree>
-    <p:extLst>
-      <p:ext uri="{BB962C8B-B14F-4D97-AF65-F5344CB8AC3E}">
-        <p14:creationId xmlns:p14="http://schemas.microsoft.com/office/powerpoint/2010/main" val="1364081688"/>
-      </p:ext>
-    </p:extLst>
-  </p:cSld>
-  <p:clrMapOvr>
-    <a:masterClrMapping/>
-  </p:clrMapOvr>
-  <mc:AlternateContent xmlns:mc="http://schemas.openxmlformats.org/markup-compatibility/2006" xmlns:p14="http://schemas.microsoft.com/office/powerpoint/2010/main">
-    <mc:Choice Requires="p14">
-      <p:transition spd="med" p14:dur="700">
-        <p:fade/>
-      </p:transition>
-    </mc:Choice>
-    <mc:Fallback xmlns="">
-      <p:transition spd="med">
-        <p:fade/>
-      </p:transition>
-    </mc:Fallback>
-  </mc:AlternateContent>
-  <p:timing>
-    <p:tnLst>
-      <p:par>
-        <p:cTn xmlns:p14="http://schemas.microsoft.com/office/powerpoint/2010/main" id="1" dur="indefinite" restart="never" nodeType="tmRoot"/>
-      </p:par>
-    </p:tnLst>
-  </p:timing>
-</p:sld>
-</file>
-
 <file path=ppt/slides/slide8.xml><?xml version="1.0" encoding="utf-8"?>
 <p:sld xmlns:a="http://schemas.openxmlformats.org/drawingml/2006/main" xmlns:r="http://schemas.openxmlformats.org/officeDocument/2006/relationships" xmlns:p="http://schemas.openxmlformats.org/presentationml/2006/main">
   <p:cSld>
@@ -8984,7 +9178,7 @@
           <a:lstStyle/>
           <a:p>
             <a:r>
-              <a:rPr lang="en-US" sz="1200" dirty="0" smtClean="0"/>
+              <a:rPr lang="en-US" sz="1200" smtClean="0"/>
               <a:t>04/15/2016</a:t>
             </a:r>
             <a:endParaRPr lang="en-US" sz="1200" dirty="0"/>
@@ -9039,7 +9233,7 @@
       </p:sp>
       <p:graphicFrame>
         <p:nvGraphicFramePr>
-          <p:cNvPr id="8" name="Content Placeholder 7"/>
+          <p:cNvPr id="7" name="Content Placeholder 6"/>
           <p:cNvGraphicFramePr>
             <a:graphicFrameLocks noGrp="1"/>
           </p:cNvGraphicFramePr>
@@ -9047,14 +9241,14 @@
             <p:ph idx="1"/>
             <p:extLst>
               <p:ext uri="{D42A27DB-BD31-4B8C-83A1-F6EECF244321}">
-                <p14:modId xmlns:p14="http://schemas.microsoft.com/office/powerpoint/2010/main" val="1503173150"/>
+                <p14:modId xmlns:p14="http://schemas.microsoft.com/office/powerpoint/2010/main" val="57911693"/>
               </p:ext>
             </p:extLst>
           </p:nvPr>
         </p:nvGraphicFramePr>
         <p:xfrm>
-          <a:off x="0" y="1828800"/>
-          <a:ext cx="12114212" cy="4517855"/>
+          <a:off x="893950" y="1752600"/>
+          <a:ext cx="10398844" cy="4680111"/>
         </p:xfrm>
         <a:graphic>
           <a:graphicData uri="http://schemas.openxmlformats.org/drawingml/2006/chart">
@@ -9065,7 +9259,7 @@
     </p:spTree>
     <p:extLst>
       <p:ext uri="{BB962C8B-B14F-4D97-AF65-F5344CB8AC3E}">
-        <p14:creationId xmlns:p14="http://schemas.microsoft.com/office/powerpoint/2010/main" val="2985966692"/>
+        <p14:creationId xmlns:p14="http://schemas.microsoft.com/office/powerpoint/2010/main" val="1364081688"/>
       </p:ext>
     </p:extLst>
   </p:cSld>
@@ -9129,7 +9323,7 @@
             <a:pPr algn="ctr"/>
             <a:r>
               <a:rPr lang="en-US" dirty="0" smtClean="0"/>
-              <a:t>Post-Mortem/Key Take Away/ not Accomplished</a:t>
+              <a:t>Team Burndown/ Velocity Chart</a:t>
             </a:r>
             <a:endParaRPr lang="en-US" dirty="0"/>
           </a:p>
@@ -9137,12 +9331,12 @@
       </p:sp>
       <p:sp>
         <p:nvSpPr>
-          <p:cNvPr id="3" name="Content Placeholder 2"/>
-          <p:cNvSpPr>
-            <a:spLocks noGrp="1"/>
-          </p:cNvSpPr>
-          <p:nvPr>
-            <p:ph idx="1"/>
+          <p:cNvPr id="4" name="Date Placeholder 3"/>
+          <p:cNvSpPr>
+            <a:spLocks noGrp="1"/>
+          </p:cNvSpPr>
+          <p:nvPr>
+            <p:ph type="dt" sz="half" idx="10"/>
           </p:nvPr>
         </p:nvSpPr>
         <p:spPr/>
@@ -9151,74 +9345,7 @@
           <a:lstStyle/>
           <a:p>
             <a:r>
-              <a:rPr lang="en-US" sz="3200" dirty="0" smtClean="0"/>
-              <a:t>Good:</a:t>
-            </a:r>
-          </a:p>
-          <a:p>
-            <a:pPr lvl="1"/>
-            <a:r>
-              <a:rPr lang="en-US" sz="3200" dirty="0" smtClean="0"/>
-              <a:t>Completed our project fully.</a:t>
-            </a:r>
-          </a:p>
-          <a:p>
-            <a:pPr lvl="1"/>
-            <a:r>
-              <a:rPr lang="en-US" sz="3200" dirty="0" smtClean="0"/>
-              <a:t>Learned some great technologies on the way.</a:t>
-            </a:r>
-          </a:p>
-          <a:p>
-            <a:pPr lvl="1"/>
-            <a:endParaRPr lang="en-US" sz="3200" dirty="0"/>
-          </a:p>
-          <a:p>
-            <a:pPr lvl="1"/>
-            <a:endParaRPr lang="en-US" sz="3200" dirty="0"/>
-          </a:p>
-          <a:p>
-            <a:r>
-              <a:rPr lang="en-US" sz="3200" dirty="0" smtClean="0"/>
-              <a:t>Bad:</a:t>
-            </a:r>
-          </a:p>
-          <a:p>
-            <a:pPr lvl="1"/>
-            <a:r>
-              <a:rPr lang="en-US" sz="3200" dirty="0" smtClean="0"/>
-              <a:t>We wish we had longer to work on it!</a:t>
-            </a:r>
-          </a:p>
-          <a:p>
-            <a:pPr marL="228532" lvl="1" indent="0">
-              <a:buNone/>
-            </a:pPr>
-            <a:endParaRPr lang="en-US" dirty="0" smtClean="0"/>
-          </a:p>
-          <a:p>
-            <a:pPr lvl="1"/>
-            <a:endParaRPr lang="en-US" dirty="0"/>
-          </a:p>
-        </p:txBody>
-      </p:sp>
-      <p:sp>
-        <p:nvSpPr>
-          <p:cNvPr id="4" name="Date Placeholder 3"/>
-          <p:cNvSpPr>
-            <a:spLocks noGrp="1"/>
-          </p:cNvSpPr>
-          <p:nvPr>
-            <p:ph type="dt" sz="half" idx="10"/>
-          </p:nvPr>
-        </p:nvSpPr>
-        <p:spPr/>
-        <p:txBody>
-          <a:bodyPr/>
-          <a:lstStyle/>
-          <a:p>
-            <a:r>
-              <a:rPr lang="en-US" sz="1200" smtClean="0"/>
+              <a:rPr lang="en-US" sz="1200" dirty="0" smtClean="0"/>
               <a:t>04/15/2016</a:t>
             </a:r>
             <a:endParaRPr lang="en-US" sz="1200" dirty="0"/>
@@ -9271,10 +9398,35 @@
           </a:p>
         </p:txBody>
       </p:sp>
+      <p:graphicFrame>
+        <p:nvGraphicFramePr>
+          <p:cNvPr id="8" name="Content Placeholder 7"/>
+          <p:cNvGraphicFramePr>
+            <a:graphicFrameLocks noGrp="1"/>
+          </p:cNvGraphicFramePr>
+          <p:nvPr>
+            <p:ph idx="1"/>
+            <p:extLst>
+              <p:ext uri="{D42A27DB-BD31-4B8C-83A1-F6EECF244321}">
+                <p14:modId xmlns:p14="http://schemas.microsoft.com/office/powerpoint/2010/main" val="1503173150"/>
+              </p:ext>
+            </p:extLst>
+          </p:nvPr>
+        </p:nvGraphicFramePr>
+        <p:xfrm>
+          <a:off x="0" y="1828800"/>
+          <a:ext cx="12114212" cy="4517855"/>
+        </p:xfrm>
+        <a:graphic>
+          <a:graphicData uri="http://schemas.openxmlformats.org/drawingml/2006/chart">
+            <c:chart xmlns:c="http://schemas.openxmlformats.org/drawingml/2006/chart" xmlns:r="http://schemas.openxmlformats.org/officeDocument/2006/relationships" r:id="rId2"/>
+          </a:graphicData>
+        </a:graphic>
+      </p:graphicFrame>
     </p:spTree>
     <p:extLst>
       <p:ext uri="{BB962C8B-B14F-4D97-AF65-F5344CB8AC3E}">
-        <p14:creationId xmlns:p14="http://schemas.microsoft.com/office/powerpoint/2010/main" val="3671086265"/>
+        <p14:creationId xmlns:p14="http://schemas.microsoft.com/office/powerpoint/2010/main" val="2985966692"/>
       </p:ext>
     </p:extLst>
   </p:cSld>

</xml_diff>

<commit_message>
add some quick do-hickies to the capabilties slide
</commit_message>
<xml_diff>
--- a/Documentation/Presentations/CS499 Final Presentation.pptx
+++ b/Documentation/Presentations/CS499 Final Presentation.pptx
@@ -8587,12 +8587,8 @@
           <a:p>
             <a:pPr algn="ctr"/>
             <a:r>
-              <a:rPr lang="en-US" smtClean="0"/>
-              <a:t>Testing/Requirements </a:t>
-            </a:r>
-            <a:r>
               <a:rPr lang="en-US" dirty="0" smtClean="0"/>
-              <a:t>Met</a:t>
+              <a:t>Testing/Requirements Met</a:t>
             </a:r>
             <a:endParaRPr lang="en-US" dirty="0"/>
           </a:p>
@@ -8928,6 +8924,114 @@
           </a:prstGeom>
         </p:spPr>
       </p:pic>
+      <p:sp>
+        <p:nvSpPr>
+          <p:cNvPr id="4" name="TextBox 3"/>
+          <p:cNvSpPr txBox="1"/>
+          <p:nvPr/>
+        </p:nvSpPr>
+        <p:spPr>
+          <a:xfrm>
+            <a:off x="912812" y="5029200"/>
+            <a:ext cx="10084049" cy="461665"/>
+          </a:xfrm>
+          <a:prstGeom prst="rect">
+            <a:avLst/>
+          </a:prstGeom>
+          <a:noFill/>
+        </p:spPr>
+        <p:txBody>
+          <a:bodyPr wrap="square" rtlCol="0">
+            <a:spAutoFit/>
+          </a:bodyPr>
+          <a:lstStyle/>
+          <a:p>
+            <a:pPr algn="ctr"/>
+            <a:r>
+              <a:rPr lang="en-US" dirty="0" smtClean="0"/>
+              <a:t>Technologies</a:t>
+            </a:r>
+            <a:endParaRPr lang="en-US" dirty="0"/>
+          </a:p>
+        </p:txBody>
+      </p:sp>
+      <p:sp>
+        <p:nvSpPr>
+          <p:cNvPr id="12" name="TextBox 11"/>
+          <p:cNvSpPr txBox="1"/>
+          <p:nvPr/>
+        </p:nvSpPr>
+        <p:spPr>
+          <a:xfrm>
+            <a:off x="1979612" y="2057400"/>
+            <a:ext cx="8379351" cy="2923877"/>
+          </a:xfrm>
+          <a:prstGeom prst="rect">
+            <a:avLst/>
+          </a:prstGeom>
+          <a:noFill/>
+        </p:spPr>
+        <p:txBody>
+          <a:bodyPr wrap="square" rtlCol="0">
+            <a:spAutoFit/>
+          </a:bodyPr>
+          <a:lstStyle/>
+          <a:p>
+            <a:r>
+              <a:rPr lang="en-US" dirty="0" smtClean="0"/>
+              <a:t>Capabilities</a:t>
+            </a:r>
+          </a:p>
+          <a:p>
+            <a:pPr marL="342900" indent="-342900">
+              <a:buFont typeface="Arial"/>
+              <a:buChar char="•"/>
+            </a:pPr>
+            <a:r>
+              <a:rPr lang="en-US" sz="4000" dirty="0" smtClean="0"/>
+              <a:t>Clone a public </a:t>
+            </a:r>
+            <a:r>
+              <a:rPr lang="en-US" sz="4000" dirty="0" err="1" smtClean="0"/>
+              <a:t>git</a:t>
+            </a:r>
+            <a:r>
+              <a:rPr lang="en-US" sz="4000" dirty="0" smtClean="0"/>
+              <a:t> based repository</a:t>
+            </a:r>
+          </a:p>
+          <a:p>
+            <a:pPr marL="342900" indent="-342900">
+              <a:buFont typeface="Arial"/>
+              <a:buChar char="•"/>
+            </a:pPr>
+            <a:r>
+              <a:rPr lang="en-US" sz="4000" dirty="0" smtClean="0"/>
+              <a:t>Run metrics on a cloned repository</a:t>
+            </a:r>
+          </a:p>
+          <a:p>
+            <a:pPr marL="342900" indent="-342900">
+              <a:buFont typeface="Arial"/>
+              <a:buChar char="•"/>
+            </a:pPr>
+            <a:r>
+              <a:rPr lang="en-US" sz="4000" dirty="0" smtClean="0"/>
+              <a:t>Create graph of metrics.</a:t>
+            </a:r>
+          </a:p>
+          <a:p>
+            <a:pPr marL="342900" indent="-342900">
+              <a:buFont typeface="Arial"/>
+              <a:buChar char="•"/>
+            </a:pPr>
+            <a:r>
+              <a:rPr lang="en-US" sz="4000" dirty="0" smtClean="0"/>
+              <a:t>Export metrics to an excel file</a:t>
+            </a:r>
+          </a:p>
+        </p:txBody>
+      </p:sp>
     </p:spTree>
     <p:extLst>
       <p:ext uri="{BB962C8B-B14F-4D97-AF65-F5344CB8AC3E}">

</xml_diff>

<commit_message>
Rephrased overview and post-mortem bullets, fixed typos, changed layout on post-mortem to side-by-side
</commit_message>
<xml_diff>
--- a/Documentation/Presentations/CS499 Final Presentation.pptx
+++ b/Documentation/Presentations/CS499 Final Presentation.pptx
@@ -122,7 +122,7 @@
   </p:defaultTextStyle>
   <p:extLst>
     <p:ext uri="{EFAFB233-063F-42B5-8137-9DF3F51BA10A}">
-      <p15:sldGuideLst xmlns:p15="http://schemas.microsoft.com/office/powerpoint/2012/main" xmlns="">
+      <p15:sldGuideLst xmlns:p15="http://schemas.microsoft.com/office/powerpoint/2012/main">
         <p15:guide id="1" orient="horz" pos="2160" userDrawn="1">
           <p15:clr>
             <a:srgbClr val="A4A3A4"/>
@@ -191,7 +191,7 @@
       </p15:sldGuideLst>
     </p:ext>
     <p:ext uri="{2D200454-40CA-4A62-9FC3-DE9A4176ACB9}">
-      <p15:notesGuideLst xmlns:p15="http://schemas.microsoft.com/office/powerpoint/2012/main" xmlns="">
+      <p15:notesGuideLst xmlns:p15="http://schemas.microsoft.com/office/powerpoint/2012/main">
         <p15:guide id="1" orient="horz" pos="2880">
           <p15:clr>
             <a:srgbClr val="A4A3A4"/>
@@ -248,17 +248,7 @@
           </a:p>
           <a:p>
             <a:pPr>
-              <a:defRPr sz="1400" b="0" i="0" u="none" strike="noStrike" kern="1200" spc="0" baseline="0">
-                <a:solidFill>
-                  <a:schemeClr val="tx1">
-                    <a:lumMod val="65000"/>
-                    <a:lumOff val="35000"/>
-                  </a:schemeClr>
-                </a:solidFill>
-                <a:latin typeface="+mn-lt"/>
-                <a:ea typeface="+mn-ea"/>
-                <a:cs typeface="+mn-cs"/>
-              </a:defRPr>
+              <a:defRPr/>
             </a:pPr>
             <a:r>
               <a:rPr lang="en-US"/>
@@ -281,6 +271,26 @@
         </a:ln>
         <a:effectLst/>
       </c:spPr>
+      <c:txPr>
+        <a:bodyPr rot="0" spcFirstLastPara="1" vertOverflow="ellipsis" vert="horz" wrap="square" anchor="ctr" anchorCtr="1"/>
+        <a:lstStyle/>
+        <a:p>
+          <a:pPr>
+            <a:defRPr sz="1400" b="0" i="0" u="none" strike="noStrike" kern="1200" spc="0" baseline="0">
+              <a:solidFill>
+                <a:schemeClr val="tx1">
+                  <a:lumMod val="65000"/>
+                  <a:lumOff val="35000"/>
+                </a:schemeClr>
+              </a:solidFill>
+              <a:latin typeface="+mn-lt"/>
+              <a:ea typeface="+mn-ea"/>
+              <a:cs typeface="+mn-cs"/>
+            </a:defRPr>
+          </a:pPr>
+          <a:endParaRPr lang="en-US"/>
+        </a:p>
+      </c:txPr>
     </c:title>
     <c:autoTitleDeleted val="0"/>
     <c:plotArea>
@@ -332,61 +342,61 @@
                   <c:v>6.25</c:v>
                 </c:pt>
                 <c:pt idx="4">
-                  <c:v>3.0</c:v>
+                  <c:v>3</c:v>
                 </c:pt>
                 <c:pt idx="5">
-                  <c:v>0.0</c:v>
+                  <c:v>0</c:v>
                 </c:pt>
                 <c:pt idx="6">
-                  <c:v>0.0</c:v>
+                  <c:v>0</c:v>
                 </c:pt>
                 <c:pt idx="7">
-                  <c:v>0.0</c:v>
+                  <c:v>0</c:v>
                 </c:pt>
                 <c:pt idx="8">
-                  <c:v>0.0</c:v>
+                  <c:v>0</c:v>
                 </c:pt>
                 <c:pt idx="9">
-                  <c:v>2.0</c:v>
+                  <c:v>2</c:v>
                 </c:pt>
                 <c:pt idx="10">
                   <c:v>0.5</c:v>
                 </c:pt>
                 <c:pt idx="11">
-                  <c:v>0.0</c:v>
+                  <c:v>0</c:v>
                 </c:pt>
                 <c:pt idx="12">
-                  <c:v>0.0</c:v>
+                  <c:v>0</c:v>
                 </c:pt>
                 <c:pt idx="13">
-                  <c:v>0.0</c:v>
+                  <c:v>0</c:v>
                 </c:pt>
                 <c:pt idx="14">
-                  <c:v>0.0</c:v>
+                  <c:v>0</c:v>
                 </c:pt>
                 <c:pt idx="15">
-                  <c:v>0.0</c:v>
+                  <c:v>0</c:v>
                 </c:pt>
                 <c:pt idx="16">
-                  <c:v>0.0</c:v>
+                  <c:v>0</c:v>
                 </c:pt>
                 <c:pt idx="17">
-                  <c:v>0.0</c:v>
+                  <c:v>0</c:v>
                 </c:pt>
                 <c:pt idx="18">
-                  <c:v>0.0</c:v>
+                  <c:v>0</c:v>
                 </c:pt>
                 <c:pt idx="19">
-                  <c:v>0.0</c:v>
+                  <c:v>0</c:v>
                 </c:pt>
                 <c:pt idx="20">
-                  <c:v>0.0</c:v>
+                  <c:v>0</c:v>
                 </c:pt>
                 <c:pt idx="21">
-                  <c:v>0.0</c:v>
+                  <c:v>0</c:v>
                 </c:pt>
                 <c:pt idx="22">
-                  <c:v>0.0</c:v>
+                  <c:v>0</c:v>
                 </c:pt>
               </c:numCache>
             </c:numRef>
@@ -428,73 +438,73 @@
                 <c:formatCode>[$-409]dd\-mmm;@</c:formatCode>
                 <c:ptCount val="23"/>
                 <c:pt idx="0">
-                  <c:v>42254.0</c:v>
+                  <c:v>42254</c:v>
                 </c:pt>
                 <c:pt idx="1">
-                  <c:v>42261.0</c:v>
+                  <c:v>42261</c:v>
                 </c:pt>
                 <c:pt idx="2">
-                  <c:v>42268.0</c:v>
+                  <c:v>42268</c:v>
                 </c:pt>
                 <c:pt idx="3">
-                  <c:v>42275.0</c:v>
+                  <c:v>42275</c:v>
                 </c:pt>
                 <c:pt idx="4">
-                  <c:v>42282.0</c:v>
+                  <c:v>42282</c:v>
                 </c:pt>
                 <c:pt idx="5">
-                  <c:v>42289.0</c:v>
+                  <c:v>42289</c:v>
                 </c:pt>
                 <c:pt idx="6">
-                  <c:v>42296.0</c:v>
+                  <c:v>42296</c:v>
                 </c:pt>
                 <c:pt idx="7">
-                  <c:v>42303.0</c:v>
+                  <c:v>42303</c:v>
                 </c:pt>
                 <c:pt idx="8">
-                  <c:v>42310.0</c:v>
+                  <c:v>42310</c:v>
                 </c:pt>
                 <c:pt idx="9">
-                  <c:v>42317.0</c:v>
+                  <c:v>42317</c:v>
                 </c:pt>
                 <c:pt idx="10">
-                  <c:v>42324.0</c:v>
+                  <c:v>42324</c:v>
                 </c:pt>
                 <c:pt idx="11">
-                  <c:v>42380.0</c:v>
+                  <c:v>42380</c:v>
                 </c:pt>
                 <c:pt idx="12">
-                  <c:v>42387.0</c:v>
+                  <c:v>42387</c:v>
                 </c:pt>
                 <c:pt idx="13">
-                  <c:v>42394.0</c:v>
+                  <c:v>42394</c:v>
                 </c:pt>
                 <c:pt idx="14">
-                  <c:v>42401.0</c:v>
+                  <c:v>42401</c:v>
                 </c:pt>
                 <c:pt idx="15">
-                  <c:v>42408.0</c:v>
+                  <c:v>42408</c:v>
                 </c:pt>
                 <c:pt idx="16">
-                  <c:v>42415.0</c:v>
+                  <c:v>42415</c:v>
                 </c:pt>
                 <c:pt idx="17">
-                  <c:v>42422.0</c:v>
+                  <c:v>42422</c:v>
                 </c:pt>
                 <c:pt idx="18">
-                  <c:v>42429.0</c:v>
+                  <c:v>42429</c:v>
                 </c:pt>
                 <c:pt idx="19">
-                  <c:v>42436.0</c:v>
+                  <c:v>42436</c:v>
                 </c:pt>
                 <c:pt idx="20">
-                  <c:v>42443.0</c:v>
+                  <c:v>42443</c:v>
                 </c:pt>
                 <c:pt idx="21">
-                  <c:v>42450.0</c:v>
+                  <c:v>42450</c:v>
                 </c:pt>
                 <c:pt idx="22">
-                  <c:v>42457.0</c:v>
+                  <c:v>42457</c:v>
                 </c:pt>
               </c:numCache>
             </c:numRef>
@@ -506,7 +516,7 @@
                 <c:formatCode>0.00</c:formatCode>
                 <c:ptCount val="23"/>
                 <c:pt idx="0">
-                  <c:v>3.0</c:v>
+                  <c:v>3</c:v>
                 </c:pt>
                 <c:pt idx="1">
                   <c:v>3.25</c:v>
@@ -527,52 +537,52 @@
                   <c:v>28.003</c:v>
                 </c:pt>
                 <c:pt idx="7">
-                  <c:v>28.0</c:v>
+                  <c:v>28</c:v>
                 </c:pt>
                 <c:pt idx="8">
-                  <c:v>22.0</c:v>
+                  <c:v>22</c:v>
                 </c:pt>
                 <c:pt idx="9">
-                  <c:v>8.0</c:v>
+                  <c:v>8</c:v>
                 </c:pt>
                 <c:pt idx="10">
-                  <c:v>15.0</c:v>
+                  <c:v>15</c:v>
                 </c:pt>
                 <c:pt idx="11">
                   <c:v>23.5</c:v>
                 </c:pt>
                 <c:pt idx="12">
-                  <c:v>23.0</c:v>
+                  <c:v>23</c:v>
                 </c:pt>
                 <c:pt idx="13">
-                  <c:v>12.0</c:v>
+                  <c:v>12</c:v>
                 </c:pt>
                 <c:pt idx="14">
-                  <c:v>29.0</c:v>
+                  <c:v>29</c:v>
                 </c:pt>
                 <c:pt idx="15">
-                  <c:v>16.0</c:v>
+                  <c:v>16</c:v>
                 </c:pt>
                 <c:pt idx="16">
-                  <c:v>16.0</c:v>
+                  <c:v>16</c:v>
                 </c:pt>
                 <c:pt idx="17">
-                  <c:v>18.0</c:v>
+                  <c:v>18</c:v>
                 </c:pt>
                 <c:pt idx="18">
-                  <c:v>16.0</c:v>
+                  <c:v>16</c:v>
                 </c:pt>
                 <c:pt idx="19">
-                  <c:v>0.0</c:v>
+                  <c:v>0</c:v>
                 </c:pt>
                 <c:pt idx="20">
-                  <c:v>0.0</c:v>
+                  <c:v>0</c:v>
                 </c:pt>
                 <c:pt idx="21">
-                  <c:v>0.0</c:v>
+                  <c:v>0</c:v>
                 </c:pt>
                 <c:pt idx="22">
-                  <c:v>0.0</c:v>
+                  <c:v>0</c:v>
                 </c:pt>
               </c:numCache>
             </c:numRef>
@@ -593,8 +603,8 @@
         </c:dLbls>
         <c:gapWidth val="150"/>
         <c:overlap val="100"/>
-        <c:axId val="2130262888"/>
-        <c:axId val="2130287000"/>
+        <c:axId val="235434680"/>
+        <c:axId val="235431544"/>
       </c:barChart>
       <c:lineChart>
         <c:grouping val="standard"/>
@@ -639,7 +649,7 @@
                   <c:v>11.455</c:v>
                 </c:pt>
                 <c:pt idx="2">
-                  <c:v>13.93666666666667</c:v>
+                  <c:v>13.936666666666669</c:v>
                 </c:pt>
                 <c:pt idx="3">
                   <c:v>13.14</c:v>
@@ -648,34 +658,34 @@
                   <c:v>12.612</c:v>
                 </c:pt>
                 <c:pt idx="5">
-                  <c:v>12.52116666666667</c:v>
+                  <c:v>12.521166666666669</c:v>
                 </c:pt>
                 <c:pt idx="6">
                   <c:v>14.73285714285714</c:v>
                 </c:pt>
                 <c:pt idx="7">
-                  <c:v>16.39125</c:v>
+                  <c:v>16.391249999999999</c:v>
                 </c:pt>
                 <c:pt idx="8">
                   <c:v>17.01444444444445</c:v>
                 </c:pt>
                 <c:pt idx="9">
-                  <c:v>16.313</c:v>
+                  <c:v>16.312999999999999</c:v>
                 </c:pt>
                 <c:pt idx="10">
-                  <c:v>16.23909090909091</c:v>
+                  <c:v>16.239090909090908</c:v>
                 </c:pt>
                 <c:pt idx="11">
                   <c:v>16.84416666666667</c:v>
                 </c:pt>
                 <c:pt idx="12">
-                  <c:v>17.31769230769231</c:v>
+                  <c:v>17.317692307692312</c:v>
                 </c:pt>
                 <c:pt idx="13">
-                  <c:v>16.93785714285715</c:v>
+                  <c:v>16.937857142857151</c:v>
                 </c:pt>
                 <c:pt idx="14">
-                  <c:v>17.742</c:v>
+                  <c:v>17.742000000000001</c:v>
                 </c:pt>
                 <c:pt idx="15">
                   <c:v>17.633125</c:v>
@@ -684,22 +694,22 @@
                   <c:v>17.53705882352941</c:v>
                 </c:pt>
                 <c:pt idx="17">
-                  <c:v>17.56277777777778</c:v>
+                  <c:v>17.562777777777779</c:v>
                 </c:pt>
                 <c:pt idx="18">
-                  <c:v>17.48052631578947</c:v>
+                  <c:v>17.480526315789469</c:v>
                 </c:pt>
                 <c:pt idx="19">
                   <c:v>16.6065</c:v>
                 </c:pt>
                 <c:pt idx="20">
-                  <c:v>15.81571428571429</c:v>
+                  <c:v>15.815714285714289</c:v>
                 </c:pt>
                 <c:pt idx="21">
-                  <c:v>15.09681818181818</c:v>
+                  <c:v>15.096818181818181</c:v>
                 </c:pt>
                 <c:pt idx="22">
-                  <c:v>14.4404347826087</c:v>
+                  <c:v>14.440434782608699</c:v>
                 </c:pt>
               </c:numCache>
             </c:numRef>
@@ -721,11 +731,11 @@
         </c:dLbls>
         <c:marker val="1"/>
         <c:smooth val="0"/>
-        <c:axId val="2130262888"/>
-        <c:axId val="2130287000"/>
+        <c:axId val="235434680"/>
+        <c:axId val="235431544"/>
       </c:lineChart>
       <c:catAx>
-        <c:axId val="2130262888"/>
+        <c:axId val="235434680"/>
         <c:scaling>
           <c:orientation val="minMax"/>
         </c:scaling>
@@ -766,6 +776,26 @@
             </a:ln>
             <a:effectLst/>
           </c:spPr>
+          <c:txPr>
+            <a:bodyPr rot="0" spcFirstLastPara="1" vertOverflow="ellipsis" vert="horz" wrap="square" anchor="ctr" anchorCtr="1"/>
+            <a:lstStyle/>
+            <a:p>
+              <a:pPr>
+                <a:defRPr sz="2000" b="0" i="0" u="none" strike="noStrike" kern="1200" baseline="0">
+                  <a:solidFill>
+                    <a:schemeClr val="tx1">
+                      <a:lumMod val="65000"/>
+                      <a:lumOff val="35000"/>
+                    </a:schemeClr>
+                  </a:solidFill>
+                  <a:latin typeface="+mn-lt"/>
+                  <a:ea typeface="+mn-ea"/>
+                  <a:cs typeface="+mn-cs"/>
+                </a:defRPr>
+              </a:pPr>
+              <a:endParaRPr lang="en-US"/>
+            </a:p>
+          </c:txPr>
         </c:title>
         <c:numFmt formatCode="[$-409]dd\-mmm;@" sourceLinked="1"/>
         <c:majorTickMark val="none"/>
@@ -804,7 +834,7 @@
             <a:endParaRPr lang="en-US"/>
           </a:p>
         </c:txPr>
-        <c:crossAx val="2130287000"/>
+        <c:crossAx val="235431544"/>
         <c:crosses val="autoZero"/>
         <c:auto val="0"/>
         <c:lblAlgn val="ctr"/>
@@ -812,7 +842,7 @@
         <c:noMultiLvlLbl val="0"/>
       </c:catAx>
       <c:valAx>
-        <c:axId val="2130287000"/>
+        <c:axId val="235431544"/>
         <c:scaling>
           <c:orientation val="minMax"/>
         </c:scaling>
@@ -871,6 +901,26 @@
             </a:ln>
             <a:effectLst/>
           </c:spPr>
+          <c:txPr>
+            <a:bodyPr rot="-5400000" spcFirstLastPara="1" vertOverflow="ellipsis" vert="horz" wrap="square" anchor="ctr" anchorCtr="1"/>
+            <a:lstStyle/>
+            <a:p>
+              <a:pPr>
+                <a:defRPr sz="2000" b="0" i="0" u="none" strike="noStrike" kern="1200" baseline="0">
+                  <a:solidFill>
+                    <a:schemeClr val="tx1">
+                      <a:lumMod val="65000"/>
+                      <a:lumOff val="35000"/>
+                    </a:schemeClr>
+                  </a:solidFill>
+                  <a:latin typeface="+mn-lt"/>
+                  <a:ea typeface="+mn-ea"/>
+                  <a:cs typeface="+mn-cs"/>
+                </a:defRPr>
+              </a:pPr>
+              <a:endParaRPr lang="en-US"/>
+            </a:p>
+          </c:txPr>
         </c:title>
         <c:numFmt formatCode="0.00" sourceLinked="1"/>
         <c:majorTickMark val="none"/>
@@ -903,7 +953,7 @@
             <a:endParaRPr lang="en-US"/>
           </a:p>
         </c:txPr>
-        <c:crossAx val="2130262888"/>
+        <c:crossAx val="235434680"/>
         <c:crosses val="autoZero"/>
         <c:crossBetween val="between"/>
       </c:valAx>
@@ -968,7 +1018,7 @@
       <a:endParaRPr lang="en-US"/>
     </a:p>
   </c:txPr>
-  <c:externalData r:id="rId1">
+  <c:externalData r:id="rId3">
     <c:autoUpdate val="0"/>
   </c:externalData>
 </c:chartSpace>
@@ -1023,6 +1073,26 @@
         </a:ln>
         <a:effectLst/>
       </c:spPr>
+      <c:txPr>
+        <a:bodyPr rot="0" spcFirstLastPara="1" vertOverflow="ellipsis" vert="horz" wrap="square" anchor="ctr" anchorCtr="1"/>
+        <a:lstStyle/>
+        <a:p>
+          <a:pPr>
+            <a:defRPr sz="1400" b="0" i="0" u="none" strike="noStrike" kern="1200" spc="0" baseline="0">
+              <a:solidFill>
+                <a:schemeClr val="tx1">
+                  <a:lumMod val="65000"/>
+                  <a:lumOff val="35000"/>
+                </a:schemeClr>
+              </a:solidFill>
+              <a:latin typeface="+mn-lt"/>
+              <a:ea typeface="+mn-ea"/>
+              <a:cs typeface="+mn-cs"/>
+            </a:defRPr>
+          </a:pPr>
+          <a:endParaRPr lang="en-US"/>
+        </a:p>
+      </c:txPr>
     </c:title>
     <c:autoTitleDeleted val="0"/>
     <c:plotArea>
@@ -1032,9 +1102,9 @@
           <c:xMode val="edge"/>
           <c:yMode val="edge"/>
           <c:x val="0.11306238578013"/>
-          <c:y val="0.13511839708561"/>
-          <c:w val="0.853421189879536"/>
-          <c:h val="0.73344204925204"/>
+          <c:y val="0.13511839708560999"/>
+          <c:w val="0.85342118987953597"/>
+          <c:h val="0.73344204925204004"/>
         </c:manualLayout>
       </c:layout>
       <c:lineChart>
@@ -1132,34 +1202,34 @@
                 <c:formatCode>General</c:formatCode>
                 <c:ptCount val="10"/>
                 <c:pt idx="0">
-                  <c:v>1.0</c:v>
+                  <c:v>1</c:v>
                 </c:pt>
                 <c:pt idx="1">
-                  <c:v>2.0</c:v>
+                  <c:v>2</c:v>
                 </c:pt>
                 <c:pt idx="2">
-                  <c:v>3.0</c:v>
+                  <c:v>3</c:v>
                 </c:pt>
                 <c:pt idx="3">
-                  <c:v>4.0</c:v>
+                  <c:v>4</c:v>
                 </c:pt>
                 <c:pt idx="4">
-                  <c:v>5.0</c:v>
+                  <c:v>5</c:v>
                 </c:pt>
                 <c:pt idx="5">
-                  <c:v>6.0</c:v>
+                  <c:v>6</c:v>
                 </c:pt>
                 <c:pt idx="6">
-                  <c:v>7.0</c:v>
+                  <c:v>7</c:v>
                 </c:pt>
                 <c:pt idx="7">
-                  <c:v>8.0</c:v>
+                  <c:v>8</c:v>
                 </c:pt>
                 <c:pt idx="8">
-                  <c:v>9.0</c:v>
+                  <c:v>9</c:v>
                 </c:pt>
                 <c:pt idx="9">
-                  <c:v>10.0</c:v>
+                  <c:v>10</c:v>
                 </c:pt>
               </c:numCache>
             </c:numRef>
@@ -1171,28 +1241,28 @@
                 <c:formatCode>General</c:formatCode>
                 <c:ptCount val="10"/>
                 <c:pt idx="0">
-                  <c:v>250.0</c:v>
+                  <c:v>250</c:v>
                 </c:pt>
                 <c:pt idx="1">
-                  <c:v>532.0</c:v>
+                  <c:v>532</c:v>
                 </c:pt>
                 <c:pt idx="2">
-                  <c:v>481.0</c:v>
+                  <c:v>481</c:v>
                 </c:pt>
                 <c:pt idx="3">
                   <c:v>455.5</c:v>
                 </c:pt>
                 <c:pt idx="4">
-                  <c:v>409.0</c:v>
+                  <c:v>409</c:v>
                 </c:pt>
                 <c:pt idx="5">
-                  <c:v>368.0</c:v>
+                  <c:v>368</c:v>
                 </c:pt>
                 <c:pt idx="6">
-                  <c:v>72.0</c:v>
+                  <c:v>72</c:v>
                 </c:pt>
                 <c:pt idx="7">
-                  <c:v>38.0</c:v>
+                  <c:v>38</c:v>
                 </c:pt>
               </c:numCache>
             </c:numRef>
@@ -1297,34 +1367,34 @@
                 <c:formatCode>General</c:formatCode>
                 <c:ptCount val="10"/>
                 <c:pt idx="0">
-                  <c:v>1.0</c:v>
+                  <c:v>1</c:v>
                 </c:pt>
                 <c:pt idx="1">
-                  <c:v>2.0</c:v>
+                  <c:v>2</c:v>
                 </c:pt>
                 <c:pt idx="2">
-                  <c:v>3.0</c:v>
+                  <c:v>3</c:v>
                 </c:pt>
                 <c:pt idx="3">
-                  <c:v>4.0</c:v>
+                  <c:v>4</c:v>
                 </c:pt>
                 <c:pt idx="4">
-                  <c:v>5.0</c:v>
+                  <c:v>5</c:v>
                 </c:pt>
                 <c:pt idx="5">
-                  <c:v>6.0</c:v>
+                  <c:v>6</c:v>
                 </c:pt>
                 <c:pt idx="6">
-                  <c:v>7.0</c:v>
+                  <c:v>7</c:v>
                 </c:pt>
                 <c:pt idx="7">
-                  <c:v>8.0</c:v>
+                  <c:v>8</c:v>
                 </c:pt>
                 <c:pt idx="8">
-                  <c:v>9.0</c:v>
+                  <c:v>9</c:v>
                 </c:pt>
                 <c:pt idx="9">
-                  <c:v>10.0</c:v>
+                  <c:v>10</c:v>
                 </c:pt>
               </c:numCache>
             </c:numRef>
@@ -1336,34 +1406,34 @@
                 <c:formatCode>General</c:formatCode>
                 <c:ptCount val="10"/>
                 <c:pt idx="0">
-                  <c:v>532.0</c:v>
+                  <c:v>532</c:v>
                 </c:pt>
                 <c:pt idx="1">
-                  <c:v>479.0</c:v>
+                  <c:v>479</c:v>
                 </c:pt>
                 <c:pt idx="2">
-                  <c:v>426.0</c:v>
+                  <c:v>426</c:v>
                 </c:pt>
                 <c:pt idx="3">
-                  <c:v>373.0</c:v>
+                  <c:v>373</c:v>
                 </c:pt>
                 <c:pt idx="4">
-                  <c:v>320.0</c:v>
+                  <c:v>320</c:v>
                 </c:pt>
                 <c:pt idx="5">
-                  <c:v>267.0</c:v>
+                  <c:v>267</c:v>
                 </c:pt>
                 <c:pt idx="6">
-                  <c:v>214.0</c:v>
+                  <c:v>214</c:v>
                 </c:pt>
                 <c:pt idx="7">
-                  <c:v>161.0</c:v>
+                  <c:v>161</c:v>
                 </c:pt>
                 <c:pt idx="8">
-                  <c:v>108.0</c:v>
+                  <c:v>108</c:v>
                 </c:pt>
                 <c:pt idx="9">
-                  <c:v>55.0</c:v>
+                  <c:v>55</c:v>
                 </c:pt>
               </c:numCache>
             </c:numRef>
@@ -1384,13 +1454,12 @@
           <c:showPercent val="0"/>
           <c:showBubbleSize val="0"/>
         </c:dLbls>
-        <c:marker val="1"/>
         <c:smooth val="0"/>
-        <c:axId val="2124324952"/>
-        <c:axId val="2124331816"/>
+        <c:axId val="235760456"/>
+        <c:axId val="235760848"/>
       </c:lineChart>
       <c:catAx>
-        <c:axId val="2124324952"/>
+        <c:axId val="235760456"/>
         <c:scaling>
           <c:orientation val="minMax"/>
         </c:scaling>
@@ -1441,7 +1510,7 @@
               <c:xMode val="edge"/>
               <c:yMode val="edge"/>
               <c:x val="0.481902887139108"/>
-              <c:y val="0.903948256467942"/>
+              <c:y val="0.90394825646794197"/>
             </c:manualLayout>
           </c:layout>
           <c:overlay val="0"/>
@@ -1452,6 +1521,26 @@
             </a:ln>
             <a:effectLst/>
           </c:spPr>
+          <c:txPr>
+            <a:bodyPr rot="0" spcFirstLastPara="1" vertOverflow="ellipsis" vert="horz" wrap="square" anchor="ctr" anchorCtr="1"/>
+            <a:lstStyle/>
+            <a:p>
+              <a:pPr>
+                <a:defRPr sz="2000" b="0" i="0" u="none" strike="noStrike" kern="1200" baseline="0">
+                  <a:solidFill>
+                    <a:schemeClr val="tx1">
+                      <a:lumMod val="65000"/>
+                      <a:lumOff val="35000"/>
+                    </a:schemeClr>
+                  </a:solidFill>
+                  <a:latin typeface="+mn-lt"/>
+                  <a:ea typeface="+mn-ea"/>
+                  <a:cs typeface="+mn-cs"/>
+                </a:defRPr>
+              </a:pPr>
+              <a:endParaRPr lang="en-US"/>
+            </a:p>
+          </c:txPr>
         </c:title>
         <c:numFmt formatCode="General" sourceLinked="1"/>
         <c:majorTickMark val="none"/>
@@ -1490,7 +1579,7 @@
             <a:endParaRPr lang="en-US"/>
           </a:p>
         </c:txPr>
-        <c:crossAx val="2124331816"/>
+        <c:crossAx val="235760848"/>
         <c:crosses val="autoZero"/>
         <c:auto val="1"/>
         <c:lblAlgn val="ctr"/>
@@ -1499,7 +1588,7 @@
         <c:noMultiLvlLbl val="0"/>
       </c:catAx>
       <c:valAx>
-        <c:axId val="2124331816"/>
+        <c:axId val="235760848"/>
         <c:scaling>
           <c:orientation val="minMax"/>
         </c:scaling>
@@ -1568,8 +1657,8 @@
             <c:manualLayout>
               <c:xMode val="edge"/>
               <c:yMode val="edge"/>
-              <c:x val="0.0139707961832966"/>
-              <c:y val="0.235254875221354"/>
+              <c:x val="1.3970796183296601E-2"/>
+              <c:y val="0.23525487522135399"/>
             </c:manualLayout>
           </c:layout>
           <c:overlay val="0"/>
@@ -1580,6 +1669,40 @@
             </a:ln>
             <a:effectLst/>
           </c:spPr>
+          <c:txPr>
+            <a:bodyPr rot="-5400000" spcFirstLastPara="1" vertOverflow="ellipsis" vert="horz" wrap="square" anchor="ctr" anchorCtr="1"/>
+            <a:lstStyle/>
+            <a:p>
+              <a:pPr marL="0" marR="0" indent="0" algn="ctr" defTabSz="914400" rtl="0" eaLnBrk="1" fontAlgn="auto" latinLnBrk="0" hangingPunct="1">
+                <a:lnSpc>
+                  <a:spcPct val="100000"/>
+                </a:lnSpc>
+                <a:spcBef>
+                  <a:spcPts val="0"/>
+                </a:spcBef>
+                <a:spcAft>
+                  <a:spcPts val="0"/>
+                </a:spcAft>
+                <a:buClrTx/>
+                <a:buSzTx/>
+                <a:buFontTx/>
+                <a:buNone/>
+                <a:tabLst/>
+                <a:defRPr sz="2000" b="0" i="0" u="none" strike="noStrike" kern="1200" baseline="0">
+                  <a:solidFill>
+                    <a:sysClr val="windowText" lastClr="000000">
+                      <a:lumMod val="65000"/>
+                      <a:lumOff val="35000"/>
+                    </a:sysClr>
+                  </a:solidFill>
+                  <a:latin typeface="+mn-lt"/>
+                  <a:ea typeface="+mn-ea"/>
+                  <a:cs typeface="+mn-cs"/>
+                </a:defRPr>
+              </a:pPr>
+              <a:endParaRPr lang="en-US"/>
+            </a:p>
+          </c:txPr>
         </c:title>
         <c:numFmt formatCode="General" sourceLinked="1"/>
         <c:majorTickMark val="none"/>
@@ -1618,7 +1741,7 @@
             <a:endParaRPr lang="en-US"/>
           </a:p>
         </c:txPr>
-        <c:crossAx val="2124324952"/>
+        <c:crossAx val="235760456"/>
         <c:crosses val="autoZero"/>
         <c:crossBetween val="midCat"/>
       </c:valAx>
@@ -1636,10 +1759,10 @@
         <c:manualLayout>
           <c:xMode val="edge"/>
           <c:yMode val="edge"/>
-          <c:x val="0.0428327799897388"/>
-          <c:y val="0.914560188173199"/>
-          <c:w val="0.400445282881306"/>
-          <c:h val="0.0669647544056993"/>
+          <c:x val="4.2832779989738799E-2"/>
+          <c:y val="0.91456018817319895"/>
+          <c:w val="0.40044528288130599"/>
+          <c:h val="6.6964754405699295E-2"/>
         </c:manualLayout>
       </c:layout>
       <c:overlay val="0"/>
@@ -1692,7 +1815,7 @@
       <a:endParaRPr lang="en-US"/>
     </a:p>
   </c:txPr>
-  <c:externalData r:id="rId1">
+  <c:externalData r:id="rId3">
     <c:autoUpdate val="0"/>
   </c:externalData>
 </c:chartSpace>
@@ -2892,7 +3015,7 @@
           <a:p>
             <a:fld id="{4954C6E1-AF92-4FB7-A013-0B520EBC30AE}" type="datetimeFigureOut">
               <a:rPr lang="en-US"/>
-              <a:t>4/4/16</a:t>
+              <a:t>4/4/2016</a:t>
             </a:fld>
             <a:endParaRPr/>
           </a:p>
@@ -3058,7 +3181,7 @@
           <a:p>
             <a:fld id="{95C10850-0874-4A61-99B4-D613C5E8D9EA}" type="datetimeFigureOut">
               <a:rPr lang="en-US"/>
-              <a:t>4/4/16</a:t>
+              <a:t>4/4/2016</a:t>
             </a:fld>
             <a:endParaRPr/>
           </a:p>
@@ -3884,13 +4007,13 @@
   <p:timing>
     <p:tnLst>
       <p:par>
-        <p:cTn xmlns:p14="http://schemas.microsoft.com/office/powerpoint/2010/main" id="1" dur="indefinite" restart="never" nodeType="tmRoot"/>
+        <p:cTn id="1" dur="indefinite" restart="never" nodeType="tmRoot"/>
       </p:par>
     </p:tnLst>
   </p:timing>
   <p:extLst mod="1">
     <p:ext uri="{DCECCB84-F9BA-43D5-87BE-67443E8EF086}">
-      <p15:sldGuideLst xmlns:p15="http://schemas.microsoft.com/office/powerpoint/2012/main" xmlns="">
+      <p15:sldGuideLst xmlns:p15="http://schemas.microsoft.com/office/powerpoint/2012/main">
         <p15:guide id="1" orient="horz" pos="2160" userDrawn="1">
           <p15:clr>
             <a:srgbClr val="FBAE40"/>
@@ -4093,7 +4216,7 @@
   <p:timing>
     <p:tnLst>
       <p:par>
-        <p:cTn xmlns:p14="http://schemas.microsoft.com/office/powerpoint/2010/main" id="1" dur="indefinite" restart="never" nodeType="tmRoot"/>
+        <p:cTn id="1" dur="indefinite" restart="never" nodeType="tmRoot"/>
       </p:par>
     </p:tnLst>
   </p:timing>
@@ -4349,7 +4472,7 @@
   <p:timing>
     <p:tnLst>
       <p:par>
-        <p:cTn xmlns:p14="http://schemas.microsoft.com/office/powerpoint/2010/main" id="1" dur="indefinite" restart="never" nodeType="tmRoot"/>
+        <p:cTn id="1" dur="indefinite" restart="never" nodeType="tmRoot"/>
       </p:par>
     </p:tnLst>
   </p:timing>
@@ -4542,7 +4665,7 @@
   <p:timing>
     <p:tnLst>
       <p:par>
-        <p:cTn xmlns:p14="http://schemas.microsoft.com/office/powerpoint/2010/main" id="1" dur="indefinite" restart="never" nodeType="tmRoot"/>
+        <p:cTn id="1" dur="indefinite" restart="never" nodeType="tmRoot"/>
       </p:par>
     </p:tnLst>
   </p:timing>
@@ -4920,7 +5043,7 @@
   <p:timing>
     <p:tnLst>
       <p:par>
-        <p:cTn xmlns:p14="http://schemas.microsoft.com/office/powerpoint/2010/main" id="1" dur="indefinite" restart="never" nodeType="tmRoot"/>
+        <p:cTn id="1" dur="indefinite" restart="never" nodeType="tmRoot"/>
       </p:par>
     </p:tnLst>
   </p:timing>
@@ -5231,7 +5354,7 @@
   <p:timing>
     <p:tnLst>
       <p:par>
-        <p:cTn xmlns:p14="http://schemas.microsoft.com/office/powerpoint/2010/main" id="1" dur="indefinite" restart="never" nodeType="tmRoot"/>
+        <p:cTn id="1" dur="indefinite" restart="never" nodeType="tmRoot"/>
       </p:par>
     </p:tnLst>
   </p:timing>
@@ -5676,7 +5799,7 @@
   <p:timing>
     <p:tnLst>
       <p:par>
-        <p:cTn xmlns:p14="http://schemas.microsoft.com/office/powerpoint/2010/main" id="1" dur="indefinite" restart="never" nodeType="tmRoot"/>
+        <p:cTn id="1" dur="indefinite" restart="never" nodeType="tmRoot"/>
       </p:par>
     </p:tnLst>
   </p:timing>
@@ -5817,7 +5940,7 @@
   <p:timing>
     <p:tnLst>
       <p:par>
-        <p:cTn xmlns:p14="http://schemas.microsoft.com/office/powerpoint/2010/main" id="1" dur="indefinite" restart="never" nodeType="tmRoot"/>
+        <p:cTn id="1" dur="indefinite" restart="never" nodeType="tmRoot"/>
       </p:par>
     </p:tnLst>
   </p:timing>
@@ -5936,7 +6059,7 @@
   <p:timing>
     <p:tnLst>
       <p:par>
-        <p:cTn xmlns:p14="http://schemas.microsoft.com/office/powerpoint/2010/main" id="1" dur="indefinite" restart="never" nodeType="tmRoot"/>
+        <p:cTn id="1" dur="indefinite" restart="never" nodeType="tmRoot"/>
       </p:par>
     </p:tnLst>
   </p:timing>
@@ -6233,7 +6356,7 @@
   <p:timing>
     <p:tnLst>
       <p:par>
-        <p:cTn xmlns:p14="http://schemas.microsoft.com/office/powerpoint/2010/main" id="1" dur="indefinite" restart="never" nodeType="tmRoot"/>
+        <p:cTn id="1" dur="indefinite" restart="never" nodeType="tmRoot"/>
       </p:par>
     </p:tnLst>
   </p:timing>
@@ -6522,7 +6645,7 @@
   <p:timing>
     <p:tnLst>
       <p:par>
-        <p:cTn xmlns:p14="http://schemas.microsoft.com/office/powerpoint/2010/main" id="1" dur="indefinite" restart="never" nodeType="tmRoot"/>
+        <p:cTn id="1" dur="indefinite" restart="never" nodeType="tmRoot"/>
       </p:par>
     </p:tnLst>
   </p:timing>
@@ -6838,7 +6961,7 @@
   <p:timing>
     <p:tnLst>
       <p:par>
-        <p:cTn xmlns:p14="http://schemas.microsoft.com/office/powerpoint/2010/main" id="1" dur="indefinite" restart="never" nodeType="tmRoot"/>
+        <p:cTn id="1" dur="indefinite" restart="never" nodeType="tmRoot"/>
       </p:par>
     </p:tnLst>
   </p:timing>
@@ -7528,7 +7651,7 @@
   <p:timing>
     <p:tnLst>
       <p:par>
-        <p:cTn xmlns:p14="http://schemas.microsoft.com/office/powerpoint/2010/main" id="1" dur="indefinite" restart="never" nodeType="tmRoot"/>
+        <p:cTn id="1" dur="indefinite" restart="never" nodeType="tmRoot"/>
       </p:par>
     </p:tnLst>
   </p:timing>
@@ -7583,53 +7706,53 @@
             <a:spLocks noGrp="1"/>
           </p:cNvSpPr>
           <p:nvPr>
-            <p:ph idx="1"/>
-          </p:nvPr>
-        </p:nvSpPr>
-        <p:spPr/>
-        <p:txBody>
-          <a:bodyPr/>
-          <a:lstStyle/>
-          <a:p>
+            <p:ph sz="half" idx="1"/>
+          </p:nvPr>
+        </p:nvSpPr>
+        <p:spPr>
+          <a:xfrm>
+            <a:off x="303212" y="2011680"/>
+            <a:ext cx="5655460" cy="4206240"/>
+          </a:xfrm>
+        </p:spPr>
+        <p:txBody>
+          <a:bodyPr>
+            <a:normAutofit/>
+          </a:bodyPr>
+          <a:lstStyle/>
+          <a:p>
+            <a:r>
+              <a:rPr lang="en-US" sz="3600" i="1" dirty="0" smtClean="0"/>
+              <a:t>Good</a:t>
+            </a:r>
+            <a:endParaRPr lang="en-US" sz="3200" i="1" dirty="0" smtClean="0"/>
+          </a:p>
+          <a:p>
+            <a:pPr lvl="1"/>
             <a:r>
               <a:rPr lang="en-US" sz="3200" dirty="0" smtClean="0"/>
-              <a:t>Good:</a:t>
-            </a:r>
+              <a:t>Met all of client’s requirements</a:t>
+            </a:r>
+            <a:endParaRPr lang="en-US" sz="3200" dirty="0" smtClean="0"/>
           </a:p>
           <a:p>
             <a:pPr lvl="1"/>
             <a:r>
               <a:rPr lang="en-US" sz="3200" dirty="0" smtClean="0"/>
-              <a:t>Completed our project fully.</a:t>
+              <a:t>Learned </a:t>
+            </a:r>
+            <a:r>
+              <a:rPr lang="en-US" sz="3200" dirty="0" smtClean="0"/>
+              <a:t>to develop with modern web frameworks</a:t>
             </a:r>
           </a:p>
           <a:p>
             <a:pPr lvl="1"/>
             <a:r>
               <a:rPr lang="en-US" sz="3200" dirty="0" smtClean="0"/>
-              <a:t>Learned some great technologies on the way.</a:t>
-            </a:r>
-          </a:p>
-          <a:p>
-            <a:pPr lvl="1"/>
+              <a:t>Acquired an intimate understanding of git version control</a:t>
+            </a:r>
             <a:endParaRPr lang="en-US" sz="3200" dirty="0"/>
-          </a:p>
-          <a:p>
-            <a:pPr lvl="1"/>
-            <a:endParaRPr lang="en-US" sz="3200" dirty="0"/>
-          </a:p>
-          <a:p>
-            <a:r>
-              <a:rPr lang="en-US" sz="3200" dirty="0" smtClean="0"/>
-              <a:t>Bad:</a:t>
-            </a:r>
-          </a:p>
-          <a:p>
-            <a:pPr lvl="1"/>
-            <a:r>
-              <a:rPr lang="en-US" sz="3200" dirty="0" smtClean="0"/>
-              <a:t>We wish we had longer to work on it!</a:t>
-            </a:r>
           </a:p>
           <a:p>
             <a:pPr marL="228532" lvl="1" indent="0">
@@ -7640,6 +7763,62 @@
           <a:p>
             <a:pPr lvl="1"/>
             <a:endParaRPr lang="en-US" dirty="0"/>
+          </a:p>
+        </p:txBody>
+      </p:sp>
+      <p:sp>
+        <p:nvSpPr>
+          <p:cNvPr id="7" name="Content Placeholder 6"/>
+          <p:cNvSpPr>
+            <a:spLocks noGrp="1"/>
+          </p:cNvSpPr>
+          <p:nvPr>
+            <p:ph sz="half" idx="2"/>
+          </p:nvPr>
+        </p:nvSpPr>
+        <p:spPr>
+          <a:xfrm>
+            <a:off x="6228768" y="2011680"/>
+            <a:ext cx="5580644" cy="4206240"/>
+          </a:xfrm>
+        </p:spPr>
+        <p:txBody>
+          <a:bodyPr>
+            <a:normAutofit/>
+          </a:bodyPr>
+          <a:lstStyle/>
+          <a:p>
+            <a:r>
+              <a:rPr lang="en-US" sz="3600" i="1" dirty="0" smtClean="0"/>
+              <a:t>Bad</a:t>
+            </a:r>
+          </a:p>
+          <a:p>
+            <a:pPr lvl="1"/>
+            <a:r>
+              <a:rPr lang="en-US" sz="3200" dirty="0" smtClean="0"/>
+              <a:t>Better time estimation</a:t>
+            </a:r>
+          </a:p>
+          <a:p>
+            <a:pPr lvl="3"/>
+            <a:r>
+              <a:rPr lang="en-US" sz="2801" smtClean="0"/>
+              <a:t>Burndown spikes and dives</a:t>
+            </a:r>
+            <a:endParaRPr lang="en-US" sz="2801" dirty="0"/>
+          </a:p>
+          <a:p>
+            <a:pPr lvl="1"/>
+            <a:r>
+              <a:rPr lang="en-US" sz="3200" dirty="0"/>
+              <a:t>We wish we had longer to work on it</a:t>
+            </a:r>
+            <a:r>
+              <a:rPr lang="en-US" sz="3200" dirty="0" smtClean="0"/>
+              <a:t>!</a:t>
+            </a:r>
+            <a:endParaRPr lang="en-US" sz="3200" dirty="0"/>
           </a:p>
         </p:txBody>
       </p:sp>
@@ -7737,7 +7916,7 @@
   <p:timing>
     <p:tnLst>
       <p:par>
-        <p:cTn xmlns:p14="http://schemas.microsoft.com/office/powerpoint/2010/main" id="1" dur="indefinite" restart="never" nodeType="tmRoot"/>
+        <p:cTn id="1" dur="indefinite" restart="never" nodeType="tmRoot"/>
       </p:par>
     </p:tnLst>
   </p:timing>
@@ -7886,7 +8065,7 @@
   <p:timing>
     <p:tnLst>
       <p:par>
-        <p:cTn xmlns:p14="http://schemas.microsoft.com/office/powerpoint/2010/main" id="1" dur="indefinite" restart="never" nodeType="tmRoot"/>
+        <p:cTn id="1" dur="indefinite" restart="never" nodeType="tmRoot"/>
       </p:par>
     </p:tnLst>
   </p:timing>
@@ -8086,7 +8265,7 @@
   <p:timing>
     <p:tnLst>
       <p:par>
-        <p:cTn xmlns:p14="http://schemas.microsoft.com/office/powerpoint/2010/main" id="1" dur="indefinite" restart="never" nodeType="tmRoot"/>
+        <p:cTn id="1" dur="indefinite" restart="never" nodeType="tmRoot"/>
       </p:par>
     </p:tnLst>
   </p:timing>
@@ -8167,8 +8346,13 @@
             </a:pPr>
             <a:r>
               <a:rPr lang="en-US" sz="2400" dirty="0" smtClean="0"/>
-              <a:t>Our client wanted a platform in which he could reliably use to find buggy potions of code in a repository. He then wanted to use this to better predict and prevent bugs from happening in the future.</a:t>
-            </a:r>
+              <a:t>Our client </a:t>
+            </a:r>
+            <a:r>
+              <a:rPr lang="en-US" sz="2400" dirty="0" smtClean="0"/>
+              <a:t>requested a platform that could be used to detect unstable and potentially buggy areas of code within a repository. With export capabilities, the data could also be analyzed to detect trends and to better predict troublesome code.</a:t>
+            </a:r>
+            <a:endParaRPr lang="en-US" sz="2400" dirty="0" smtClean="0"/>
           </a:p>
           <a:p>
             <a:pPr lvl="1"/>
@@ -8364,7 +8548,7 @@
   <p:timing>
     <p:tnLst>
       <p:par>
-        <p:cTn xmlns:p14="http://schemas.microsoft.com/office/powerpoint/2010/main" id="1" dur="indefinite" restart="never" nodeType="tmRoot"/>
+        <p:cTn id="1" dur="indefinite" restart="never" nodeType="tmRoot"/>
       </p:par>
     </p:tnLst>
   </p:timing>
@@ -8541,7 +8725,7 @@
   <p:timing>
     <p:tnLst>
       <p:par>
-        <p:cTn xmlns:p14="http://schemas.microsoft.com/office/powerpoint/2010/main" id="1" dur="indefinite" restart="never" nodeType="tmRoot"/>
+        <p:cTn id="1" dur="indefinite" restart="never" nodeType="tmRoot"/>
       </p:par>
     </p:tnLst>
   </p:timing>
@@ -8688,7 +8872,7 @@
   <p:timing>
     <p:tnLst>
       <p:par>
-        <p:cTn xmlns:p14="http://schemas.microsoft.com/office/powerpoint/2010/main" id="1" dur="indefinite" restart="never" nodeType="tmRoot"/>
+        <p:cTn id="1" dur="indefinite" restart="never" nodeType="tmRoot"/>
       </p:par>
     </p:tnLst>
   </p:timing>
@@ -8989,15 +9173,7 @@
             </a:pPr>
             <a:r>
               <a:rPr lang="en-US" sz="4000" dirty="0" smtClean="0"/>
-              <a:t>Clone a public </a:t>
-            </a:r>
-            <a:r>
-              <a:rPr lang="en-US" sz="4000" dirty="0" err="1" smtClean="0"/>
-              <a:t>git</a:t>
-            </a:r>
-            <a:r>
-              <a:rPr lang="en-US" sz="4000" dirty="0" smtClean="0"/>
-              <a:t> based repository</a:t>
+              <a:t>Clone a public git based repository</a:t>
             </a:r>
           </a:p>
           <a:p>
@@ -9027,8 +9203,13 @@
             </a:pPr>
             <a:r>
               <a:rPr lang="en-US" sz="4000" dirty="0" smtClean="0"/>
-              <a:t>Export metrics to an excel file</a:t>
-            </a:r>
+              <a:t>Export metrics to </a:t>
+            </a:r>
+            <a:r>
+              <a:rPr lang="en-US" sz="4000" dirty="0" smtClean="0"/>
+              <a:t>a CSV file</a:t>
+            </a:r>
+            <a:endParaRPr lang="en-US" sz="4000" dirty="0" smtClean="0"/>
           </a:p>
         </p:txBody>
       </p:sp>
@@ -9385,7 +9566,7 @@
   <p:timing>
     <p:tnLst>
       <p:par>
-        <p:cTn xmlns:p14="http://schemas.microsoft.com/office/powerpoint/2010/main" id="1" dur="indefinite" restart="never" nodeType="tmRoot"/>
+        <p:cTn id="1" dur="indefinite" restart="never" nodeType="tmRoot"/>
       </p:par>
     </p:tnLst>
   </p:timing>
@@ -9552,7 +9733,7 @@
   <p:timing>
     <p:tnLst>
       <p:par>
-        <p:cTn xmlns:p14="http://schemas.microsoft.com/office/powerpoint/2010/main" id="1" dur="indefinite" restart="never" nodeType="tmRoot"/>
+        <p:cTn id="1" dur="indefinite" restart="never" nodeType="tmRoot"/>
       </p:par>
     </p:tnLst>
   </p:timing>
@@ -9815,7 +9996,7 @@
   <a:extraClrSchemeLst/>
   <a:extLst>
     <a:ext uri="{05A4C25C-085E-4340-85A3-A5531E510DB2}">
-      <thm15:themeFamily xmlns:thm15="http://schemas.microsoft.com/office/thememl/2012/main" xmlns="" name="Banded" id="{98DFF888-2449-4D28-977C-6306C017633E}" vid="{B7CF026C-957E-4F4E-893C-D02C23AB6317}"/>
+      <thm15:themeFamily xmlns:thm15="http://schemas.microsoft.com/office/thememl/2012/main" name="Banded" id="{98DFF888-2449-4D28-977C-6306C017633E}" vid="{B7CF026C-957E-4F4E-893C-D02C23AB6317}"/>
     </a:ext>
   </a:extLst>
 </a:theme>

</xml_diff>

<commit_message>
final touches by nate" "
</commit_message>
<xml_diff>
--- a/Documentation/Presentations/CS499 Final Presentation.pptx
+++ b/Documentation/Presentations/CS499 Final Presentation.pptx
@@ -602,8 +602,8 @@
         </c:dLbls>
         <c:gapWidth val="150"/>
         <c:overlap val="100"/>
-        <c:axId val="-664206240"/>
-        <c:axId val="-664205696"/>
+        <c:axId val="-21729408"/>
+        <c:axId val="-21725056"/>
       </c:barChart>
       <c:lineChart>
         <c:grouping val="standard"/>
@@ -730,11 +730,11 @@
         </c:dLbls>
         <c:marker val="1"/>
         <c:smooth val="0"/>
-        <c:axId val="-664206240"/>
-        <c:axId val="-664205696"/>
+        <c:axId val="-21729408"/>
+        <c:axId val="-21725056"/>
       </c:lineChart>
       <c:catAx>
-        <c:axId val="-664206240"/>
+        <c:axId val="-21729408"/>
         <c:scaling>
           <c:orientation val="minMax"/>
         </c:scaling>
@@ -832,7 +832,7 @@
             <a:endParaRPr lang="en-US"/>
           </a:p>
         </c:txPr>
-        <c:crossAx val="-664205696"/>
+        <c:crossAx val="-21725056"/>
         <c:crosses val="autoZero"/>
         <c:auto val="0"/>
         <c:lblAlgn val="ctr"/>
@@ -840,7 +840,7 @@
         <c:noMultiLvlLbl val="0"/>
       </c:catAx>
       <c:valAx>
-        <c:axId val="-664205696"/>
+        <c:axId val="-21725056"/>
         <c:scaling>
           <c:orientation val="minMax"/>
         </c:scaling>
@@ -950,7 +950,7 @@
             <a:endParaRPr lang="en-US"/>
           </a:p>
         </c:txPr>
-        <c:crossAx val="-664206240"/>
+        <c:crossAx val="-21729408"/>
         <c:crosses val="autoZero"/>
         <c:crossBetween val="between"/>
       </c:valAx>
@@ -1448,11 +1448,11 @@
           <c:showBubbleSize val="0"/>
         </c:dLbls>
         <c:smooth val="0"/>
-        <c:axId val="-553046960"/>
-        <c:axId val="-551939664"/>
+        <c:axId val="-1923617152"/>
+        <c:axId val="-1923620960"/>
       </c:lineChart>
       <c:catAx>
-        <c:axId val="-553046960"/>
+        <c:axId val="-1923617152"/>
         <c:scaling>
           <c:orientation val="minMax"/>
         </c:scaling>
@@ -1572,7 +1572,7 @@
             <a:endParaRPr lang="en-US"/>
           </a:p>
         </c:txPr>
-        <c:crossAx val="-551939664"/>
+        <c:crossAx val="-1923620960"/>
         <c:crosses val="autoZero"/>
         <c:auto val="1"/>
         <c:lblAlgn val="ctr"/>
@@ -1581,7 +1581,7 @@
         <c:noMultiLvlLbl val="0"/>
       </c:catAx>
       <c:valAx>
-        <c:axId val="-551939664"/>
+        <c:axId val="-1923620960"/>
         <c:scaling>
           <c:orientation val="minMax"/>
         </c:scaling>
@@ -1734,7 +1734,7 @@
             <a:endParaRPr lang="en-US"/>
           </a:p>
         </c:txPr>
-        <c:crossAx val="-553046960"/>
+        <c:crossAx val="-1923617152"/>
         <c:crosses val="autoZero"/>
         <c:crossBetween val="midCat"/>
       </c:valAx>
@@ -7485,9 +7485,10 @@
           <a:p>
             <a:pPr algn="ctr"/>
             <a:r>
-              <a:rPr lang="en-US" dirty="0"/>
-              <a:t>Post-Mortem/Key Take Away/ not Accomplished</a:t>
-            </a:r>
+              <a:rPr lang="en-US" smtClean="0"/>
+              <a:t>Post-Mortem</a:t>
+            </a:r>
+            <a:endParaRPr lang="en-US" dirty="0"/>
           </a:p>
         </p:txBody>
       </p:sp>
@@ -8153,15 +8154,12 @@
             <a:pPr lvl="1"/>
             <a:r>
               <a:rPr lang="en-US" sz="2400" dirty="0" smtClean="0"/>
-              <a:t>Allows contributors to grow and develop based on the history of their contributions</a:t>
-            </a:r>
-            <a:endParaRPr lang="en-US" sz="2400" dirty="0"/>
-          </a:p>
-          <a:p>
-            <a:pPr marL="0" indent="0">
-              <a:buNone/>
-            </a:pPr>
-            <a:endParaRPr lang="en-US" sz="4000" u="sng" dirty="0"/>
+              <a:t>Allows contributors to grow and develop based on the history of their </a:t>
+            </a:r>
+            <a:r>
+              <a:rPr lang="en-US" sz="2400" dirty="0" smtClean="0"/>
+              <a:t>contributions</a:t>
+            </a:r>
           </a:p>
         </p:txBody>
       </p:sp>

</xml_diff>

<commit_message>
Made changes per critique and new ideas
</commit_message>
<xml_diff>
--- a/Documentation/Presentations/CS499 Final Presentation.pptx
+++ b/Documentation/Presentations/CS499 Final Presentation.pptx
@@ -14,8 +14,8 @@
     <p:sldId id="259" r:id="rId3"/>
     <p:sldId id="285" r:id="rId4"/>
     <p:sldId id="280" r:id="rId5"/>
-    <p:sldId id="266" r:id="rId6"/>
-    <p:sldId id="284" r:id="rId7"/>
+    <p:sldId id="284" r:id="rId6"/>
+    <p:sldId id="266" r:id="rId7"/>
     <p:sldId id="282" r:id="rId8"/>
     <p:sldId id="281" r:id="rId9"/>
     <p:sldId id="270" r:id="rId10"/>
@@ -262,6 +262,7 @@
           </a:p>
         </c:rich>
       </c:tx>
+      <c:layout/>
       <c:overlay val="0"/>
       <c:spPr>
         <a:noFill/>
@@ -602,8 +603,8 @@
         </c:dLbls>
         <c:gapWidth val="150"/>
         <c:overlap val="100"/>
-        <c:axId val="-21729408"/>
-        <c:axId val="-21725056"/>
+        <c:axId val="212338952"/>
+        <c:axId val="212341696"/>
       </c:barChart>
       <c:lineChart>
         <c:grouping val="standard"/>
@@ -730,11 +731,11 @@
         </c:dLbls>
         <c:marker val="1"/>
         <c:smooth val="0"/>
-        <c:axId val="-21729408"/>
-        <c:axId val="-21725056"/>
+        <c:axId val="212338952"/>
+        <c:axId val="212341696"/>
       </c:lineChart>
       <c:catAx>
-        <c:axId val="-21729408"/>
+        <c:axId val="212338952"/>
         <c:scaling>
           <c:orientation val="minMax"/>
         </c:scaling>
@@ -766,6 +767,7 @@
               </a:p>
             </c:rich>
           </c:tx>
+          <c:layout/>
           <c:overlay val="0"/>
           <c:spPr>
             <a:noFill/>
@@ -832,7 +834,7 @@
             <a:endParaRPr lang="en-US"/>
           </a:p>
         </c:txPr>
-        <c:crossAx val="-21725056"/>
+        <c:crossAx val="212341696"/>
         <c:crosses val="autoZero"/>
         <c:auto val="0"/>
         <c:lblAlgn val="ctr"/>
@@ -840,7 +842,7 @@
         <c:noMultiLvlLbl val="0"/>
       </c:catAx>
       <c:valAx>
-        <c:axId val="-21725056"/>
+        <c:axId val="212341696"/>
         <c:scaling>
           <c:orientation val="minMax"/>
         </c:scaling>
@@ -890,6 +892,7 @@
               </a:p>
             </c:rich>
           </c:tx>
+          <c:layout/>
           <c:overlay val="0"/>
           <c:spPr>
             <a:noFill/>
@@ -950,7 +953,7 @@
             <a:endParaRPr lang="en-US"/>
           </a:p>
         </c:txPr>
-        <c:crossAx val="-21729408"/>
+        <c:crossAx val="212338952"/>
         <c:crosses val="autoZero"/>
         <c:crossBetween val="between"/>
       </c:valAx>
@@ -964,6 +967,7 @@
     </c:plotArea>
     <c:legend>
       <c:legendPos val="b"/>
+      <c:layout/>
       <c:overlay val="0"/>
       <c:spPr>
         <a:noFill/>
@@ -1060,6 +1064,7 @@
           </a:p>
         </c:rich>
       </c:tx>
+      <c:layout/>
       <c:overlay val="0"/>
       <c:spPr>
         <a:noFill/>
@@ -1171,6 +1176,7 @@
             <c:showLeaderLines val="0"/>
             <c:extLst xmlns:c16r2="http://schemas.microsoft.com/office/drawing/2015/06/chart">
               <c:ext xmlns:c15="http://schemas.microsoft.com/office/drawing/2012/chart" uri="{CE6537A1-D6FC-4f65-9D91-7224C49458BB}">
+                <c15:layout/>
                 <c15:showLeaderLines val="1"/>
                 <c15:leaderLines>
                   <c:spPr>
@@ -1335,6 +1341,7 @@
             <c:showLeaderLines val="0"/>
             <c:extLst xmlns:c16r2="http://schemas.microsoft.com/office/drawing/2015/06/chart">
               <c:ext xmlns:c15="http://schemas.microsoft.com/office/drawing/2012/chart" uri="{CE6537A1-D6FC-4f65-9D91-7224C49458BB}">
+                <c15:layout/>
                 <c15:showLeaderLines val="1"/>
                 <c15:leaderLines>
                   <c:spPr>
@@ -1448,11 +1455,11 @@
           <c:showBubbleSize val="0"/>
         </c:dLbls>
         <c:smooth val="0"/>
-        <c:axId val="-1923617152"/>
-        <c:axId val="-1923620960"/>
+        <c:axId val="284704120"/>
+        <c:axId val="284704512"/>
       </c:lineChart>
       <c:catAx>
-        <c:axId val="-1923617152"/>
+        <c:axId val="284704120"/>
         <c:scaling>
           <c:orientation val="minMax"/>
         </c:scaling>
@@ -1572,7 +1579,7 @@
             <a:endParaRPr lang="en-US"/>
           </a:p>
         </c:txPr>
-        <c:crossAx val="-1923620960"/>
+        <c:crossAx val="284704512"/>
         <c:crosses val="autoZero"/>
         <c:auto val="1"/>
         <c:lblAlgn val="ctr"/>
@@ -1581,7 +1588,7 @@
         <c:noMultiLvlLbl val="0"/>
       </c:catAx>
       <c:valAx>
-        <c:axId val="-1923620960"/>
+        <c:axId val="284704512"/>
         <c:scaling>
           <c:orientation val="minMax"/>
         </c:scaling>
@@ -1734,7 +1741,7 @@
             <a:endParaRPr lang="en-US"/>
           </a:p>
         </c:txPr>
-        <c:crossAx val="-1923617152"/>
+        <c:crossAx val="284704120"/>
         <c:crosses val="autoZero"/>
         <c:crossBetween val="midCat"/>
       </c:valAx>
@@ -3008,7 +3015,7 @@
           <a:p>
             <a:fld id="{4954C6E1-AF92-4FB7-A013-0B520EBC30AE}" type="datetimeFigureOut">
               <a:rPr lang="en-US"/>
-              <a:t>04/04/2016</a:t>
+              <a:t>4/9/2016</a:t>
             </a:fld>
             <a:endParaRPr/>
           </a:p>
@@ -3174,7 +3181,7 @@
           <a:p>
             <a:fld id="{95C10850-0874-4A61-99B4-D613C5E8D9EA}" type="datetimeFigureOut">
               <a:rPr lang="en-US"/>
-              <a:t>04/04/2016</a:t>
+              <a:t>4/9/2016</a:t>
             </a:fld>
             <a:endParaRPr/>
           </a:p>
@@ -7505,7 +7512,7 @@
         <p:spPr>
           <a:xfrm>
             <a:off x="303212" y="2011680"/>
-            <a:ext cx="5655460" cy="4206240"/>
+            <a:ext cx="5925556" cy="4206240"/>
           </a:xfrm>
         </p:spPr>
         <p:txBody>
@@ -7514,8 +7521,11 @@
           </a:bodyPr>
           <a:lstStyle/>
           <a:p>
-            <a:r>
-              <a:rPr lang="en-US" sz="3600" i="1" dirty="0"/>
+            <a:pPr marL="0" indent="0">
+              <a:buNone/>
+            </a:pPr>
+            <a:r>
+              <a:rPr lang="en-US" sz="3600" i="1" dirty="0" smtClean="0"/>
               <a:t>Good</a:t>
             </a:r>
             <a:endParaRPr lang="en-US" sz="3200" i="1" dirty="0"/>
@@ -7524,7 +7534,15 @@
             <a:pPr lvl="1"/>
             <a:r>
               <a:rPr lang="en-US" sz="3200" dirty="0"/>
-              <a:t>Met all of client’s requirements</a:t>
+              <a:t>Met all </a:t>
+            </a:r>
+            <a:r>
+              <a:rPr lang="en-US" sz="3200" dirty="0" smtClean="0"/>
+              <a:t>client </a:t>
+            </a:r>
+            <a:r>
+              <a:rPr lang="en-US" sz="3200" dirty="0"/>
+              <a:t>requirements</a:t>
             </a:r>
           </a:p>
           <a:p>
@@ -7537,19 +7555,18 @@
           <a:p>
             <a:pPr lvl="1"/>
             <a:r>
+              <a:rPr lang="en-US" sz="3200" dirty="0" smtClean="0"/>
+              <a:t>Intimate understanding </a:t>
+            </a:r>
+            <a:r>
               <a:rPr lang="en-US" sz="3200" dirty="0"/>
-              <a:t>Acquired an intimate understanding of git version control</a:t>
-            </a:r>
-          </a:p>
-          <a:p>
-            <a:pPr marL="228532" lvl="1" indent="0">
-              <a:buNone/>
-            </a:pPr>
-            <a:endParaRPr lang="en-US" dirty="0"/>
-          </a:p>
-          <a:p>
-            <a:pPr lvl="1"/>
-            <a:endParaRPr lang="en-US" dirty="0"/>
+              <a:t>of git version </a:t>
+            </a:r>
+            <a:r>
+              <a:rPr lang="en-US" sz="3200" dirty="0" smtClean="0"/>
+              <a:t>control</a:t>
+            </a:r>
+            <a:endParaRPr lang="en-US" sz="3200" dirty="0"/>
           </a:p>
         </p:txBody>
       </p:sp>
@@ -7575,6 +7592,9 @@
           </a:bodyPr>
           <a:lstStyle/>
           <a:p>
+            <a:pPr marL="0" indent="0">
+              <a:buNone/>
+            </a:pPr>
             <a:r>
               <a:rPr lang="en-US" sz="3600" i="1" dirty="0"/>
               <a:t>Bad</a:t>
@@ -7590,10 +7610,9 @@
           <a:p>
             <a:pPr lvl="3"/>
             <a:r>
-              <a:rPr lang="en-US" sz="2801"/>
+              <a:rPr lang="en-US" sz="2801" dirty="0"/>
               <a:t>Burndown spikes and dives</a:t>
             </a:r>
-            <a:endParaRPr lang="en-US" sz="2801" dirty="0"/>
           </a:p>
           <a:p>
             <a:pPr lvl="1"/>
@@ -7866,7 +7885,12 @@
             <p:ph type="title"/>
           </p:nvPr>
         </p:nvSpPr>
-        <p:spPr/>
+        <p:spPr>
+          <a:xfrm>
+            <a:off x="-1" y="284176"/>
+            <a:ext cx="12188825" cy="1508760"/>
+          </a:xfrm>
+        </p:spPr>
         <p:txBody>
           <a:bodyPr>
             <a:normAutofit/>
@@ -7876,7 +7900,7 @@
             <a:pPr algn="ctr"/>
             <a:r>
               <a:rPr lang="en-US" sz="4400" dirty="0" smtClean="0"/>
-              <a:t>Overview</a:t>
+              <a:t>What is A Hotspot?</a:t>
             </a:r>
             <a:endParaRPr lang="en-US" sz="4400" dirty="0"/>
           </a:p>
@@ -7894,28 +7918,45 @@
         </p:nvSpPr>
         <p:spPr>
           <a:xfrm>
-            <a:off x="2132012" y="2057400"/>
-            <a:ext cx="8153400" cy="4167426"/>
+            <a:off x="5180012" y="2255429"/>
+            <a:ext cx="6858000" cy="4167426"/>
           </a:xfrm>
         </p:spPr>
         <p:txBody>
-          <a:bodyPr/>
-          <a:lstStyle/>
-          <a:p>
-            <a:pPr marL="0" indent="0">
-              <a:buNone/>
-            </a:pPr>
-            <a:r>
-              <a:rPr lang="en-US" sz="3200" dirty="0" smtClean="0"/>
-              <a:t>Our </a:t>
-            </a:r>
-            <a:r>
-              <a:rPr lang="en-US" sz="3200" dirty="0"/>
-              <a:t>client requested a platform that could be used to detect unstable and potentially buggy areas of code within a repository. With export capabilities, the data could also be analyzed to detect trends and to better predict troublesome code.</a:t>
-            </a:r>
-          </a:p>
-          <a:p>
-            <a:endParaRPr lang="en-US" dirty="0"/>
+          <a:bodyPr>
+            <a:normAutofit/>
+          </a:bodyPr>
+          <a:lstStyle/>
+          <a:p>
+            <a:r>
+              <a:rPr lang="en-US" sz="2800" dirty="0" smtClean="0"/>
+              <a:t>Area of instability within a codebase</a:t>
+            </a:r>
+          </a:p>
+          <a:p>
+            <a:r>
+              <a:rPr lang="en-US" sz="2800" dirty="0" smtClean="0"/>
+              <a:t>Frequently changed files, many commits</a:t>
+            </a:r>
+          </a:p>
+          <a:p>
+            <a:r>
+              <a:rPr lang="en-US" sz="2800" dirty="0" smtClean="0"/>
+              <a:t>Recently modified files, cooldown over time</a:t>
+            </a:r>
+          </a:p>
+          <a:p>
+            <a:r>
+              <a:rPr lang="en-US" sz="2800" dirty="0" smtClean="0"/>
+              <a:t>Line additions vs. Line deletions</a:t>
+            </a:r>
+          </a:p>
+          <a:p>
+            <a:r>
+              <a:rPr lang="en-US" sz="2800" dirty="0" smtClean="0"/>
+              <a:t>Bug fixing commits vs. Regular commits</a:t>
+            </a:r>
+            <a:endParaRPr lang="en-US" sz="2800" dirty="0"/>
           </a:p>
         </p:txBody>
       </p:sp>
@@ -7988,6 +8029,36 @@
           </a:p>
         </p:txBody>
       </p:sp>
+      <p:pic>
+        <p:nvPicPr>
+          <p:cNvPr id="4" name="Picture 3"/>
+          <p:cNvPicPr>
+            <a:picLocks noChangeAspect="1"/>
+          </p:cNvPicPr>
+          <p:nvPr/>
+        </p:nvPicPr>
+        <p:blipFill>
+          <a:blip r:embed="rId2" cstate="print">
+            <a:extLst>
+              <a:ext uri="{28A0092B-C50C-407E-A947-70E740481C1C}">
+                <a14:useLocalDpi xmlns:a14="http://schemas.microsoft.com/office/drawing/2010/main" val="0"/>
+              </a:ext>
+            </a:extLst>
+          </a:blip>
+          <a:stretch>
+            <a:fillRect/>
+          </a:stretch>
+        </p:blipFill>
+        <p:spPr>
+          <a:xfrm>
+            <a:off x="340897" y="2068286"/>
+            <a:ext cx="4722223" cy="4011597"/>
+          </a:xfrm>
+          <a:prstGeom prst="rect">
+            <a:avLst/>
+          </a:prstGeom>
+        </p:spPr>
+      </p:pic>
     </p:spTree>
     <p:extLst>
       <p:ext uri="{BB962C8B-B14F-4D97-AF65-F5344CB8AC3E}">
@@ -8040,7 +8111,12 @@
             <p:ph type="title"/>
           </p:nvPr>
         </p:nvSpPr>
-        <p:spPr/>
+        <p:spPr>
+          <a:xfrm>
+            <a:off x="-1" y="284176"/>
+            <a:ext cx="12188825" cy="1508760"/>
+          </a:xfrm>
+        </p:spPr>
         <p:txBody>
           <a:bodyPr>
             <a:normAutofit/>
@@ -8050,14 +8126,10 @@
             <a:pPr algn="ctr"/>
             <a:r>
               <a:rPr lang="en-US" sz="4400" dirty="0"/>
-              <a:t>About </a:t>
-            </a:r>
-            <a:r>
-              <a:rPr lang="en-US" sz="4400"/>
-              <a:t>our </a:t>
-            </a:r>
-            <a:r>
-              <a:rPr lang="en-US" sz="4400" smtClean="0"/>
+              <a:t>About our </a:t>
+            </a:r>
+            <a:r>
+              <a:rPr lang="en-US" sz="4400" dirty="0" smtClean="0"/>
               <a:t>project</a:t>
             </a:r>
             <a:endParaRPr lang="en-US" sz="4400" dirty="0"/>
@@ -8095,7 +8167,9 @@
             </a:r>
           </a:p>
           <a:p>
-            <a:pPr marL="52388" indent="0"/>
+            <a:pPr marL="52388" indent="0">
+              <a:buNone/>
+            </a:pPr>
             <a:r>
               <a:rPr lang="en-US" sz="2400" dirty="0"/>
               <a:t>Developers</a:t>
@@ -8154,11 +8228,7 @@
             <a:pPr lvl="1"/>
             <a:r>
               <a:rPr lang="en-US" sz="2400" dirty="0" smtClean="0"/>
-              <a:t>Allows contributors to grow and develop based on the history of their </a:t>
-            </a:r>
-            <a:r>
-              <a:rPr lang="en-US" sz="2400" dirty="0" smtClean="0"/>
-              <a:t>contributions</a:t>
+              <a:t>Allows contributors to grow and develop based on the history of their contributions</a:t>
             </a:r>
           </a:p>
         </p:txBody>
@@ -8286,8 +8356,8 @@
         </p:nvSpPr>
         <p:spPr>
           <a:xfrm>
-            <a:off x="1217612" y="35611"/>
-            <a:ext cx="9781532" cy="1508760"/>
+            <a:off x="-1" y="284176"/>
+            <a:ext cx="12188825" cy="1508760"/>
           </a:xfrm>
         </p:spPr>
         <p:txBody>
@@ -8296,9 +8366,110 @@
           <a:p>
             <a:pPr algn="ctr"/>
             <a:r>
-              <a:rPr lang="en-US" dirty="0"/>
-              <a:t>Project Architecture</a:t>
-            </a:r>
+              <a:rPr lang="en-US" dirty="0" smtClean="0"/>
+              <a:t>Project Requirements</a:t>
+            </a:r>
+            <a:endParaRPr lang="en-US" dirty="0"/>
+          </a:p>
+        </p:txBody>
+      </p:sp>
+      <p:sp>
+        <p:nvSpPr>
+          <p:cNvPr id="3" name="Content Placeholder 2"/>
+          <p:cNvSpPr>
+            <a:spLocks noGrp="1"/>
+          </p:cNvSpPr>
+          <p:nvPr>
+            <p:ph idx="1"/>
+          </p:nvPr>
+        </p:nvSpPr>
+        <p:spPr>
+          <a:xfrm>
+            <a:off x="2513011" y="2514600"/>
+            <a:ext cx="7467601" cy="3703320"/>
+          </a:xfrm>
+        </p:spPr>
+        <p:txBody>
+          <a:bodyPr>
+            <a:normAutofit/>
+          </a:bodyPr>
+          <a:lstStyle/>
+          <a:p>
+            <a:pPr lvl="1">
+              <a:buFont typeface="Arial" panose="020B0604020202020204" pitchFamily="34" charset="0"/>
+              <a:buChar char="•"/>
+            </a:pPr>
+            <a:r>
+              <a:rPr lang="en-US" sz="4000" dirty="0"/>
+              <a:t> </a:t>
+            </a:r>
+            <a:r>
+              <a:rPr lang="en-US" sz="4000" dirty="0" smtClean="0"/>
+              <a:t>No client-required platform </a:t>
+            </a:r>
+          </a:p>
+          <a:p>
+            <a:pPr lvl="1">
+              <a:buFont typeface="Arial" panose="020B0604020202020204" pitchFamily="34" charset="0"/>
+              <a:buChar char="•"/>
+            </a:pPr>
+            <a:r>
+              <a:rPr lang="en-US" sz="4000" dirty="0"/>
+              <a:t> </a:t>
+            </a:r>
+            <a:r>
+              <a:rPr lang="en-US" sz="4000" dirty="0" smtClean="0"/>
+              <a:t>Semi-Agile approach</a:t>
+            </a:r>
+          </a:p>
+          <a:p>
+            <a:pPr lvl="3">
+              <a:buFont typeface="Arial" panose="020B0604020202020204" pitchFamily="34" charset="0"/>
+              <a:buChar char="•"/>
+            </a:pPr>
+            <a:r>
+              <a:rPr lang="en-US" sz="3601" dirty="0" smtClean="0"/>
+              <a:t>Behavior Driven Development</a:t>
+            </a:r>
+          </a:p>
+          <a:p>
+            <a:pPr lvl="1">
+              <a:buFont typeface="Arial" panose="020B0604020202020204" pitchFamily="34" charset="0"/>
+              <a:buChar char="•"/>
+            </a:pPr>
+            <a:r>
+              <a:rPr lang="en-US" sz="4000" dirty="0" smtClean="0"/>
+              <a:t> </a:t>
+            </a:r>
+            <a:r>
+              <a:rPr lang="en-US" sz="4000" dirty="0"/>
+              <a:t>Continuous access to </a:t>
+            </a:r>
+            <a:r>
+              <a:rPr lang="en-US" sz="4000" dirty="0" smtClean="0"/>
+              <a:t>product</a:t>
+            </a:r>
+          </a:p>
+          <a:p>
+            <a:pPr lvl="1">
+              <a:buFont typeface="Arial" panose="020B0604020202020204" pitchFamily="34" charset="0"/>
+              <a:buChar char="•"/>
+            </a:pPr>
+            <a:r>
+              <a:rPr lang="en-US" sz="4000" dirty="0" smtClean="0"/>
+              <a:t> Client validation </a:t>
+            </a:r>
+            <a:r>
+              <a:rPr lang="en-US" sz="4000" dirty="0"/>
+              <a:t>every sprint  </a:t>
+            </a:r>
+          </a:p>
+          <a:p>
+            <a:pPr lvl="1">
+              <a:buFont typeface="Arial" panose="020B0604020202020204" pitchFamily="34" charset="0"/>
+              <a:buChar char="•"/>
+            </a:pPr>
+            <a:endParaRPr lang="en-US" dirty="0"/>
           </a:p>
         </p:txBody>
       </p:sp>
@@ -8371,40 +8542,10 @@
           </a:p>
         </p:txBody>
       </p:sp>
-      <p:pic>
-        <p:nvPicPr>
-          <p:cNvPr id="21" name="Picture 20"/>
-          <p:cNvPicPr>
-            <a:picLocks noChangeAspect="1"/>
-          </p:cNvPicPr>
-          <p:nvPr/>
-        </p:nvPicPr>
-        <p:blipFill>
-          <a:blip r:embed="rId2">
-            <a:extLst>
-              <a:ext uri="{28A0092B-C50C-407E-A947-70E740481C1C}">
-                <a14:useLocalDpi xmlns:a14="http://schemas.microsoft.com/office/drawing/2010/main" val="0"/>
-              </a:ext>
-            </a:extLst>
-          </a:blip>
-          <a:stretch>
-            <a:fillRect/>
-          </a:stretch>
-        </p:blipFill>
-        <p:spPr>
-          <a:xfrm>
-            <a:off x="1762632" y="1238990"/>
-            <a:ext cx="7628741" cy="5366427"/>
-          </a:xfrm>
-          <a:prstGeom prst="rect">
-            <a:avLst/>
-          </a:prstGeom>
-        </p:spPr>
-      </p:pic>
     </p:spTree>
     <p:extLst>
       <p:ext uri="{BB962C8B-B14F-4D97-AF65-F5344CB8AC3E}">
-        <p14:creationId xmlns:p14="http://schemas.microsoft.com/office/powerpoint/2010/main" val="12138330"/>
+        <p14:creationId xmlns:p14="http://schemas.microsoft.com/office/powerpoint/2010/main" val="709433349"/>
       </p:ext>
     </p:extLst>
   </p:cSld>
@@ -8453,84 +8594,21 @@
             <p:ph type="title"/>
           </p:nvPr>
         </p:nvSpPr>
-        <p:spPr/>
-        <p:txBody>
-          <a:bodyPr/>
-          <a:lstStyle/>
-          <a:p>
-            <a:pPr algn="ctr"/>
-            <a:r>
-              <a:rPr lang="en-US" dirty="0"/>
-              <a:t>Testing and Requirements Met</a:t>
-            </a:r>
-          </a:p>
-        </p:txBody>
-      </p:sp>
-      <p:sp>
-        <p:nvSpPr>
-          <p:cNvPr id="3" name="Content Placeholder 2"/>
-          <p:cNvSpPr>
-            <a:spLocks noGrp="1"/>
-          </p:cNvSpPr>
-          <p:nvPr>
-            <p:ph idx="1"/>
-          </p:nvPr>
-        </p:nvSpPr>
         <p:spPr>
           <a:xfrm>
-            <a:off x="1201953" y="2011680"/>
-            <a:ext cx="9782185" cy="4206240"/>
+            <a:off x="-1" y="35611"/>
+            <a:ext cx="12188825" cy="1508760"/>
           </a:xfrm>
         </p:spPr>
         <p:txBody>
           <a:bodyPr/>
           <a:lstStyle/>
           <a:p>
-            <a:pPr lvl="1">
-              <a:buFont typeface="Arial" panose="020B0604020202020204" pitchFamily="34" charset="0"/>
-              <a:buChar char="•"/>
-            </a:pPr>
-            <a:r>
-              <a:rPr lang="en-US" sz="4000" dirty="0"/>
-              <a:t> No environment specific requirement </a:t>
-            </a:r>
-          </a:p>
-          <a:p>
-            <a:pPr lvl="1">
-              <a:buFont typeface="Arial" panose="020B0604020202020204" pitchFamily="34" charset="0"/>
-              <a:buChar char="•"/>
-            </a:pPr>
-            <a:r>
-              <a:rPr lang="en-US" sz="4000" dirty="0"/>
-              <a:t> Continuous access to product</a:t>
-            </a:r>
-          </a:p>
-          <a:p>
-            <a:pPr lvl="1">
-              <a:buFont typeface="Arial" panose="020B0604020202020204" pitchFamily="34" charset="0"/>
-              <a:buChar char="•"/>
-            </a:pPr>
-            <a:r>
-              <a:rPr lang="en-US" sz="4000" dirty="0"/>
-              <a:t> Behavior driven development </a:t>
-            </a:r>
-          </a:p>
-          <a:p>
-            <a:pPr lvl="1">
-              <a:buFont typeface="Arial" panose="020B0604020202020204" pitchFamily="34" charset="0"/>
-              <a:buChar char="•"/>
-            </a:pPr>
-            <a:r>
-              <a:rPr lang="en-US" sz="4000" dirty="0"/>
-              <a:t> Validation every sprint  </a:t>
-            </a:r>
-          </a:p>
-          <a:p>
-            <a:pPr lvl="1">
-              <a:buFont typeface="Arial" panose="020B0604020202020204" pitchFamily="34" charset="0"/>
-              <a:buChar char="•"/>
-            </a:pPr>
-            <a:endParaRPr lang="en-US" dirty="0"/>
+            <a:pPr algn="ctr"/>
+            <a:r>
+              <a:rPr lang="en-US" dirty="0"/>
+              <a:t>Project Architecture</a:t>
+            </a:r>
           </a:p>
         </p:txBody>
       </p:sp>
@@ -8603,10 +8681,159 @@
           </a:p>
         </p:txBody>
       </p:sp>
+      <p:pic>
+        <p:nvPicPr>
+          <p:cNvPr id="21" name="Picture 20"/>
+          <p:cNvPicPr>
+            <a:picLocks noChangeAspect="1"/>
+          </p:cNvPicPr>
+          <p:nvPr/>
+        </p:nvPicPr>
+        <p:blipFill>
+          <a:blip r:embed="rId2">
+            <a:extLst>
+              <a:ext uri="{28A0092B-C50C-407E-A947-70E740481C1C}">
+                <a14:useLocalDpi xmlns:a14="http://schemas.microsoft.com/office/drawing/2010/main" val="0"/>
+              </a:ext>
+            </a:extLst>
+          </a:blip>
+          <a:stretch>
+            <a:fillRect/>
+          </a:stretch>
+        </p:blipFill>
+        <p:spPr>
+          <a:xfrm>
+            <a:off x="1762632" y="1238990"/>
+            <a:ext cx="7628741" cy="5366427"/>
+          </a:xfrm>
+          <a:prstGeom prst="rect">
+            <a:avLst/>
+          </a:prstGeom>
+        </p:spPr>
+      </p:pic>
+      <p:pic>
+        <p:nvPicPr>
+          <p:cNvPr id="7" name="Picture 6"/>
+          <p:cNvPicPr>
+            <a:picLocks noChangeAspect="1"/>
+          </p:cNvPicPr>
+          <p:nvPr/>
+        </p:nvPicPr>
+        <p:blipFill>
+          <a:blip r:embed="rId3">
+            <a:extLst>
+              <a:ext uri="{28A0092B-C50C-407E-A947-70E740481C1C}">
+                <a14:useLocalDpi xmlns:a14="http://schemas.microsoft.com/office/drawing/2010/main" val="0"/>
+              </a:ext>
+            </a:extLst>
+          </a:blip>
+          <a:stretch>
+            <a:fillRect/>
+          </a:stretch>
+        </p:blipFill>
+        <p:spPr>
+          <a:xfrm>
+            <a:off x="9612827" y="2135426"/>
+            <a:ext cx="2460841" cy="725175"/>
+          </a:xfrm>
+          <a:prstGeom prst="rect">
+            <a:avLst/>
+          </a:prstGeom>
+        </p:spPr>
+      </p:pic>
+      <p:pic>
+        <p:nvPicPr>
+          <p:cNvPr id="8" name="Picture 7"/>
+          <p:cNvPicPr>
+            <a:picLocks noChangeAspect="1"/>
+          </p:cNvPicPr>
+          <p:nvPr/>
+        </p:nvPicPr>
+        <p:blipFill rotWithShape="1">
+          <a:blip r:embed="rId4">
+            <a:extLst>
+              <a:ext uri="{28A0092B-C50C-407E-A947-70E740481C1C}">
+                <a14:useLocalDpi xmlns:a14="http://schemas.microsoft.com/office/drawing/2010/main" val="0"/>
+              </a:ext>
+            </a:extLst>
+          </a:blip>
+          <a:srcRect l="4394" r="10035" b="1890"/>
+          <a:stretch/>
+        </p:blipFill>
+        <p:spPr>
+          <a:xfrm>
+            <a:off x="9713465" y="3372135"/>
+            <a:ext cx="2175215" cy="685800"/>
+          </a:xfrm>
+          <a:prstGeom prst="rect">
+            <a:avLst/>
+          </a:prstGeom>
+        </p:spPr>
+      </p:pic>
+      <p:pic>
+        <p:nvPicPr>
+          <p:cNvPr id="9" name="Picture 8"/>
+          <p:cNvPicPr>
+            <a:picLocks noChangeAspect="1"/>
+          </p:cNvPicPr>
+          <p:nvPr/>
+        </p:nvPicPr>
+        <p:blipFill>
+          <a:blip r:embed="rId5">
+            <a:extLst>
+              <a:ext uri="{28A0092B-C50C-407E-A947-70E740481C1C}">
+                <a14:useLocalDpi xmlns:a14="http://schemas.microsoft.com/office/drawing/2010/main" val="0"/>
+              </a:ext>
+            </a:extLst>
+          </a:blip>
+          <a:stretch>
+            <a:fillRect/>
+          </a:stretch>
+        </p:blipFill>
+        <p:spPr>
+          <a:xfrm>
+            <a:off x="9731898" y="4656602"/>
+            <a:ext cx="2138350" cy="568919"/>
+          </a:xfrm>
+          <a:prstGeom prst="rect">
+            <a:avLst/>
+          </a:prstGeom>
+        </p:spPr>
+      </p:pic>
+      <p:pic>
+        <p:nvPicPr>
+          <p:cNvPr id="10" name="Picture 9"/>
+          <p:cNvPicPr>
+            <a:picLocks noChangeAspect="1"/>
+          </p:cNvPicPr>
+          <p:nvPr/>
+        </p:nvPicPr>
+        <p:blipFill>
+          <a:blip r:embed="rId6">
+            <a:extLst>
+              <a:ext uri="{28A0092B-C50C-407E-A947-70E740481C1C}">
+                <a14:useLocalDpi xmlns:a14="http://schemas.microsoft.com/office/drawing/2010/main" val="0"/>
+              </a:ext>
+            </a:extLst>
+          </a:blip>
+          <a:stretch>
+            <a:fillRect/>
+          </a:stretch>
+        </p:blipFill>
+        <p:spPr>
+          <a:xfrm>
+            <a:off x="9760856" y="5737055"/>
+            <a:ext cx="2164784" cy="699615"/>
+          </a:xfrm>
+          <a:prstGeom prst="rect">
+            <a:avLst/>
+          </a:prstGeom>
+        </p:spPr>
+      </p:pic>
     </p:spTree>
     <p:extLst>
       <p:ext uri="{BB962C8B-B14F-4D97-AF65-F5344CB8AC3E}">
-        <p14:creationId xmlns:p14="http://schemas.microsoft.com/office/powerpoint/2010/main" val="709433349"/>
+        <p14:creationId xmlns:p14="http://schemas.microsoft.com/office/powerpoint/2010/main" val="12138330"/>
       </p:ext>
     </p:extLst>
   </p:cSld>
@@ -8655,15 +8882,22 @@
             <p:ph type="title"/>
           </p:nvPr>
         </p:nvSpPr>
-        <p:spPr/>
+        <p:spPr>
+          <a:xfrm>
+            <a:off x="-1" y="284176"/>
+            <a:ext cx="12188825" cy="1508760"/>
+          </a:xfrm>
+        </p:spPr>
         <p:txBody>
           <a:bodyPr/>
           <a:lstStyle/>
           <a:p>
-            <a:r>
-              <a:rPr lang="en-US" dirty="0"/>
-              <a:t>Capabilities and Technologies</a:t>
-            </a:r>
+            <a:pPr algn="ctr"/>
+            <a:r>
+              <a:rPr lang="en-US" dirty="0" smtClean="0"/>
+              <a:t>Project Capabilities</a:t>
+            </a:r>
+            <a:endParaRPr lang="en-US" dirty="0"/>
           </a:p>
         </p:txBody>
       </p:sp>
@@ -8735,155 +8969,6 @@
           </a:p>
         </p:txBody>
       </p:sp>
-      <p:pic>
-        <p:nvPicPr>
-          <p:cNvPr id="8" name="Picture 7"/>
-          <p:cNvPicPr>
-            <a:picLocks noChangeAspect="1"/>
-          </p:cNvPicPr>
-          <p:nvPr/>
-        </p:nvPicPr>
-        <p:blipFill>
-          <a:blip r:embed="rId2">
-            <a:extLst>
-              <a:ext uri="{28A0092B-C50C-407E-A947-70E740481C1C}">
-                <a14:useLocalDpi xmlns:a14="http://schemas.microsoft.com/office/drawing/2010/main" val="0"/>
-              </a:ext>
-            </a:extLst>
-          </a:blip>
-          <a:stretch>
-            <a:fillRect/>
-          </a:stretch>
-        </p:blipFill>
-        <p:spPr>
-          <a:xfrm>
-            <a:off x="813020" y="5373564"/>
-            <a:ext cx="2460841" cy="725175"/>
-          </a:xfrm>
-          <a:prstGeom prst="rect">
-            <a:avLst/>
-          </a:prstGeom>
-        </p:spPr>
-      </p:pic>
-      <p:pic>
-        <p:nvPicPr>
-          <p:cNvPr id="9" name="Picture 8"/>
-          <p:cNvPicPr>
-            <a:picLocks noChangeAspect="1"/>
-          </p:cNvPicPr>
-          <p:nvPr/>
-        </p:nvPicPr>
-        <p:blipFill rotWithShape="1">
-          <a:blip r:embed="rId3">
-            <a:extLst>
-              <a:ext uri="{28A0092B-C50C-407E-A947-70E740481C1C}">
-                <a14:useLocalDpi xmlns:a14="http://schemas.microsoft.com/office/drawing/2010/main" val="0"/>
-              </a:ext>
-            </a:extLst>
-          </a:blip>
-          <a:srcRect l="4394" r="10035" b="1890"/>
-          <a:stretch/>
-        </p:blipFill>
-        <p:spPr>
-          <a:xfrm>
-            <a:off x="3901329" y="5427959"/>
-            <a:ext cx="2175215" cy="685800"/>
-          </a:xfrm>
-          <a:prstGeom prst="rect">
-            <a:avLst/>
-          </a:prstGeom>
-        </p:spPr>
-      </p:pic>
-      <p:pic>
-        <p:nvPicPr>
-          <p:cNvPr id="10" name="Picture 9"/>
-          <p:cNvPicPr>
-            <a:picLocks noChangeAspect="1"/>
-          </p:cNvPicPr>
-          <p:nvPr/>
-        </p:nvPicPr>
-        <p:blipFill>
-          <a:blip r:embed="rId4">
-            <a:extLst>
-              <a:ext uri="{28A0092B-C50C-407E-A947-70E740481C1C}">
-                <a14:useLocalDpi xmlns:a14="http://schemas.microsoft.com/office/drawing/2010/main" val="0"/>
-              </a:ext>
-            </a:extLst>
-          </a:blip>
-          <a:stretch>
-            <a:fillRect/>
-          </a:stretch>
-        </p:blipFill>
-        <p:spPr>
-          <a:xfrm>
-            <a:off x="6704012" y="5486399"/>
-            <a:ext cx="2138350" cy="568919"/>
-          </a:xfrm>
-          <a:prstGeom prst="rect">
-            <a:avLst/>
-          </a:prstGeom>
-        </p:spPr>
-      </p:pic>
-      <p:pic>
-        <p:nvPicPr>
-          <p:cNvPr id="11" name="Picture 10"/>
-          <p:cNvPicPr>
-            <a:picLocks noChangeAspect="1"/>
-          </p:cNvPicPr>
-          <p:nvPr/>
-        </p:nvPicPr>
-        <p:blipFill>
-          <a:blip r:embed="rId5">
-            <a:extLst>
-              <a:ext uri="{28A0092B-C50C-407E-A947-70E740481C1C}">
-                <a14:useLocalDpi xmlns:a14="http://schemas.microsoft.com/office/drawing/2010/main" val="0"/>
-              </a:ext>
-            </a:extLst>
-          </a:blip>
-          <a:stretch>
-            <a:fillRect/>
-          </a:stretch>
-        </p:blipFill>
-        <p:spPr>
-          <a:xfrm>
-            <a:off x="9437385" y="5427959"/>
-            <a:ext cx="2164784" cy="699615"/>
-          </a:xfrm>
-          <a:prstGeom prst="rect">
-            <a:avLst/>
-          </a:prstGeom>
-        </p:spPr>
-      </p:pic>
-      <p:sp>
-        <p:nvSpPr>
-          <p:cNvPr id="4" name="TextBox 3"/>
-          <p:cNvSpPr txBox="1"/>
-          <p:nvPr/>
-        </p:nvSpPr>
-        <p:spPr>
-          <a:xfrm>
-            <a:off x="912812" y="5029200"/>
-            <a:ext cx="10084049" cy="461665"/>
-          </a:xfrm>
-          <a:prstGeom prst="rect">
-            <a:avLst/>
-          </a:prstGeom>
-          <a:noFill/>
-        </p:spPr>
-        <p:txBody>
-          <a:bodyPr wrap="square" rtlCol="0">
-            <a:spAutoFit/>
-          </a:bodyPr>
-          <a:lstStyle/>
-          <a:p>
-            <a:pPr algn="ctr"/>
-            <a:r>
-              <a:rPr lang="en-US" dirty="0"/>
-              <a:t>Technologies</a:t>
-            </a:r>
-          </a:p>
-        </p:txBody>
-      </p:sp>
       <p:sp>
         <p:nvSpPr>
           <p:cNvPr id="12" name="TextBox 11"/>
@@ -8892,7 +8977,7 @@
         </p:nvSpPr>
         <p:spPr>
           <a:xfrm>
-            <a:off x="1979612" y="1962985"/>
+            <a:off x="2055812" y="2438400"/>
             <a:ext cx="8379351" cy="2554545"/>
           </a:xfrm>
           <a:prstGeom prst="rect">
@@ -8922,7 +9007,15 @@
             </a:pPr>
             <a:r>
               <a:rPr lang="en-US" sz="4000" dirty="0"/>
-              <a:t>Run metrics on a cloned repository</a:t>
+              <a:t>Run metrics </a:t>
+            </a:r>
+            <a:r>
+              <a:rPr lang="en-US" sz="4000" dirty="0" smtClean="0"/>
+              <a:t>on </a:t>
+            </a:r>
+            <a:r>
+              <a:rPr lang="en-US" sz="4000" dirty="0"/>
+              <a:t>cloned repository</a:t>
             </a:r>
           </a:p>
           <a:p>
@@ -8932,8 +9025,13 @@
             </a:pPr>
             <a:r>
               <a:rPr lang="en-US" sz="4000" dirty="0"/>
-              <a:t>Create graph of metrics.</a:t>
-            </a:r>
+              <a:t>Create graph of </a:t>
+            </a:r>
+            <a:r>
+              <a:rPr lang="en-US" sz="4000" dirty="0" smtClean="0"/>
+              <a:t>metrics</a:t>
+            </a:r>
+            <a:endParaRPr lang="en-US" sz="4000" dirty="0"/>
           </a:p>
           <a:p>
             <a:pPr marL="342900" indent="-342900">
@@ -8942,7 +9040,15 @@
             </a:pPr>
             <a:r>
               <a:rPr lang="en-US" sz="4000" dirty="0"/>
-              <a:t>Export metrics to a CSV file</a:t>
+              <a:t>Export </a:t>
+            </a:r>
+            <a:r>
+              <a:rPr lang="en-US" sz="4000" dirty="0" smtClean="0"/>
+              <a:t>data to </a:t>
+            </a:r>
+            <a:r>
+              <a:rPr lang="en-US" sz="4000" dirty="0"/>
+              <a:t>a CSV file</a:t>
             </a:r>
           </a:p>
         </p:txBody>
@@ -9145,16 +9251,22 @@
             <p:ph type="title"/>
           </p:nvPr>
         </p:nvSpPr>
-        <p:spPr/>
+        <p:spPr>
+          <a:xfrm>
+            <a:off x="-1" y="284176"/>
+            <a:ext cx="12188825" cy="1508760"/>
+          </a:xfrm>
+        </p:spPr>
         <p:txBody>
           <a:bodyPr/>
           <a:lstStyle/>
           <a:p>
             <a:pPr algn="ctr"/>
             <a:r>
-              <a:rPr lang="en-US" dirty="0"/>
-              <a:t>Team Burndown/ Velocity Chart</a:t>
-            </a:r>
+              <a:rPr lang="en-US" dirty="0" smtClean="0"/>
+              <a:t>Team Velocity</a:t>
+            </a:r>
+            <a:endParaRPr lang="en-US" dirty="0"/>
           </a:p>
         </p:txBody>
       </p:sp>
@@ -9304,7 +9416,12 @@
             <p:ph type="title"/>
           </p:nvPr>
         </p:nvSpPr>
-        <p:spPr/>
+        <p:spPr>
+          <a:xfrm>
+            <a:off x="-1" y="284176"/>
+            <a:ext cx="12188825" cy="1508760"/>
+          </a:xfrm>
+        </p:spPr>
         <p:txBody>
           <a:bodyPr/>
           <a:lstStyle/>
@@ -9312,8 +9429,13 @@
             <a:pPr algn="ctr"/>
             <a:r>
               <a:rPr lang="en-US" dirty="0"/>
-              <a:t>Team Burndown/ Velocity Chart</a:t>
-            </a:r>
+              <a:t>Team </a:t>
+            </a:r>
+            <a:r>
+              <a:rPr lang="en-US" dirty="0" smtClean="0"/>
+              <a:t>Burndown</a:t>
+            </a:r>
+            <a:endParaRPr lang="en-US" dirty="0"/>
           </a:p>
         </p:txBody>
       </p:sp>

</xml_diff>

<commit_message>
add names to slides and formatted everything per groups will
</commit_message>
<xml_diff>
--- a/Documentation/Presentations/CS499 Final Presentation.pptx
+++ b/Documentation/Presentations/CS499 Final Presentation.pptx
@@ -15,11 +15,11 @@
     <p:sldId id="285" r:id="rId4"/>
     <p:sldId id="280" r:id="rId5"/>
     <p:sldId id="284" r:id="rId6"/>
-    <p:sldId id="286" r:id="rId7"/>
-    <p:sldId id="287" r:id="rId8"/>
-    <p:sldId id="266" r:id="rId9"/>
-    <p:sldId id="282" r:id="rId10"/>
-    <p:sldId id="281" r:id="rId11"/>
+    <p:sldId id="282" r:id="rId7"/>
+    <p:sldId id="266" r:id="rId8"/>
+    <p:sldId id="281" r:id="rId9"/>
+    <p:sldId id="286" r:id="rId10"/>
+    <p:sldId id="287" r:id="rId11"/>
     <p:sldId id="270" r:id="rId12"/>
     <p:sldId id="283" r:id="rId13"/>
     <p:sldId id="271" r:id="rId14"/>
@@ -211,7 +211,7 @@
 </file>
 
 <file path=ppt/charts/chart1.xml><?xml version="1.0" encoding="utf-8"?>
-<c:chartSpace xmlns:c="http://schemas.openxmlformats.org/drawingml/2006/chart" xmlns:a="http://schemas.openxmlformats.org/drawingml/2006/main" xmlns:r="http://schemas.openxmlformats.org/officeDocument/2006/relationships">
+<c:chartSpace xmlns:c="http://schemas.openxmlformats.org/drawingml/2006/chart" xmlns:a="http://schemas.openxmlformats.org/drawingml/2006/main" xmlns:r="http://schemas.openxmlformats.org/officeDocument/2006/relationships" xmlns:c16r2="http://schemas.microsoft.com/office/drawing/2015/06/chart">
   <c:date1904 val="0"/>
   <c:lang val="en-US"/>
   <c:roundedCorners val="0"/>
@@ -403,7 +403,7 @@
               </c:numCache>
             </c:numRef>
           </c:val>
-          <c:extLst xmlns:c16r2="http://schemas.microsoft.com/office/drawing/2015/06/chart">
+          <c:extLst>
             <c:ext xmlns:c16="http://schemas.microsoft.com/office/drawing/2014/chart" uri="{C3380CC4-5D6E-409C-BE32-E72D297353CC}">
               <c16:uniqueId val="{00000000-C998-45E2-B113-3A76F2ADAB4D}"/>
             </c:ext>
@@ -575,10 +575,10 @@
                   <c:v>16</c:v>
                 </c:pt>
                 <c:pt idx="19">
-                  <c:v>0</c:v>
+                  <c:v>6</c:v>
                 </c:pt>
                 <c:pt idx="20">
-                  <c:v>0</c:v>
+                  <c:v>18</c:v>
                 </c:pt>
                 <c:pt idx="21">
                   <c:v>0</c:v>
@@ -589,7 +589,7 @@
               </c:numCache>
             </c:numRef>
           </c:val>
-          <c:extLst xmlns:c16r2="http://schemas.microsoft.com/office/drawing/2015/06/chart">
+          <c:extLst>
             <c:ext xmlns:c16="http://schemas.microsoft.com/office/drawing/2014/chart" uri="{C3380CC4-5D6E-409C-BE32-E72D297353CC}">
               <c16:uniqueId val="{00000001-C998-45E2-B113-3A76F2ADAB4D}"/>
             </c:ext>
@@ -651,7 +651,7 @@
                   <c:v>11.455</c:v>
                 </c:pt>
                 <c:pt idx="2">
-                  <c:v>13.936666666666669</c:v>
+                  <c:v>13.936666666666667</c:v>
                 </c:pt>
                 <c:pt idx="3">
                   <c:v>13.14</c:v>
@@ -660,16 +660,16 @@
                   <c:v>12.612</c:v>
                 </c:pt>
                 <c:pt idx="5">
-                  <c:v>12.521166666666669</c:v>
+                  <c:v>12.521166666666668</c:v>
                 </c:pt>
                 <c:pt idx="6">
-                  <c:v>14.73285714285714</c:v>
+                  <c:v>14.732857142857144</c:v>
                 </c:pt>
                 <c:pt idx="7">
                   <c:v>16.391249999999999</c:v>
                 </c:pt>
                 <c:pt idx="8">
-                  <c:v>17.01444444444445</c:v>
+                  <c:v>17.014444444444443</c:v>
                 </c:pt>
                 <c:pt idx="9">
                   <c:v>16.312999999999999</c:v>
@@ -678,13 +678,13 @@
                   <c:v>16.239090909090908</c:v>
                 </c:pt>
                 <c:pt idx="11">
-                  <c:v>16.84416666666667</c:v>
+                  <c:v>16.844166666666666</c:v>
                 </c:pt>
                 <c:pt idx="12">
-                  <c:v>17.317692307692312</c:v>
+                  <c:v>17.317692307692308</c:v>
                 </c:pt>
                 <c:pt idx="13">
-                  <c:v>16.937857142857151</c:v>
+                  <c:v>16.937857142857144</c:v>
                 </c:pt>
                 <c:pt idx="14">
                   <c:v>17.742000000000001</c:v>
@@ -699,25 +699,25 @@
                   <c:v>17.562777777777779</c:v>
                 </c:pt>
                 <c:pt idx="18">
-                  <c:v>17.480526315789469</c:v>
+                  <c:v>17.480526315789472</c:v>
                 </c:pt>
                 <c:pt idx="19">
-                  <c:v>16.6065</c:v>
+                  <c:v>16.906500000000001</c:v>
                 </c:pt>
                 <c:pt idx="20">
-                  <c:v>15.815714285714289</c:v>
+                  <c:v>16.958571428571428</c:v>
                 </c:pt>
                 <c:pt idx="21">
-                  <c:v>15.096818181818181</c:v>
+                  <c:v>16.187727272727273</c:v>
                 </c:pt>
                 <c:pt idx="22">
-                  <c:v>14.440434782608699</c:v>
+                  <c:v>15.48391304347826</c:v>
                 </c:pt>
               </c:numCache>
             </c:numRef>
           </c:val>
           <c:smooth val="0"/>
-          <c:extLst xmlns:c16r2="http://schemas.microsoft.com/office/drawing/2015/06/chart">
+          <c:extLst>
             <c:ext xmlns:c16="http://schemas.microsoft.com/office/drawing/2014/chart" uri="{C3380CC4-5D6E-409C-BE32-E72D297353CC}">
               <c16:uniqueId val="{00000002-C998-45E2-B113-3A76F2ADAB4D}"/>
             </c:ext>
@@ -1027,7 +1027,7 @@
 </file>
 
 <file path=ppt/charts/chart2.xml><?xml version="1.0" encoding="utf-8"?>
-<c:chartSpace xmlns:c="http://schemas.openxmlformats.org/drawingml/2006/chart" xmlns:a="http://schemas.openxmlformats.org/drawingml/2006/main" xmlns:r="http://schemas.openxmlformats.org/officeDocument/2006/relationships">
+<c:chartSpace xmlns:c="http://schemas.openxmlformats.org/drawingml/2006/chart" xmlns:a="http://schemas.openxmlformats.org/drawingml/2006/main" xmlns:r="http://schemas.openxmlformats.org/officeDocument/2006/relationships" xmlns:c16r2="http://schemas.microsoft.com/office/drawing/2015/06/chart">
   <c:date1904 val="0"/>
   <c:lang val="en-US"/>
   <c:roundedCorners val="0"/>
@@ -1048,11 +1048,11 @@
           <a:p>
             <a:pPr>
               <a:defRPr sz="1400" b="0" i="0" u="none" strike="noStrike" kern="1200" spc="0" baseline="0">
+                <a:ln w="3175">
+                  <a:noFill/>
+                </a:ln>
                 <a:solidFill>
-                  <a:schemeClr val="tx1">
-                    <a:lumMod val="65000"/>
-                    <a:lumOff val="35000"/>
-                  </a:schemeClr>
+                  <a:schemeClr val="tx1"/>
                 </a:solidFill>
                 <a:latin typeface="+mn-lt"/>
                 <a:ea typeface="+mn-ea"/>
@@ -1081,11 +1081,11 @@
         <a:p>
           <a:pPr>
             <a:defRPr sz="1400" b="0" i="0" u="none" strike="noStrike" kern="1200" spc="0" baseline="0">
+              <a:ln w="3175">
+                <a:noFill/>
+              </a:ln>
               <a:solidFill>
-                <a:schemeClr val="tx1">
-                  <a:lumMod val="65000"/>
-                  <a:lumOff val="35000"/>
-                </a:schemeClr>
+                <a:schemeClr val="tx1"/>
               </a:solidFill>
               <a:latin typeface="+mn-lt"/>
               <a:ea typeface="+mn-ea"/>
@@ -1121,7 +1121,7 @@
               <c:strCache>
                 <c:ptCount val="1"/>
                 <c:pt idx="0">
-                  <c:v>Actual</c:v>
+                  <c:v>Actual Estimated</c:v>
                 </c:pt>
               </c:strCache>
             </c:strRef>
@@ -1147,18 +1147,16 @@
               <a:effectLst/>
             </c:spPr>
             <c:txPr>
-              <a:bodyPr rot="0" spcFirstLastPara="1" vertOverflow="ellipsis" vert="horz" wrap="square" lIns="38100" tIns="19050" rIns="38100" bIns="19050" anchor="ctr" anchorCtr="1">
-                <a:spAutoFit/>
-              </a:bodyPr>
+              <a:bodyPr rot="0" spcFirstLastPara="1" vertOverflow="ellipsis" vert="horz" wrap="square" anchor="ctr" anchorCtr="1"/>
               <a:lstStyle/>
               <a:p>
                 <a:pPr>
                   <a:defRPr sz="900" b="0" i="0" u="none" strike="noStrike" kern="1200" baseline="0">
+                    <a:ln w="3175">
+                      <a:noFill/>
+                    </a:ln>
                     <a:solidFill>
-                      <a:schemeClr val="tx1">
-                        <a:lumMod val="75000"/>
-                        <a:lumOff val="25000"/>
-                      </a:schemeClr>
+                      <a:schemeClr val="tx1"/>
                     </a:solidFill>
                     <a:latin typeface="+mn-lt"/>
                     <a:ea typeface="+mn-ea"/>
@@ -1176,7 +1174,7 @@
             <c:showPercent val="0"/>
             <c:showBubbleSize val="0"/>
             <c:showLeaderLines val="0"/>
-            <c:extLst xmlns:c16r2="http://schemas.microsoft.com/office/drawing/2015/06/chart">
+            <c:extLst>
               <c:ext xmlns:c15="http://schemas.microsoft.com/office/drawing/2012/chart" uri="{CE6537A1-D6FC-4f65-9D91-7224C49458BB}">
                 <c15:layout/>
                 <c15:showLeaderLines val="1"/>
@@ -1246,31 +1244,37 @@
                   <c:v>250</c:v>
                 </c:pt>
                 <c:pt idx="1">
-                  <c:v>532</c:v>
+                  <c:v>506</c:v>
                 </c:pt>
                 <c:pt idx="2">
-                  <c:v>481</c:v>
+                  <c:v>462</c:v>
                 </c:pt>
                 <c:pt idx="3">
-                  <c:v>455.5</c:v>
+                  <c:v>413</c:v>
                 </c:pt>
                 <c:pt idx="4">
-                  <c:v>409</c:v>
+                  <c:v>362</c:v>
                 </c:pt>
                 <c:pt idx="5">
-                  <c:v>368</c:v>
+                  <c:v>252</c:v>
                 </c:pt>
                 <c:pt idx="6">
-                  <c:v>72</c:v>
+                  <c:v>194</c:v>
                 </c:pt>
                 <c:pt idx="7">
-                  <c:v>38</c:v>
+                  <c:v>134</c:v>
+                </c:pt>
+                <c:pt idx="8">
+                  <c:v>74</c:v>
+                </c:pt>
+                <c:pt idx="9">
+                  <c:v>0</c:v>
                 </c:pt>
               </c:numCache>
             </c:numRef>
           </c:val>
           <c:smooth val="0"/>
-          <c:extLst xmlns:c16r2="http://schemas.microsoft.com/office/drawing/2015/06/chart">
+          <c:extLst>
             <c:ext xmlns:c16="http://schemas.microsoft.com/office/drawing/2014/chart" uri="{C3380CC4-5D6E-409C-BE32-E72D297353CC}">
               <c16:uniqueId val="{00000000-7036-49FB-A3F7-6BDC1515C86F}"/>
             </c:ext>
@@ -1304,6 +1308,48 @@
             <c:symbol val="none"/>
           </c:marker>
           <c:dLbls>
+            <c:dLbl>
+              <c:idx val="5"/>
+              <c:spPr>
+                <a:noFill/>
+                <a:ln>
+                  <a:noFill/>
+                </a:ln>
+                <a:effectLst/>
+              </c:spPr>
+              <c:txPr>
+                <a:bodyPr rot="0" spcFirstLastPara="1" vertOverflow="ellipsis" vert="horz" wrap="square" anchor="ctr" anchorCtr="1"/>
+                <a:lstStyle/>
+                <a:p>
+                  <a:pPr>
+                    <a:defRPr sz="900" b="0" i="0" u="none" strike="noStrike" kern="1200" baseline="0">
+                      <a:ln w="3175">
+                        <a:noFill/>
+                      </a:ln>
+                      <a:solidFill>
+                        <a:schemeClr val="tx1"/>
+                      </a:solidFill>
+                      <a:latin typeface="+mn-lt"/>
+                      <a:ea typeface="+mn-ea"/>
+                      <a:cs typeface="+mn-cs"/>
+                    </a:defRPr>
+                  </a:pPr>
+                  <a:endParaRPr lang="en-US"/>
+                </a:p>
+              </c:txPr>
+              <c:dLblPos val="t"/>
+              <c:showLegendKey val="0"/>
+              <c:showVal val="1"/>
+              <c:showCatName val="0"/>
+              <c:showSerName val="0"/>
+              <c:showPercent val="0"/>
+              <c:showBubbleSize val="0"/>
+              <c:extLst>
+                <c:ext xmlns:c16="http://schemas.microsoft.com/office/drawing/2014/chart" uri="{C3380CC4-5D6E-409C-BE32-E72D297353CC}">
+                  <c16:uniqueId val="{00000000-2500-4A8D-B785-4468F25DBC69}"/>
+                </c:ext>
+              </c:extLst>
+            </c:dLbl>
             <c:spPr>
               <a:noFill/>
               <a:ln>
@@ -1312,18 +1358,16 @@
               <a:effectLst/>
             </c:spPr>
             <c:txPr>
-              <a:bodyPr rot="0" spcFirstLastPara="1" vertOverflow="ellipsis" vert="horz" wrap="square" lIns="38100" tIns="19050" rIns="38100" bIns="19050" anchor="ctr" anchorCtr="1">
-                <a:spAutoFit/>
-              </a:bodyPr>
+              <a:bodyPr rot="0" spcFirstLastPara="1" vertOverflow="ellipsis" vert="horz" wrap="square" anchor="ctr" anchorCtr="1"/>
               <a:lstStyle/>
               <a:p>
                 <a:pPr>
                   <a:defRPr sz="900" b="0" i="0" u="none" strike="noStrike" kern="1200" baseline="0">
+                    <a:ln w="3175">
+                      <a:noFill/>
+                    </a:ln>
                     <a:solidFill>
-                      <a:schemeClr val="tx1">
-                        <a:lumMod val="75000"/>
-                        <a:lumOff val="25000"/>
-                      </a:schemeClr>
+                      <a:schemeClr val="tx1"/>
                     </a:solidFill>
                     <a:latin typeface="+mn-lt"/>
                     <a:ea typeface="+mn-ea"/>
@@ -1341,7 +1385,7 @@
             <c:showPercent val="0"/>
             <c:showBubbleSize val="0"/>
             <c:showLeaderLines val="0"/>
-            <c:extLst xmlns:c16r2="http://schemas.microsoft.com/office/drawing/2015/06/chart">
+            <c:extLst>
               <c:ext xmlns:c15="http://schemas.microsoft.com/office/drawing/2012/chart" uri="{CE6537A1-D6FC-4f65-9D91-7224C49458BB}">
                 <c15:layout/>
                 <c15:showLeaderLines val="1"/>
@@ -1408,40 +1452,40 @@
                 <c:formatCode>General</c:formatCode>
                 <c:ptCount val="10"/>
                 <c:pt idx="0">
-                  <c:v>532</c:v>
+                  <c:v>250</c:v>
                 </c:pt>
                 <c:pt idx="1">
-                  <c:v>479</c:v>
+                  <c:v>472</c:v>
                 </c:pt>
                 <c:pt idx="2">
-                  <c:v>426</c:v>
+                  <c:v>412</c:v>
                 </c:pt>
                 <c:pt idx="3">
-                  <c:v>373</c:v>
+                  <c:v>352</c:v>
                 </c:pt>
                 <c:pt idx="4">
-                  <c:v>320</c:v>
+                  <c:v>292</c:v>
                 </c:pt>
                 <c:pt idx="5">
-                  <c:v>267</c:v>
+                  <c:v>232</c:v>
                 </c:pt>
                 <c:pt idx="6">
-                  <c:v>214</c:v>
+                  <c:v>172</c:v>
                 </c:pt>
                 <c:pt idx="7">
-                  <c:v>161</c:v>
+                  <c:v>112</c:v>
                 </c:pt>
                 <c:pt idx="8">
-                  <c:v>108</c:v>
+                  <c:v>52</c:v>
                 </c:pt>
                 <c:pt idx="9">
-                  <c:v>55</c:v>
+                  <c:v>0</c:v>
                 </c:pt>
               </c:numCache>
             </c:numRef>
           </c:val>
           <c:smooth val="0"/>
-          <c:extLst xmlns:c16r2="http://schemas.microsoft.com/office/drawing/2015/06/chart">
+          <c:extLst>
             <c:ext xmlns:c16="http://schemas.microsoft.com/office/drawing/2014/chart" uri="{C3380CC4-5D6E-409C-BE32-E72D297353CC}">
               <c16:uniqueId val="{00000001-7036-49FB-A3F7-6BDC1515C86F}"/>
             </c:ext>
@@ -1488,12 +1532,12 @@
               <a:lstStyle/>
               <a:p>
                 <a:pPr>
-                  <a:defRPr sz="2000" b="0" i="0" u="none" strike="noStrike" kern="1200" baseline="0">
+                  <a:defRPr sz="1000" b="0" i="0" u="none" strike="noStrike" kern="1200" baseline="0">
+                    <a:ln w="3175">
+                      <a:noFill/>
+                    </a:ln>
                     <a:solidFill>
-                      <a:schemeClr val="tx1">
-                        <a:lumMod val="65000"/>
-                        <a:lumOff val="35000"/>
-                      </a:schemeClr>
+                      <a:schemeClr val="tx1"/>
                     </a:solidFill>
                     <a:latin typeface="+mn-lt"/>
                     <a:ea typeface="+mn-ea"/>
@@ -1501,7 +1545,7 @@
                   </a:defRPr>
                 </a:pPr>
                 <a:r>
-                  <a:rPr lang="en-US" sz="2000"/>
+                  <a:rPr lang="en-US"/>
                   <a:t>Sprint</a:t>
                 </a:r>
               </a:p>
@@ -1528,12 +1572,12 @@
             <a:lstStyle/>
             <a:p>
               <a:pPr>
-                <a:defRPr sz="2000" b="0" i="0" u="none" strike="noStrike" kern="1200" baseline="0">
+                <a:defRPr sz="1000" b="0" i="0" u="none" strike="noStrike" kern="1200" baseline="0">
+                  <a:ln w="3175">
+                    <a:noFill/>
+                  </a:ln>
                   <a:solidFill>
-                    <a:schemeClr val="tx1">
-                      <a:lumMod val="65000"/>
-                      <a:lumOff val="35000"/>
-                    </a:schemeClr>
+                    <a:schemeClr val="tx1"/>
                   </a:solidFill>
                   <a:latin typeface="+mn-lt"/>
                   <a:ea typeface="+mn-ea"/>
@@ -1567,11 +1611,11 @@
           <a:p>
             <a:pPr>
               <a:defRPr sz="900" b="0" i="0" u="none" strike="noStrike" kern="1200" baseline="0">
+                <a:ln w="3175">
+                  <a:noFill/>
+                </a:ln>
                 <a:solidFill>
-                  <a:schemeClr val="tx1">
-                    <a:lumMod val="65000"/>
-                    <a:lumOff val="35000"/>
-                  </a:schemeClr>
+                  <a:schemeClr val="tx1"/>
                 </a:solidFill>
                 <a:latin typeface="+mn-lt"/>
                 <a:ea typeface="+mn-ea"/>
@@ -1616,27 +1660,13 @@
               <a:bodyPr rot="-5400000" spcFirstLastPara="1" vertOverflow="ellipsis" vert="horz" wrap="square" anchor="ctr" anchorCtr="1"/>
               <a:lstStyle/>
               <a:p>
-                <a:pPr marL="0" marR="0" indent="0" algn="ctr" defTabSz="914400" rtl="0" eaLnBrk="1" fontAlgn="auto" latinLnBrk="0" hangingPunct="1">
-                  <a:lnSpc>
-                    <a:spcPct val="100000"/>
-                  </a:lnSpc>
-                  <a:spcBef>
-                    <a:spcPts val="0"/>
-                  </a:spcBef>
-                  <a:spcAft>
-                    <a:spcPts val="0"/>
-                  </a:spcAft>
-                  <a:buClrTx/>
-                  <a:buSzTx/>
-                  <a:buFontTx/>
-                  <a:buNone/>
-                  <a:tabLst/>
-                  <a:defRPr sz="2000" b="0" i="0" u="none" strike="noStrike" kern="1200" baseline="0">
+                <a:pPr algn="ctr" rtl="0">
+                  <a:defRPr sz="1000" b="0" i="0" u="none" strike="noStrike" kern="1200" baseline="0">
+                    <a:ln w="3175">
+                      <a:noFill/>
+                    </a:ln>
                     <a:solidFill>
-                      <a:sysClr val="windowText" lastClr="000000">
-                        <a:lumMod val="65000"/>
-                        <a:lumOff val="35000"/>
-                      </a:sysClr>
+                      <a:schemeClr val="tx1"/>
                     </a:solidFill>
                     <a:latin typeface="+mn-lt"/>
                     <a:ea typeface="+mn-ea"/>
@@ -1644,14 +1674,9 @@
                   </a:defRPr>
                 </a:pPr>
                 <a:r>
-                  <a:rPr lang="en-US" sz="2000" b="0" i="0" baseline="0">
-                    <a:effectLst/>
-                  </a:rPr>
+                  <a:rPr lang="en-US"/>
                   <a:t>Estimated Person-Hours Remaining</a:t>
                 </a:r>
-                <a:endParaRPr lang="en-US" sz="2000">
-                  <a:effectLst/>
-                </a:endParaRPr>
               </a:p>
             </c:rich>
           </c:tx>
@@ -1675,27 +1700,13 @@
             <a:bodyPr rot="-5400000" spcFirstLastPara="1" vertOverflow="ellipsis" vert="horz" wrap="square" anchor="ctr" anchorCtr="1"/>
             <a:lstStyle/>
             <a:p>
-              <a:pPr marL="0" marR="0" indent="0" algn="ctr" defTabSz="914400" rtl="0" eaLnBrk="1" fontAlgn="auto" latinLnBrk="0" hangingPunct="1">
-                <a:lnSpc>
-                  <a:spcPct val="100000"/>
-                </a:lnSpc>
-                <a:spcBef>
-                  <a:spcPts val="0"/>
-                </a:spcBef>
-                <a:spcAft>
-                  <a:spcPts val="0"/>
-                </a:spcAft>
-                <a:buClrTx/>
-                <a:buSzTx/>
-                <a:buFontTx/>
-                <a:buNone/>
-                <a:tabLst/>
-                <a:defRPr sz="2000" b="0" i="0" u="none" strike="noStrike" kern="1200" baseline="0">
+              <a:pPr algn="ctr" rtl="0">
+                <a:defRPr sz="1000" b="0" i="0" u="none" strike="noStrike" kern="1200" baseline="0">
+                  <a:ln w="3175">
+                    <a:noFill/>
+                  </a:ln>
                   <a:solidFill>
-                    <a:sysClr val="windowText" lastClr="000000">
-                      <a:lumMod val="65000"/>
-                      <a:lumOff val="35000"/>
-                    </a:sysClr>
+                    <a:schemeClr val="tx1"/>
                   </a:solidFill>
                   <a:latin typeface="+mn-lt"/>
                   <a:ea typeface="+mn-ea"/>
@@ -1729,11 +1740,11 @@
           <a:p>
             <a:pPr>
               <a:defRPr sz="900" b="0" i="0" u="none" strike="noStrike" kern="1200" baseline="0">
+                <a:ln w="3175">
+                  <a:noFill/>
+                </a:ln>
                 <a:solidFill>
-                  <a:schemeClr val="tx1">
-                    <a:lumMod val="65000"/>
-                    <a:lumOff val="35000"/>
-                  </a:schemeClr>
+                  <a:schemeClr val="tx1"/>
                 </a:solidFill>
                 <a:latin typeface="+mn-lt"/>
                 <a:ea typeface="+mn-ea"/>
@@ -1761,8 +1772,8 @@
         <c:manualLayout>
           <c:xMode val="edge"/>
           <c:yMode val="edge"/>
-          <c:x val="4.2832779989738799E-2"/>
-          <c:y val="0.91456018817319895"/>
+          <c:x val="4.9122881455269232E-2"/>
+          <c:y val="0.91174904905093235"/>
           <c:w val="0.40044528288130599"/>
           <c:h val="6.6964754405699295E-2"/>
         </c:manualLayout>
@@ -1781,11 +1792,11 @@
         <a:p>
           <a:pPr>
             <a:defRPr sz="900" b="0" i="0" u="none" strike="noStrike" kern="1200" baseline="0">
+              <a:ln w="3175">
+                <a:noFill/>
+              </a:ln>
               <a:solidFill>
-                <a:schemeClr val="tx1">
-                  <a:lumMod val="65000"/>
-                  <a:lumOff val="35000"/>
-                </a:schemeClr>
+                <a:schemeClr val="tx1"/>
               </a:solidFill>
               <a:latin typeface="+mn-lt"/>
               <a:ea typeface="+mn-ea"/>
@@ -1812,7 +1823,14 @@
     <a:lstStyle/>
     <a:p>
       <a:pPr>
-        <a:defRPr/>
+        <a:defRPr>
+          <a:ln w="3175">
+            <a:noFill/>
+          </a:ln>
+          <a:solidFill>
+            <a:schemeClr val="tx1"/>
+          </a:solidFill>
+        </a:defRPr>
       </a:pPr>
       <a:endParaRPr lang="en-US"/>
     </a:p>
@@ -3017,7 +3035,7 @@
           <a:p>
             <a:fld id="{4954C6E1-AF92-4FB7-A013-0B520EBC30AE}" type="datetimeFigureOut">
               <a:rPr lang="en-US"/>
-              <a:t>04/10/2016</a:t>
+              <a:t>04/12/2016</a:t>
             </a:fld>
             <a:endParaRPr/>
           </a:p>
@@ -3183,7 +3201,7 @@
           <a:p>
             <a:fld id="{95C10850-0874-4A61-99B4-D613C5E8D9EA}" type="datetimeFigureOut">
               <a:rPr lang="en-US"/>
-              <a:t>04/10/2016</a:t>
+              <a:t>04/12/2016</a:t>
             </a:fld>
             <a:endParaRPr/>
           </a:p>
@@ -3610,6 +3628,90 @@
     <p:extLst>
       <p:ext uri="{BB962C8B-B14F-4D97-AF65-F5344CB8AC3E}">
         <p14:creationId xmlns:p14="http://schemas.microsoft.com/office/powerpoint/2010/main" val="3624155657"/>
+      </p:ext>
+    </p:extLst>
+  </p:cSld>
+  <p:clrMapOvr>
+    <a:masterClrMapping/>
+  </p:clrMapOvr>
+</p:notes>
+</file>
+
+<file path=ppt/notesSlides/notesSlide3.xml><?xml version="1.0" encoding="utf-8"?>
+<p:notes xmlns:a="http://schemas.openxmlformats.org/drawingml/2006/main" xmlns:r="http://schemas.openxmlformats.org/officeDocument/2006/relationships" xmlns:p="http://schemas.openxmlformats.org/presentationml/2006/main">
+  <p:cSld>
+    <p:spTree>
+      <p:nvGrpSpPr>
+        <p:cNvPr id="1" name=""/>
+        <p:cNvGrpSpPr/>
+        <p:nvPr/>
+      </p:nvGrpSpPr>
+      <p:grpSpPr>
+        <a:xfrm>
+          <a:off x="0" y="0"/>
+          <a:ext cx="0" cy="0"/>
+          <a:chOff x="0" y="0"/>
+          <a:chExt cx="0" cy="0"/>
+        </a:xfrm>
+      </p:grpSpPr>
+      <p:sp>
+        <p:nvSpPr>
+          <p:cNvPr id="2" name="Slide Image Placeholder 1"/>
+          <p:cNvSpPr>
+            <a:spLocks noGrp="1" noRot="1" noChangeAspect="1"/>
+          </p:cNvSpPr>
+          <p:nvPr>
+            <p:ph type="sldImg"/>
+          </p:nvPr>
+        </p:nvSpPr>
+        <p:spPr/>
+      </p:sp>
+      <p:sp>
+        <p:nvSpPr>
+          <p:cNvPr id="3" name="Notes Placeholder 2"/>
+          <p:cNvSpPr>
+            <a:spLocks noGrp="1"/>
+          </p:cNvSpPr>
+          <p:nvPr>
+            <p:ph type="body" idx="1"/>
+          </p:nvPr>
+        </p:nvSpPr>
+        <p:spPr/>
+        <p:txBody>
+          <a:bodyPr/>
+          <a:lstStyle/>
+          <a:p>
+            <a:endParaRPr lang="en-US" dirty="0"/>
+          </a:p>
+        </p:txBody>
+      </p:sp>
+      <p:sp>
+        <p:nvSpPr>
+          <p:cNvPr id="4" name="Slide Number Placeholder 3"/>
+          <p:cNvSpPr>
+            <a:spLocks noGrp="1"/>
+          </p:cNvSpPr>
+          <p:nvPr>
+            <p:ph type="sldNum" sz="quarter" idx="10"/>
+          </p:nvPr>
+        </p:nvSpPr>
+        <p:spPr/>
+        <p:txBody>
+          <a:bodyPr/>
+          <a:lstStyle/>
+          <a:p>
+            <a:fld id="{9E11EC53-F507-411E-9ADC-FBCFECE09D3D}" type="slidenum">
+              <a:rPr lang="en-US" smtClean="0"/>
+              <a:t>11</a:t>
+            </a:fld>
+            <a:endParaRPr lang="en-US"/>
+          </a:p>
+        </p:txBody>
+      </p:sp>
+    </p:spTree>
+    <p:extLst>
+      <p:ext uri="{BB962C8B-B14F-4D97-AF65-F5344CB8AC3E}">
+        <p14:creationId xmlns:p14="http://schemas.microsoft.com/office/powerpoint/2010/main" val="325140204"/>
       </p:ext>
     </p:extLst>
   </p:cSld>
@@ -7128,6 +7230,11 @@
 <file path=ppt/slides/slide1.xml><?xml version="1.0" encoding="utf-8"?>
 <p:sld xmlns:a="http://schemas.openxmlformats.org/drawingml/2006/main" xmlns:r="http://schemas.openxmlformats.org/officeDocument/2006/relationships" xmlns:p="http://schemas.openxmlformats.org/presentationml/2006/main">
   <p:cSld>
+    <p:bg>
+      <p:bgRef idx="1002">
+        <a:schemeClr val="bg1"/>
+      </p:bgRef>
+    </p:bg>
     <p:spTree>
       <p:nvGrpSpPr>
         <p:cNvPr id="1" name=""/>
@@ -7455,7 +7562,7 @@
     </p:extLst>
   </p:cSld>
   <p:clrMapOvr>
-    <a:masterClrMapping/>
+    <a:overrideClrMapping bg1="lt1" tx1="dk1" bg2="lt2" tx2="dk2" accent1="accent1" accent2="accent2" accent3="accent3" accent4="accent4" accent5="accent5" accent6="accent6" hlink="hlink" folHlink="folHlink"/>
   </p:clrMapOvr>
   <mc:AlternateContent xmlns:mc="http://schemas.openxmlformats.org/markup-compatibility/2006" xmlns:p14="http://schemas.microsoft.com/office/powerpoint/2010/main">
     <mc:Choice Requires="p14">
@@ -7469,6 +7576,13 @@
       </p:transition>
     </mc:Fallback>
   </mc:AlternateContent>
+  <p:timing>
+    <p:tnLst>
+      <p:par>
+        <p:cTn id="1" dur="indefinite" restart="never" nodeType="tmRoot"/>
+      </p:par>
+    </p:tnLst>
+  </p:timing>
 </p:sld>
 </file>
 
@@ -7518,74 +7632,6 @@
           </a:p>
         </p:txBody>
       </p:sp>
-      <p:sp>
-        <p:nvSpPr>
-          <p:cNvPr id="4" name="Date Placeholder 3"/>
-          <p:cNvSpPr>
-            <a:spLocks noGrp="1"/>
-          </p:cNvSpPr>
-          <p:nvPr>
-            <p:ph type="dt" sz="half" idx="10"/>
-          </p:nvPr>
-        </p:nvSpPr>
-        <p:spPr/>
-        <p:txBody>
-          <a:bodyPr/>
-          <a:lstStyle/>
-          <a:p>
-            <a:r>
-              <a:rPr lang="en-US" dirty="0"/>
-              <a:t>04/15/2016</a:t>
-            </a:r>
-            <a:endParaRPr lang="en-US" dirty="0"/>
-          </a:p>
-        </p:txBody>
-      </p:sp>
-      <p:sp>
-        <p:nvSpPr>
-          <p:cNvPr id="5" name="Footer Placeholder 4"/>
-          <p:cNvSpPr>
-            <a:spLocks noGrp="1"/>
-          </p:cNvSpPr>
-          <p:nvPr>
-            <p:ph type="ftr" sz="quarter" idx="11"/>
-          </p:nvPr>
-        </p:nvSpPr>
-        <p:spPr/>
-        <p:txBody>
-          <a:bodyPr/>
-          <a:lstStyle/>
-          <a:p>
-            <a:r>
-              <a:rPr lang="en-US" dirty="0"/>
-              <a:t>CS499 Team Hotspotter</a:t>
-            </a:r>
-          </a:p>
-        </p:txBody>
-      </p:sp>
-      <p:sp>
-        <p:nvSpPr>
-          <p:cNvPr id="6" name="Slide Number Placeholder 5"/>
-          <p:cNvSpPr>
-            <a:spLocks noGrp="1"/>
-          </p:cNvSpPr>
-          <p:nvPr>
-            <p:ph type="sldNum" sz="quarter" idx="12"/>
-          </p:nvPr>
-        </p:nvSpPr>
-        <p:spPr/>
-        <p:txBody>
-          <a:bodyPr/>
-          <a:lstStyle/>
-          <a:p>
-            <a:fld id="{E5FD5434-F838-4DD4-A17B-1CB1A1850DF4}" type="slidenum">
-              <a:rPr lang="en-US" sz="1050" smtClean="0"/>
-              <a:t>10</a:t>
-            </a:fld>
-            <a:endParaRPr lang="en-US" sz="1050" dirty="0"/>
-          </a:p>
-        </p:txBody>
-      </p:sp>
       <p:graphicFrame>
         <p:nvGraphicFramePr>
           <p:cNvPr id="7" name="Content Placeholder 6"/>
@@ -7596,7 +7642,7 @@
             <p:ph idx="1"/>
             <p:extLst>
               <p:ext uri="{D42A27DB-BD31-4B8C-83A1-F6EECF244321}">
-                <p14:modId xmlns:p14="http://schemas.microsoft.com/office/powerpoint/2010/main" val="57911693"/>
+                <p14:modId xmlns:p14="http://schemas.microsoft.com/office/powerpoint/2010/main" val="3661578689"/>
               </p:ext>
             </p:extLst>
           </p:nvPr>
@@ -7611,6 +7657,104 @@
           </a:graphicData>
         </a:graphic>
       </p:graphicFrame>
+      <p:sp>
+        <p:nvSpPr>
+          <p:cNvPr id="4" name="Date Placeholder 3"/>
+          <p:cNvSpPr>
+            <a:spLocks noGrp="1"/>
+          </p:cNvSpPr>
+          <p:nvPr>
+            <p:ph type="dt" sz="half" idx="10"/>
+          </p:nvPr>
+        </p:nvSpPr>
+        <p:spPr/>
+        <p:txBody>
+          <a:bodyPr/>
+          <a:lstStyle/>
+          <a:p>
+            <a:r>
+              <a:rPr lang="en-US" sz="1600" dirty="0"/>
+              <a:t>04/15/2016</a:t>
+            </a:r>
+          </a:p>
+        </p:txBody>
+      </p:sp>
+      <p:sp>
+        <p:nvSpPr>
+          <p:cNvPr id="5" name="Footer Placeholder 4"/>
+          <p:cNvSpPr>
+            <a:spLocks noGrp="1"/>
+          </p:cNvSpPr>
+          <p:nvPr>
+            <p:ph type="ftr" sz="quarter" idx="11"/>
+          </p:nvPr>
+        </p:nvSpPr>
+        <p:spPr/>
+        <p:txBody>
+          <a:bodyPr/>
+          <a:lstStyle/>
+          <a:p>
+            <a:r>
+              <a:rPr lang="en-US" sz="1600" dirty="0"/>
+              <a:t>CS499 Team Hotspotter</a:t>
+            </a:r>
+          </a:p>
+        </p:txBody>
+      </p:sp>
+      <p:sp>
+        <p:nvSpPr>
+          <p:cNvPr id="6" name="Slide Number Placeholder 5"/>
+          <p:cNvSpPr>
+            <a:spLocks noGrp="1"/>
+          </p:cNvSpPr>
+          <p:nvPr>
+            <p:ph type="sldNum" sz="quarter" idx="12"/>
+          </p:nvPr>
+        </p:nvSpPr>
+        <p:spPr/>
+        <p:txBody>
+          <a:bodyPr/>
+          <a:lstStyle/>
+          <a:p>
+            <a:fld id="{E5FD5434-F838-4DD4-A17B-1CB1A1850DF4}" type="slidenum">
+              <a:rPr lang="en-US" sz="1600" smtClean="0"/>
+              <a:t>10</a:t>
+            </a:fld>
+            <a:endParaRPr lang="en-US" sz="1600" dirty="0"/>
+          </a:p>
+        </p:txBody>
+      </p:sp>
+      <p:sp>
+        <p:nvSpPr>
+          <p:cNvPr id="8" name="TextBox 7"/>
+          <p:cNvSpPr txBox="1"/>
+          <p:nvPr/>
+        </p:nvSpPr>
+        <p:spPr>
+          <a:xfrm>
+            <a:off x="4646611" y="6478459"/>
+            <a:ext cx="2895600" cy="338554"/>
+          </a:xfrm>
+          <a:prstGeom prst="rect">
+            <a:avLst/>
+          </a:prstGeom>
+          <a:noFill/>
+        </p:spPr>
+        <p:txBody>
+          <a:bodyPr wrap="square" rtlCol="0">
+            <a:spAutoFit/>
+          </a:bodyPr>
+          <a:lstStyle/>
+          <a:p>
+            <a:pPr algn="ctr"/>
+            <a:r>
+              <a:rPr lang="en-US" sz="1600" dirty="0" smtClean="0"/>
+              <a:t>Nathan Reinhardt</a:t>
+            </a:r>
+            <a:endParaRPr lang="en-US" sz="1600" dirty="0"/>
+          </a:p>
+        </p:txBody>
+      </p:sp>
     </p:spTree>
     <p:extLst>
       <p:ext uri="{BB962C8B-B14F-4D97-AF65-F5344CB8AC3E}">
@@ -7633,6 +7777,13 @@
       </p:transition>
     </mc:Fallback>
   </mc:AlternateContent>
+  <p:timing>
+    <p:tnLst>
+      <p:par>
+        <p:cTn id="1" dur="indefinite" restart="never" nodeType="tmRoot"/>
+      </p:par>
+    </p:tnLst>
+  </p:timing>
 </p:sld>
 </file>
 
@@ -7686,74 +7837,6 @@
           </a:p>
         </p:txBody>
       </p:sp>
-      <p:sp>
-        <p:nvSpPr>
-          <p:cNvPr id="4" name="Date Placeholder 3"/>
-          <p:cNvSpPr>
-            <a:spLocks noGrp="1"/>
-          </p:cNvSpPr>
-          <p:nvPr>
-            <p:ph type="dt" sz="half" idx="10"/>
-          </p:nvPr>
-        </p:nvSpPr>
-        <p:spPr/>
-        <p:txBody>
-          <a:bodyPr/>
-          <a:lstStyle/>
-          <a:p>
-            <a:r>
-              <a:rPr lang="en-US" dirty="0"/>
-              <a:t>04/15/2016</a:t>
-            </a:r>
-            <a:endParaRPr lang="en-US" dirty="0"/>
-          </a:p>
-        </p:txBody>
-      </p:sp>
-      <p:sp>
-        <p:nvSpPr>
-          <p:cNvPr id="5" name="Footer Placeholder 4"/>
-          <p:cNvSpPr>
-            <a:spLocks noGrp="1"/>
-          </p:cNvSpPr>
-          <p:nvPr>
-            <p:ph type="ftr" sz="quarter" idx="11"/>
-          </p:nvPr>
-        </p:nvSpPr>
-        <p:spPr/>
-        <p:txBody>
-          <a:bodyPr/>
-          <a:lstStyle/>
-          <a:p>
-            <a:r>
-              <a:rPr lang="en-US" dirty="0"/>
-              <a:t>CS499 Team Hotspotter</a:t>
-            </a:r>
-          </a:p>
-        </p:txBody>
-      </p:sp>
-      <p:sp>
-        <p:nvSpPr>
-          <p:cNvPr id="6" name="Slide Number Placeholder 5"/>
-          <p:cNvSpPr>
-            <a:spLocks noGrp="1"/>
-          </p:cNvSpPr>
-          <p:nvPr>
-            <p:ph type="sldNum" sz="quarter" idx="12"/>
-          </p:nvPr>
-        </p:nvSpPr>
-        <p:spPr/>
-        <p:txBody>
-          <a:bodyPr/>
-          <a:lstStyle/>
-          <a:p>
-            <a:fld id="{E5FD5434-F838-4DD4-A17B-1CB1A1850DF4}" type="slidenum">
-              <a:rPr lang="en-US" sz="1050" smtClean="0"/>
-              <a:t>11</a:t>
-            </a:fld>
-            <a:endParaRPr lang="en-US" sz="1050" dirty="0"/>
-          </a:p>
-        </p:txBody>
-      </p:sp>
       <p:graphicFrame>
         <p:nvGraphicFramePr>
           <p:cNvPr id="8" name="Content Placeholder 7"/>
@@ -7764,7 +7847,7 @@
             <p:ph idx="1"/>
             <p:extLst>
               <p:ext uri="{D42A27DB-BD31-4B8C-83A1-F6EECF244321}">
-                <p14:modId xmlns:p14="http://schemas.microsoft.com/office/powerpoint/2010/main" val="1503173150"/>
+                <p14:modId xmlns:p14="http://schemas.microsoft.com/office/powerpoint/2010/main" val="2660535135"/>
               </p:ext>
             </p:extLst>
           </p:nvPr>
@@ -7775,10 +7858,113 @@
         </p:xfrm>
         <a:graphic>
           <a:graphicData uri="http://schemas.openxmlformats.org/drawingml/2006/chart">
-            <c:chart xmlns:c="http://schemas.openxmlformats.org/drawingml/2006/chart" xmlns:r="http://schemas.openxmlformats.org/officeDocument/2006/relationships" r:id="rId2"/>
+            <c:chart xmlns:c="http://schemas.openxmlformats.org/drawingml/2006/chart" xmlns:r="http://schemas.openxmlformats.org/officeDocument/2006/relationships" r:id="rId3"/>
           </a:graphicData>
         </a:graphic>
       </p:graphicFrame>
+      <p:sp>
+        <p:nvSpPr>
+          <p:cNvPr id="4" name="Date Placeholder 3"/>
+          <p:cNvSpPr>
+            <a:spLocks noGrp="1"/>
+          </p:cNvSpPr>
+          <p:nvPr>
+            <p:ph type="dt" sz="half" idx="10"/>
+          </p:nvPr>
+        </p:nvSpPr>
+        <p:spPr>
+          <a:xfrm>
+            <a:off x="1172296" y="6417201"/>
+            <a:ext cx="3000113" cy="365125"/>
+          </a:xfrm>
+        </p:spPr>
+        <p:txBody>
+          <a:bodyPr/>
+          <a:lstStyle/>
+          <a:p>
+            <a:r>
+              <a:rPr lang="en-US" sz="1600" dirty="0"/>
+              <a:t>04/15/2016</a:t>
+            </a:r>
+          </a:p>
+        </p:txBody>
+      </p:sp>
+      <p:sp>
+        <p:nvSpPr>
+          <p:cNvPr id="5" name="Footer Placeholder 4"/>
+          <p:cNvSpPr>
+            <a:spLocks noGrp="1"/>
+          </p:cNvSpPr>
+          <p:nvPr>
+            <p:ph type="ftr" sz="quarter" idx="11"/>
+          </p:nvPr>
+        </p:nvSpPr>
+        <p:spPr/>
+        <p:txBody>
+          <a:bodyPr/>
+          <a:lstStyle/>
+          <a:p>
+            <a:r>
+              <a:rPr lang="en-US" sz="1600" dirty="0"/>
+              <a:t>CS499 Team Hotspotter</a:t>
+            </a:r>
+          </a:p>
+        </p:txBody>
+      </p:sp>
+      <p:sp>
+        <p:nvSpPr>
+          <p:cNvPr id="6" name="Slide Number Placeholder 5"/>
+          <p:cNvSpPr>
+            <a:spLocks noGrp="1"/>
+          </p:cNvSpPr>
+          <p:nvPr>
+            <p:ph type="sldNum" sz="quarter" idx="12"/>
+          </p:nvPr>
+        </p:nvSpPr>
+        <p:spPr/>
+        <p:txBody>
+          <a:bodyPr/>
+          <a:lstStyle/>
+          <a:p>
+            <a:fld id="{E5FD5434-F838-4DD4-A17B-1CB1A1850DF4}" type="slidenum">
+              <a:rPr lang="en-US" sz="1600" smtClean="0"/>
+              <a:t>11</a:t>
+            </a:fld>
+            <a:endParaRPr lang="en-US" sz="1600" dirty="0"/>
+          </a:p>
+        </p:txBody>
+      </p:sp>
+      <p:sp>
+        <p:nvSpPr>
+          <p:cNvPr id="7" name="TextBox 6"/>
+          <p:cNvSpPr txBox="1"/>
+          <p:nvPr/>
+        </p:nvSpPr>
+        <p:spPr>
+          <a:xfrm>
+            <a:off x="4646611" y="6478459"/>
+            <a:ext cx="2895600" cy="338554"/>
+          </a:xfrm>
+          <a:prstGeom prst="rect">
+            <a:avLst/>
+          </a:prstGeom>
+          <a:noFill/>
+        </p:spPr>
+        <p:txBody>
+          <a:bodyPr wrap="square" rtlCol="0">
+            <a:spAutoFit/>
+          </a:bodyPr>
+          <a:lstStyle/>
+          <a:p>
+            <a:pPr algn="ctr"/>
+            <a:r>
+              <a:rPr lang="en-US" sz="1600" dirty="0" smtClean="0"/>
+              <a:t>Nathan Reinhardt</a:t>
+            </a:r>
+            <a:endParaRPr lang="en-US" sz="1600" dirty="0"/>
+          </a:p>
+        </p:txBody>
+      </p:sp>
     </p:spTree>
     <p:extLst>
       <p:ext uri="{BB962C8B-B14F-4D97-AF65-F5344CB8AC3E}">
@@ -7801,6 +7987,13 @@
       </p:transition>
     </mc:Fallback>
   </mc:AlternateContent>
+  <p:timing>
+    <p:tnLst>
+      <p:par>
+        <p:cTn id="1" dur="indefinite" restart="never" nodeType="tmRoot"/>
+      </p:par>
+    </p:tnLst>
+  </p:timing>
 </p:sld>
 </file>
 
@@ -7979,61 +8172,101 @@
             <p:ph type="dt" sz="half" idx="10"/>
           </p:nvPr>
         </p:nvSpPr>
+        <p:spPr>
+          <a:xfrm>
+            <a:off x="1170738" y="6410093"/>
+            <a:ext cx="3000113" cy="365125"/>
+          </a:xfrm>
+        </p:spPr>
+        <p:txBody>
+          <a:bodyPr/>
+          <a:lstStyle/>
+          <a:p>
+            <a:r>
+              <a:rPr lang="en-US" sz="1600" dirty="0"/>
+              <a:t>04/15/2016</a:t>
+            </a:r>
+          </a:p>
+        </p:txBody>
+      </p:sp>
+      <p:sp>
+        <p:nvSpPr>
+          <p:cNvPr id="5" name="Footer Placeholder 4"/>
+          <p:cNvSpPr>
+            <a:spLocks noGrp="1"/>
+          </p:cNvSpPr>
+          <p:nvPr>
+            <p:ph type="ftr" sz="quarter" idx="11"/>
+          </p:nvPr>
+        </p:nvSpPr>
+        <p:spPr>
+          <a:xfrm>
+            <a:off x="5590655" y="6436664"/>
+            <a:ext cx="5043126" cy="365125"/>
+          </a:xfrm>
+        </p:spPr>
+        <p:txBody>
+          <a:bodyPr/>
+          <a:lstStyle/>
+          <a:p>
+            <a:r>
+              <a:rPr lang="en-US" sz="1600" dirty="0"/>
+              <a:t>CS499 Team Hotspotter</a:t>
+            </a:r>
+          </a:p>
+        </p:txBody>
+      </p:sp>
+      <p:sp>
+        <p:nvSpPr>
+          <p:cNvPr id="6" name="Slide Number Placeholder 5"/>
+          <p:cNvSpPr>
+            <a:spLocks noGrp="1"/>
+          </p:cNvSpPr>
+          <p:nvPr>
+            <p:ph type="sldNum" sz="quarter" idx="12"/>
+          </p:nvPr>
+        </p:nvSpPr>
         <p:spPr/>
         <p:txBody>
           <a:bodyPr/>
           <a:lstStyle/>
           <a:p>
-            <a:r>
-              <a:rPr lang="en-US" dirty="0"/>
-              <a:t>04/15/2016</a:t>
-            </a:r>
-            <a:endParaRPr lang="en-US" dirty="0"/>
-          </a:p>
-        </p:txBody>
-      </p:sp>
-      <p:sp>
-        <p:nvSpPr>
-          <p:cNvPr id="5" name="Footer Placeholder 4"/>
-          <p:cNvSpPr>
-            <a:spLocks noGrp="1"/>
-          </p:cNvSpPr>
-          <p:nvPr>
-            <p:ph type="ftr" sz="quarter" idx="11"/>
-          </p:nvPr>
-        </p:nvSpPr>
-        <p:spPr/>
-        <p:txBody>
-          <a:bodyPr/>
-          <a:lstStyle/>
-          <a:p>
-            <a:r>
-              <a:rPr lang="en-US" dirty="0"/>
-              <a:t>CS499 Team Hotspotter</a:t>
-            </a:r>
-          </a:p>
-        </p:txBody>
-      </p:sp>
-      <p:sp>
-        <p:nvSpPr>
-          <p:cNvPr id="6" name="Slide Number Placeholder 5"/>
-          <p:cNvSpPr>
-            <a:spLocks noGrp="1"/>
-          </p:cNvSpPr>
-          <p:nvPr>
-            <p:ph type="sldNum" sz="quarter" idx="12"/>
-          </p:nvPr>
-        </p:nvSpPr>
-        <p:spPr/>
-        <p:txBody>
-          <a:bodyPr/>
-          <a:lstStyle/>
-          <a:p>
             <a:fld id="{E5FD5434-F838-4DD4-A17B-1CB1A1850DF4}" type="slidenum">
-              <a:rPr lang="en-US" sz="1050" smtClean="0"/>
+              <a:rPr lang="en-US" sz="1600" smtClean="0"/>
               <a:t>12</a:t>
             </a:fld>
-            <a:endParaRPr lang="en-US" sz="1050" dirty="0"/>
+            <a:endParaRPr lang="en-US" sz="1600" dirty="0"/>
+          </a:p>
+        </p:txBody>
+      </p:sp>
+      <p:sp>
+        <p:nvSpPr>
+          <p:cNvPr id="8" name="TextBox 7"/>
+          <p:cNvSpPr txBox="1"/>
+          <p:nvPr/>
+        </p:nvSpPr>
+        <p:spPr>
+          <a:xfrm>
+            <a:off x="4646612" y="6463235"/>
+            <a:ext cx="2895600" cy="338554"/>
+          </a:xfrm>
+          <a:prstGeom prst="rect">
+            <a:avLst/>
+          </a:prstGeom>
+          <a:noFill/>
+        </p:spPr>
+        <p:txBody>
+          <a:bodyPr wrap="square" rtlCol="0">
+            <a:spAutoFit/>
+          </a:bodyPr>
+          <a:lstStyle/>
+          <a:p>
+            <a:pPr algn="ctr"/>
+            <a:r>
+              <a:rPr lang="en-US" sz="1600" dirty="0" smtClean="0"/>
+              <a:t>Nathan Reinhardt</a:t>
+            </a:r>
+            <a:endParaRPr lang="en-US" sz="1600" dirty="0"/>
           </a:p>
         </p:txBody>
       </p:sp>
@@ -8059,6 +8292,13 @@
       </p:transition>
     </mc:Fallback>
   </mc:AlternateContent>
+  <p:timing>
+    <p:tnLst>
+      <p:par>
+        <p:cTn id="1" dur="indefinite" restart="never" nodeType="tmRoot"/>
+      </p:par>
+    </p:tnLst>
+  </p:timing>
 </p:sld>
 </file>
 
@@ -8095,10 +8335,9 @@
           <a:lstStyle/>
           <a:p>
             <a:r>
-              <a:rPr lang="en-US" dirty="0"/>
+              <a:rPr lang="en-US" sz="1600" dirty="0"/>
               <a:t>04/15/2016</a:t>
             </a:r>
-            <a:endParaRPr lang="en-US" dirty="0"/>
           </a:p>
         </p:txBody>
       </p:sp>
@@ -8118,7 +8357,7 @@
           <a:lstStyle/>
           <a:p>
             <a:r>
-              <a:rPr lang="en-US" dirty="0"/>
+              <a:rPr lang="en-US" sz="1600" dirty="0"/>
               <a:t>CS499 Team Hotspotter</a:t>
             </a:r>
           </a:p>
@@ -8140,10 +8379,10 @@
           <a:lstStyle/>
           <a:p>
             <a:fld id="{E5FD5434-F838-4DD4-A17B-1CB1A1850DF4}" type="slidenum">
-              <a:rPr lang="en-US" sz="1050"/>
+              <a:rPr lang="en-US" sz="1600"/>
               <a:t>13</a:t>
             </a:fld>
-            <a:endParaRPr lang="en-US" sz="1050" dirty="0"/>
+            <a:endParaRPr lang="en-US" sz="1600" dirty="0"/>
           </a:p>
         </p:txBody>
       </p:sp>
@@ -8199,6 +8438,13 @@
       </p:transition>
     </mc:Fallback>
   </mc:AlternateContent>
+  <p:timing>
+    <p:tnLst>
+      <p:par>
+        <p:cTn id="1" dur="indefinite" restart="never" nodeType="tmRoot"/>
+      </p:par>
+    </p:tnLst>
+  </p:timing>
 </p:sld>
 </file>
 
@@ -8320,10 +8566,10 @@
           <a:lstStyle/>
           <a:p>
             <a:r>
-              <a:rPr lang="en-US" dirty="0" smtClean="0"/>
+              <a:rPr lang="en-US" sz="1600" dirty="0" smtClean="0"/>
               <a:t>04/15/2016</a:t>
             </a:r>
-            <a:endParaRPr lang="en-US" dirty="0"/>
+            <a:endParaRPr lang="en-US" sz="1600" dirty="0"/>
           </a:p>
         </p:txBody>
       </p:sp>
@@ -8343,10 +8589,10 @@
           <a:lstStyle/>
           <a:p>
             <a:r>
-              <a:rPr lang="en-US" dirty="0" smtClean="0"/>
+              <a:rPr lang="en-US" sz="1600" dirty="0" smtClean="0"/>
               <a:t>CS499 Team Hotspotter</a:t>
             </a:r>
-            <a:endParaRPr lang="en-US" dirty="0"/>
+            <a:endParaRPr lang="en-US" sz="1600" dirty="0"/>
           </a:p>
         </p:txBody>
       </p:sp>
@@ -8366,10 +8612,10 @@
           <a:lstStyle/>
           <a:p>
             <a:fld id="{E5FD5434-F838-4DD4-A17B-1CB1A1850DF4}" type="slidenum">
-              <a:rPr lang="en-US" smtClean="0"/>
+              <a:rPr lang="en-US" sz="1600" smtClean="0"/>
               <a:t>2</a:t>
             </a:fld>
-            <a:endParaRPr lang="en-US"/>
+            <a:endParaRPr lang="en-US" sz="1600" dirty="0"/>
           </a:p>
         </p:txBody>
       </p:sp>
@@ -8403,6 +8649,37 @@
           </a:prstGeom>
         </p:spPr>
       </p:pic>
+      <p:sp>
+        <p:nvSpPr>
+          <p:cNvPr id="8" name="TextBox 7"/>
+          <p:cNvSpPr txBox="1"/>
+          <p:nvPr/>
+        </p:nvSpPr>
+        <p:spPr>
+          <a:xfrm>
+            <a:off x="4646611" y="6449426"/>
+            <a:ext cx="2895600" cy="338554"/>
+          </a:xfrm>
+          <a:prstGeom prst="rect">
+            <a:avLst/>
+          </a:prstGeom>
+          <a:noFill/>
+        </p:spPr>
+        <p:txBody>
+          <a:bodyPr wrap="square" rtlCol="0">
+            <a:spAutoFit/>
+          </a:bodyPr>
+          <a:lstStyle/>
+          <a:p>
+            <a:pPr algn="ctr"/>
+            <a:r>
+              <a:rPr lang="en-US" sz="1600" dirty="0" smtClean="0"/>
+              <a:t>Dylan Williams</a:t>
+            </a:r>
+            <a:endParaRPr lang="en-US" sz="1600" dirty="0"/>
+          </a:p>
+        </p:txBody>
+      </p:sp>
     </p:spTree>
     <p:extLst>
       <p:ext uri="{BB962C8B-B14F-4D97-AF65-F5344CB8AC3E}">
@@ -8425,6 +8702,13 @@
       </p:transition>
     </mc:Fallback>
   </mc:AlternateContent>
+  <p:timing>
+    <p:tnLst>
+      <p:par>
+        <p:cTn id="1" dur="indefinite" restart="never" nodeType="tmRoot"/>
+      </p:par>
+    </p:tnLst>
+  </p:timing>
 </p:sld>
 </file>
 
@@ -8469,12 +8753,8 @@
           <a:p>
             <a:pPr algn="ctr"/>
             <a:r>
-              <a:rPr lang="en-US" sz="4400" dirty="0"/>
-              <a:t>About our </a:t>
-            </a:r>
-            <a:r>
               <a:rPr lang="en-US" sz="4400" dirty="0" smtClean="0"/>
-              <a:t>project</a:t>
+              <a:t>Project Domain</a:t>
             </a:r>
             <a:endParaRPr lang="en-US" sz="4400" dirty="0"/>
           </a:p>
@@ -8487,12 +8767,12 @@
             <a:spLocks noGrp="1"/>
           </p:cNvSpPr>
           <p:nvPr>
-            <p:ph sz="half" idx="2"/>
+            <p:ph sz="half" idx="1"/>
           </p:nvPr>
         </p:nvSpPr>
         <p:spPr>
           <a:xfrm>
-            <a:off x="1598612" y="2011680"/>
+            <a:off x="1979612" y="2053359"/>
             <a:ext cx="9383798" cy="4206240"/>
           </a:xfrm>
         </p:spPr>
@@ -8502,76 +8782,68 @@
           </a:bodyPr>
           <a:lstStyle/>
           <a:p>
-            <a:pPr marL="0" indent="0" algn="ctr">
-              <a:buNone/>
-            </a:pPr>
-            <a:r>
-              <a:rPr lang="en-US" sz="4000" u="sng" dirty="0"/>
-              <a:t>Domain and Business</a:t>
-            </a:r>
-          </a:p>
-          <a:p>
             <a:pPr marL="52388" indent="0">
               <a:buNone/>
             </a:pPr>
             <a:r>
-              <a:rPr lang="en-US" sz="2400" dirty="0"/>
+              <a:rPr lang="en-US" sz="2800" dirty="0" smtClean="0"/>
               <a:t>Developers</a:t>
             </a:r>
+            <a:endParaRPr lang="en-US" sz="2800" dirty="0"/>
           </a:p>
           <a:p>
             <a:pPr lvl="1"/>
             <a:r>
-              <a:rPr lang="en-US" sz="2400" dirty="0"/>
+              <a:rPr lang="en-US" sz="2800" dirty="0"/>
               <a:t>Tracking bug-fixing commits</a:t>
             </a:r>
           </a:p>
           <a:p>
             <a:pPr lvl="1"/>
             <a:r>
-              <a:rPr lang="en-US" sz="2400" dirty="0"/>
+              <a:rPr lang="en-US" sz="2800" dirty="0"/>
               <a:t>Testing code before </a:t>
             </a:r>
             <a:r>
-              <a:rPr lang="en-US" sz="2400" dirty="0" smtClean="0"/>
+              <a:rPr lang="en-US" sz="2800" dirty="0" smtClean="0"/>
               <a:t>committing code into the master build</a:t>
             </a:r>
-            <a:endParaRPr lang="en-US" sz="2400" dirty="0"/>
+            <a:endParaRPr lang="en-US" sz="2800" dirty="0"/>
           </a:p>
           <a:p>
             <a:pPr marL="0" indent="0">
               <a:buNone/>
             </a:pPr>
             <a:r>
-              <a:rPr lang="en-US" sz="2400" dirty="0"/>
+              <a:rPr lang="en-US" sz="2800" dirty="0"/>
               <a:t>  Project Managers</a:t>
             </a:r>
           </a:p>
           <a:p>
             <a:pPr lvl="1"/>
             <a:r>
-              <a:rPr lang="en-US" sz="2400" dirty="0"/>
+              <a:rPr lang="en-US" sz="2800" dirty="0"/>
               <a:t>Assigning troublesome tasks to more experienced </a:t>
             </a:r>
             <a:r>
-              <a:rPr lang="en-US" sz="2400" dirty="0" smtClean="0"/>
+              <a:rPr lang="en-US" sz="2800" dirty="0" smtClean="0"/>
               <a:t>developers</a:t>
             </a:r>
-            <a:endParaRPr lang="en-US" sz="2400" dirty="0"/>
+            <a:endParaRPr lang="en-US" sz="2800" dirty="0"/>
           </a:p>
           <a:p>
             <a:pPr marL="0" indent="0">
               <a:buNone/>
             </a:pPr>
             <a:r>
-              <a:rPr lang="en-US" sz="2400" dirty="0"/>
+              <a:rPr lang="en-US" sz="2800" dirty="0"/>
               <a:t>  Open Source Contributors</a:t>
             </a:r>
           </a:p>
           <a:p>
             <a:pPr lvl="1"/>
             <a:r>
-              <a:rPr lang="en-US" sz="2400" dirty="0" smtClean="0"/>
+              <a:rPr lang="en-US" sz="2800" dirty="0" smtClean="0"/>
               <a:t>Allows contributors to grow and develop based on the history of their contributions</a:t>
             </a:r>
           </a:p>
@@ -8593,10 +8865,10 @@
           <a:lstStyle/>
           <a:p>
             <a:r>
-              <a:rPr lang="en-US" dirty="0" smtClean="0"/>
+              <a:rPr lang="en-US" sz="1600" dirty="0" smtClean="0"/>
               <a:t>04/15/2016</a:t>
             </a:r>
-            <a:endParaRPr lang="en-US" dirty="0"/>
+            <a:endParaRPr lang="en-US" sz="1600" dirty="0"/>
           </a:p>
         </p:txBody>
       </p:sp>
@@ -8616,16 +8888,8 @@
           <a:lstStyle/>
           <a:p>
             <a:r>
-              <a:rPr lang="en-US" dirty="0"/>
-              <a:t>CS499</a:t>
-            </a:r>
-            <a:r>
-              <a:rPr lang="en-US" sz="1200" dirty="0"/>
-              <a:t> </a:t>
-            </a:r>
-            <a:r>
-              <a:rPr lang="en-US" dirty="0"/>
-              <a:t>Team Hotspotter</a:t>
+              <a:rPr lang="en-US" sz="1600" dirty="0"/>
+              <a:t>CS499 Team Hotspotter</a:t>
             </a:r>
           </a:p>
         </p:txBody>
@@ -8646,10 +8910,41 @@
           <a:lstStyle/>
           <a:p>
             <a:fld id="{E5FD5434-F838-4DD4-A17B-1CB1A1850DF4}" type="slidenum">
-              <a:rPr lang="en-US" sz="1050"/>
+              <a:rPr lang="en-US" sz="1600"/>
               <a:t>3</a:t>
             </a:fld>
-            <a:endParaRPr lang="en-US" sz="1050" dirty="0"/>
+            <a:endParaRPr lang="en-US" sz="1600" dirty="0"/>
+          </a:p>
+        </p:txBody>
+      </p:sp>
+      <p:sp>
+        <p:nvSpPr>
+          <p:cNvPr id="11" name="TextBox 10"/>
+          <p:cNvSpPr txBox="1"/>
+          <p:nvPr/>
+        </p:nvSpPr>
+        <p:spPr>
+          <a:xfrm>
+            <a:off x="4646612" y="6449426"/>
+            <a:ext cx="2895600" cy="338554"/>
+          </a:xfrm>
+          <a:prstGeom prst="rect">
+            <a:avLst/>
+          </a:prstGeom>
+          <a:noFill/>
+        </p:spPr>
+        <p:txBody>
+          <a:bodyPr wrap="square" rtlCol="0">
+            <a:spAutoFit/>
+          </a:bodyPr>
+          <a:lstStyle/>
+          <a:p>
+            <a:pPr algn="ctr"/>
+            <a:r>
+              <a:rPr lang="en-US" sz="1600" dirty="0" smtClean="0"/>
+              <a:t>Dylan Williams</a:t>
+            </a:r>
+            <a:endParaRPr lang="en-US" sz="1600" dirty="0"/>
           </a:p>
         </p:txBody>
       </p:sp>
@@ -8675,6 +8970,13 @@
       </p:transition>
     </mc:Fallback>
   </mc:AlternateContent>
+  <p:timing>
+    <p:tnLst>
+      <p:par>
+        <p:cTn id="1" dur="indefinite" restart="never" nodeType="tmRoot"/>
+      </p:par>
+    </p:tnLst>
+  </p:timing>
 </p:sld>
 </file>
 
@@ -8736,17 +9038,20 @@
         </p:nvSpPr>
         <p:spPr>
           <a:xfrm>
-            <a:off x="2513011" y="2514600"/>
-            <a:ext cx="7467601" cy="3703320"/>
+            <a:off x="2513012" y="1848541"/>
+            <a:ext cx="10668000" cy="4636846"/>
           </a:xfrm>
         </p:spPr>
         <p:txBody>
           <a:bodyPr>
-            <a:normAutofit/>
+            <a:normAutofit lnSpcReduction="10000"/>
           </a:bodyPr>
           <a:lstStyle/>
           <a:p>
             <a:pPr lvl="1">
+              <a:lnSpc>
+                <a:spcPct val="160000"/>
+              </a:lnSpc>
               <a:buFont typeface="Arial" panose="020B0604020202020204" pitchFamily="34" charset="0"/>
               <a:buChar char="•"/>
             </a:pPr>
@@ -8761,6 +9066,9 @@
           </a:p>
           <a:p>
             <a:pPr lvl="1">
+              <a:lnSpc>
+                <a:spcPct val="170000"/>
+              </a:lnSpc>
               <a:buFont typeface="Arial" panose="020B0604020202020204" pitchFamily="34" charset="0"/>
               <a:buChar char="•"/>
             </a:pPr>
@@ -8785,6 +9093,9 @@
           </a:p>
           <a:p>
             <a:pPr lvl="1">
+              <a:lnSpc>
+                <a:spcPct val="150000"/>
+              </a:lnSpc>
               <a:buFont typeface="Arial" panose="020B0604020202020204" pitchFamily="34" charset="0"/>
               <a:buChar char="•"/>
             </a:pPr>
@@ -8803,6 +9114,9 @@
           </a:p>
           <a:p>
             <a:pPr lvl="1">
+              <a:lnSpc>
+                <a:spcPct val="150000"/>
+              </a:lnSpc>
               <a:buFont typeface="Arial" panose="020B0604020202020204" pitchFamily="34" charset="0"/>
               <a:buChar char="•"/>
             </a:pPr>
@@ -8840,10 +9154,9 @@
           <a:lstStyle/>
           <a:p>
             <a:r>
-              <a:rPr lang="en-US" dirty="0"/>
+              <a:rPr lang="en-US" sz="1600" dirty="0"/>
               <a:t>04/15/2016</a:t>
             </a:r>
-            <a:endParaRPr lang="en-US" dirty="0"/>
           </a:p>
         </p:txBody>
       </p:sp>
@@ -8863,7 +9176,7 @@
           <a:lstStyle/>
           <a:p>
             <a:r>
-              <a:rPr lang="en-US" dirty="0"/>
+              <a:rPr lang="en-US" sz="1600" dirty="0"/>
               <a:t>CS499 Team Hotspotter</a:t>
             </a:r>
           </a:p>
@@ -8885,10 +9198,49 @@
           <a:lstStyle/>
           <a:p>
             <a:fld id="{E5FD5434-F838-4DD4-A17B-1CB1A1850DF4}" type="slidenum">
-              <a:rPr lang="en-US" sz="1050" smtClean="0"/>
+              <a:rPr lang="en-US" sz="1600" smtClean="0"/>
               <a:t>4</a:t>
             </a:fld>
-            <a:endParaRPr lang="en-US" sz="1050" dirty="0"/>
+            <a:endParaRPr lang="en-US" sz="1600" dirty="0"/>
+          </a:p>
+        </p:txBody>
+      </p:sp>
+      <p:sp>
+        <p:nvSpPr>
+          <p:cNvPr id="7" name="TextBox 6"/>
+          <p:cNvSpPr txBox="1"/>
+          <p:nvPr/>
+        </p:nvSpPr>
+        <p:spPr>
+          <a:xfrm>
+            <a:off x="4646611" y="6449426"/>
+            <a:ext cx="2895600" cy="338554"/>
+          </a:xfrm>
+          <a:prstGeom prst="rect">
+            <a:avLst/>
+          </a:prstGeom>
+          <a:noFill/>
+        </p:spPr>
+        <p:txBody>
+          <a:bodyPr wrap="square" rtlCol="0">
+            <a:spAutoFit/>
+          </a:bodyPr>
+          <a:lstStyle/>
+          <a:p>
+            <a:pPr algn="ctr"/>
+            <a:r>
+              <a:rPr lang="en-US" sz="1600" dirty="0" smtClean="0"/>
+              <a:t>Dylan</a:t>
+            </a:r>
+            <a:r>
+              <a:rPr lang="en-US" sz="1050" dirty="0" smtClean="0"/>
+              <a:t> </a:t>
+            </a:r>
+            <a:r>
+              <a:rPr lang="en-US" sz="1600" dirty="0" smtClean="0"/>
+              <a:t>Williams</a:t>
+            </a:r>
+            <a:endParaRPr lang="en-US" sz="1600" dirty="0"/>
           </a:p>
         </p:txBody>
       </p:sp>
@@ -8914,6 +9266,13 @@
       </p:transition>
     </mc:Fallback>
   </mc:AlternateContent>
+  <p:timing>
+    <p:tnLst>
+      <p:par>
+        <p:cTn id="1" dur="indefinite" restart="never" nodeType="tmRoot"/>
+      </p:par>
+    </p:tnLst>
+  </p:timing>
 </p:sld>
 </file>
 
@@ -8944,92 +9303,83 @@
             <p:ph type="title"/>
           </p:nvPr>
         </p:nvSpPr>
+        <p:spPr>
+          <a:xfrm>
+            <a:off x="-1" y="284176"/>
+            <a:ext cx="12188825" cy="1508760"/>
+          </a:xfrm>
+        </p:spPr>
+        <p:txBody>
+          <a:bodyPr/>
+          <a:lstStyle/>
+          <a:p>
+            <a:pPr algn="ctr"/>
+            <a:r>
+              <a:rPr lang="en-US" dirty="0" smtClean="0"/>
+              <a:t>Project Capabilities</a:t>
+            </a:r>
+            <a:endParaRPr lang="en-US" dirty="0"/>
+          </a:p>
+        </p:txBody>
+      </p:sp>
+      <p:sp>
+        <p:nvSpPr>
+          <p:cNvPr id="5" name="Date Placeholder 4"/>
+          <p:cNvSpPr>
+            <a:spLocks noGrp="1"/>
+          </p:cNvSpPr>
+          <p:nvPr>
+            <p:ph type="dt" sz="half" idx="10"/>
+          </p:nvPr>
+        </p:nvSpPr>
         <p:spPr/>
         <p:txBody>
           <a:bodyPr/>
           <a:lstStyle/>
           <a:p>
-            <a:pPr algn="ctr"/>
-            <a:r>
-              <a:rPr lang="en-US" dirty="0" smtClean="0"/>
-              <a:t>Project Plan: Management</a:t>
-            </a:r>
-            <a:endParaRPr lang="en-US" dirty="0"/>
-          </a:p>
-        </p:txBody>
-      </p:sp>
-      <p:sp>
-        <p:nvSpPr>
-          <p:cNvPr id="3" name="Content Placeholder 2"/>
-          <p:cNvSpPr>
-            <a:spLocks noGrp="1"/>
-          </p:cNvSpPr>
-          <p:nvPr>
-            <p:ph idx="1"/>
+            <a:r>
+              <a:rPr lang="en-US" sz="1600" dirty="0" smtClean="0"/>
+              <a:t>04/15/2016</a:t>
+            </a:r>
+            <a:endParaRPr lang="en-US" sz="1600" dirty="0"/>
+          </a:p>
+        </p:txBody>
+      </p:sp>
+      <p:sp>
+        <p:nvSpPr>
+          <p:cNvPr id="6" name="Footer Placeholder 5"/>
+          <p:cNvSpPr>
+            <a:spLocks noGrp="1"/>
+          </p:cNvSpPr>
+          <p:nvPr>
+            <p:ph type="ftr" sz="quarter" idx="11"/>
           </p:nvPr>
         </p:nvSpPr>
         <p:spPr/>
         <p:txBody>
-          <a:bodyPr>
-            <a:normAutofit/>
-          </a:bodyPr>
-          <a:lstStyle/>
-          <a:p>
-            <a:r>
-              <a:rPr lang="en-US" dirty="0" smtClean="0"/>
-              <a:t>Defined GIT practices</a:t>
-            </a:r>
-          </a:p>
-          <a:p>
-            <a:pPr lvl="2"/>
-            <a:r>
-              <a:rPr lang="en-US" dirty="0" smtClean="0"/>
-              <a:t>Collaboration and responsibility</a:t>
-            </a:r>
-          </a:p>
-          <a:p>
-            <a:r>
-              <a:rPr lang="en-US" dirty="0" smtClean="0"/>
-              <a:t>Jira</a:t>
-            </a:r>
-          </a:p>
-          <a:p>
-            <a:pPr lvl="1"/>
-            <a:r>
-              <a:rPr lang="en-US" dirty="0" smtClean="0"/>
-              <a:t>Agile Planning</a:t>
-            </a:r>
-          </a:p>
-          <a:p>
-            <a:r>
-              <a:rPr lang="en-US" dirty="0" smtClean="0"/>
-              <a:t>Jenkins</a:t>
-            </a:r>
-          </a:p>
-          <a:p>
-            <a:pPr lvl="1"/>
-            <a:r>
-              <a:rPr lang="en-US" dirty="0" smtClean="0"/>
-              <a:t>Automated quality/tests</a:t>
-            </a:r>
-          </a:p>
-          <a:p>
-            <a:pPr lvl="1"/>
-            <a:r>
-              <a:rPr lang="en-US" dirty="0" smtClean="0"/>
-              <a:t>Automated deployment</a:t>
-            </a:r>
-          </a:p>
-        </p:txBody>
-      </p:sp>
-      <p:sp>
-        <p:nvSpPr>
-          <p:cNvPr id="4" name="Date Placeholder 3"/>
-          <p:cNvSpPr>
-            <a:spLocks noGrp="1"/>
-          </p:cNvSpPr>
-          <p:nvPr>
-            <p:ph type="dt" sz="half" idx="10"/>
+          <a:bodyPr/>
+          <a:lstStyle/>
+          <a:p>
+            <a:r>
+              <a:rPr lang="en-US" sz="1600" dirty="0"/>
+              <a:t>CS499 Team </a:t>
+            </a:r>
+            <a:r>
+              <a:rPr lang="en-US" sz="1600" dirty="0" err="1"/>
+              <a:t>Hotspotter</a:t>
+            </a:r>
+            <a:endParaRPr lang="en-US" sz="1600" dirty="0"/>
+          </a:p>
+        </p:txBody>
+      </p:sp>
+      <p:sp>
+        <p:nvSpPr>
+          <p:cNvPr id="7" name="Slide Number Placeholder 6"/>
+          <p:cNvSpPr>
+            <a:spLocks noGrp="1"/>
+          </p:cNvSpPr>
+          <p:nvPr>
+            <p:ph type="sldNum" sz="quarter" idx="12"/>
           </p:nvPr>
         </p:nvSpPr>
         <p:spPr/>
@@ -9037,162 +9387,151 @@
           <a:bodyPr/>
           <a:lstStyle/>
           <a:p>
-            <a:r>
-              <a:rPr lang="en-US" dirty="0"/>
-              <a:t>04/15/2016</a:t>
-            </a:r>
-            <a:endParaRPr lang="en-US" dirty="0"/>
-          </a:p>
-        </p:txBody>
-      </p:sp>
-      <p:sp>
-        <p:nvSpPr>
-          <p:cNvPr id="5" name="Footer Placeholder 4"/>
-          <p:cNvSpPr>
-            <a:spLocks noGrp="1"/>
-          </p:cNvSpPr>
-          <p:nvPr>
-            <p:ph type="ftr" sz="quarter" idx="11"/>
-          </p:nvPr>
-        </p:nvSpPr>
-        <p:spPr/>
-        <p:txBody>
-          <a:bodyPr/>
-          <a:lstStyle/>
-          <a:p>
-            <a:r>
-              <a:rPr lang="en-US" dirty="0"/>
-              <a:t>CS499 </a:t>
-            </a:r>
-            <a:r>
-              <a:rPr lang="en-US" dirty="0"/>
-              <a:t>Team</a:t>
-            </a:r>
-            <a:r>
-              <a:rPr lang="en-US" dirty="0"/>
-              <a:t> Hotspotter</a:t>
-            </a:r>
-            <a:endParaRPr lang="en-US" dirty="0"/>
-          </a:p>
-        </p:txBody>
-      </p:sp>
-      <p:sp>
-        <p:nvSpPr>
-          <p:cNvPr id="6" name="Slide Number Placeholder 5"/>
-          <p:cNvSpPr>
-            <a:spLocks noGrp="1"/>
-          </p:cNvSpPr>
-          <p:nvPr>
-            <p:ph type="sldNum" sz="quarter" idx="12"/>
-          </p:nvPr>
-        </p:nvSpPr>
-        <p:spPr/>
-        <p:txBody>
-          <a:bodyPr/>
-          <a:lstStyle/>
-          <a:p>
             <a:fld id="{E5FD5434-F838-4DD4-A17B-1CB1A1850DF4}" type="slidenum">
-              <a:rPr lang="en-US" smtClean="0"/>
+              <a:rPr lang="en-US" sz="1600" smtClean="0"/>
+              <a:pPr/>
               <a:t>5</a:t>
             </a:fld>
-            <a:endParaRPr lang="en-US" dirty="0"/>
-          </a:p>
-        </p:txBody>
-      </p:sp>
-      <p:pic>
-        <p:nvPicPr>
-          <p:cNvPr id="9" name="Picture 8"/>
-          <p:cNvPicPr>
-            <a:picLocks noChangeAspect="1"/>
-          </p:cNvPicPr>
+            <a:endParaRPr lang="en-US" sz="1600" dirty="0"/>
+          </a:p>
+        </p:txBody>
+      </p:sp>
+      <p:sp>
+        <p:nvSpPr>
+          <p:cNvPr id="12" name="TextBox 11"/>
+          <p:cNvSpPr txBox="1"/>
           <p:nvPr/>
-        </p:nvPicPr>
-        <p:blipFill>
-          <a:blip r:embed="rId2">
-            <a:extLst>
-              <a:ext uri="{28A0092B-C50C-407E-A947-70E740481C1C}">
-                <a14:useLocalDpi xmlns:a14="http://schemas.microsoft.com/office/drawing/2010/main" val="0"/>
-              </a:ext>
-            </a:extLst>
-          </a:blip>
-          <a:stretch>
-            <a:fillRect/>
-          </a:stretch>
-        </p:blipFill>
+        </p:nvSpPr>
         <p:spPr>
           <a:xfrm>
-            <a:off x="8058974" y="3637522"/>
-            <a:ext cx="2461877" cy="1157082"/>
+            <a:off x="2360612" y="2234973"/>
+            <a:ext cx="8582328" cy="3690241"/>
           </a:xfrm>
           <a:prstGeom prst="rect">
             <a:avLst/>
           </a:prstGeom>
+          <a:noFill/>
         </p:spPr>
-      </p:pic>
-      <p:pic>
-        <p:nvPicPr>
-          <p:cNvPr id="10" name="Picture 9"/>
-          <p:cNvPicPr>
-            <a:picLocks noChangeAspect="1"/>
-          </p:cNvPicPr>
+        <p:txBody>
+          <a:bodyPr wrap="square" rtlCol="0">
+            <a:spAutoFit/>
+          </a:bodyPr>
+          <a:lstStyle/>
+          <a:p>
+            <a:pPr marL="342900" indent="-342900">
+              <a:lnSpc>
+                <a:spcPct val="150000"/>
+              </a:lnSpc>
+              <a:buFont typeface="Arial"/>
+              <a:buChar char="•"/>
+            </a:pPr>
+            <a:r>
+              <a:rPr lang="en-US" sz="4000" dirty="0"/>
+              <a:t>Clone a public git based repository</a:t>
+            </a:r>
+          </a:p>
+          <a:p>
+            <a:pPr marL="342900" indent="-342900">
+              <a:lnSpc>
+                <a:spcPct val="150000"/>
+              </a:lnSpc>
+              <a:buFont typeface="Arial"/>
+              <a:buChar char="•"/>
+            </a:pPr>
+            <a:r>
+              <a:rPr lang="en-US" sz="4000" dirty="0"/>
+              <a:t>Run metrics </a:t>
+            </a:r>
+            <a:r>
+              <a:rPr lang="en-US" sz="4000" dirty="0" smtClean="0"/>
+              <a:t>on </a:t>
+            </a:r>
+            <a:r>
+              <a:rPr lang="en-US" sz="4000" dirty="0"/>
+              <a:t>cloned </a:t>
+            </a:r>
+            <a:r>
+              <a:rPr lang="en-US" sz="4000" dirty="0" smtClean="0"/>
+              <a:t>repository</a:t>
+            </a:r>
+            <a:endParaRPr lang="en-US" sz="4000" dirty="0"/>
+          </a:p>
+          <a:p>
+            <a:pPr marL="342900" indent="-342900">
+              <a:lnSpc>
+                <a:spcPct val="150000"/>
+              </a:lnSpc>
+              <a:buFont typeface="Arial"/>
+              <a:buChar char="•"/>
+            </a:pPr>
+            <a:r>
+              <a:rPr lang="en-US" sz="4000" dirty="0"/>
+              <a:t>Create graph of </a:t>
+            </a:r>
+            <a:r>
+              <a:rPr lang="en-US" sz="4000" dirty="0" smtClean="0"/>
+              <a:t>metrics</a:t>
+            </a:r>
+            <a:endParaRPr lang="en-US" sz="4000" dirty="0"/>
+          </a:p>
+          <a:p>
+            <a:pPr marL="342900" indent="-342900">
+              <a:lnSpc>
+                <a:spcPct val="150000"/>
+              </a:lnSpc>
+              <a:buFont typeface="Arial"/>
+              <a:buChar char="•"/>
+            </a:pPr>
+            <a:r>
+              <a:rPr lang="en-US" sz="4000" dirty="0"/>
+              <a:t>Export </a:t>
+            </a:r>
+            <a:r>
+              <a:rPr lang="en-US" sz="4000" dirty="0" smtClean="0"/>
+              <a:t>data to </a:t>
+            </a:r>
+            <a:r>
+              <a:rPr lang="en-US" sz="4000" dirty="0"/>
+              <a:t>a CSV file</a:t>
+            </a:r>
+          </a:p>
+        </p:txBody>
+      </p:sp>
+      <p:sp>
+        <p:nvSpPr>
+          <p:cNvPr id="8" name="TextBox 7"/>
+          <p:cNvSpPr txBox="1"/>
           <p:nvPr/>
-        </p:nvPicPr>
-        <p:blipFill>
-          <a:blip r:embed="rId3">
-            <a:extLst>
-              <a:ext uri="{28A0092B-C50C-407E-A947-70E740481C1C}">
-                <a14:useLocalDpi xmlns:a14="http://schemas.microsoft.com/office/drawing/2010/main" val="0"/>
-              </a:ext>
-            </a:extLst>
-          </a:blip>
-          <a:stretch>
-            <a:fillRect/>
-          </a:stretch>
-        </p:blipFill>
+        </p:nvSpPr>
         <p:spPr>
           <a:xfrm>
-            <a:off x="7847012" y="5162934"/>
-            <a:ext cx="3028950" cy="971550"/>
+            <a:off x="4646612" y="6449426"/>
+            <a:ext cx="2895600" cy="338554"/>
           </a:xfrm>
           <a:prstGeom prst="rect">
             <a:avLst/>
           </a:prstGeom>
+          <a:noFill/>
         </p:spPr>
-      </p:pic>
-      <p:pic>
-        <p:nvPicPr>
-          <p:cNvPr id="14" name="Picture 13"/>
-          <p:cNvPicPr>
-            <a:picLocks noChangeAspect="1"/>
-          </p:cNvPicPr>
-          <p:nvPr/>
-        </p:nvPicPr>
-        <p:blipFill>
-          <a:blip r:embed="rId4" cstate="print">
-            <a:extLst>
-              <a:ext uri="{28A0092B-C50C-407E-A947-70E740481C1C}">
-                <a14:useLocalDpi xmlns:a14="http://schemas.microsoft.com/office/drawing/2010/main" val="0"/>
-              </a:ext>
-            </a:extLst>
-          </a:blip>
-          <a:stretch>
-            <a:fillRect/>
-          </a:stretch>
-        </p:blipFill>
-        <p:spPr>
-          <a:xfrm>
-            <a:off x="8690449" y="2070266"/>
-            <a:ext cx="1198926" cy="1198926"/>
-          </a:xfrm>
-          <a:prstGeom prst="rect">
-            <a:avLst/>
-          </a:prstGeom>
-        </p:spPr>
-      </p:pic>
+        <p:txBody>
+          <a:bodyPr wrap="square" rtlCol="0">
+            <a:spAutoFit/>
+          </a:bodyPr>
+          <a:lstStyle/>
+          <a:p>
+            <a:pPr algn="ctr"/>
+            <a:r>
+              <a:rPr lang="en-US" sz="1600" dirty="0" smtClean="0"/>
+              <a:t>Spencer Smith</a:t>
+            </a:r>
+            <a:endParaRPr lang="en-US" sz="1600" dirty="0"/>
+          </a:p>
+        </p:txBody>
+      </p:sp>
     </p:spTree>
     <p:extLst>
       <p:ext uri="{BB962C8B-B14F-4D97-AF65-F5344CB8AC3E}">
-        <p14:creationId xmlns:p14="http://schemas.microsoft.com/office/powerpoint/2010/main" val="2806046062"/>
+        <p14:creationId xmlns:p14="http://schemas.microsoft.com/office/powerpoint/2010/main" val="2128315463"/>
       </p:ext>
     </p:extLst>
   </p:cSld>
@@ -9240,229 +9579,6 @@
       </p:grpSpPr>
       <p:sp>
         <p:nvSpPr>
-          <p:cNvPr id="2" name="Title 1"/>
-          <p:cNvSpPr>
-            <a:spLocks noGrp="1"/>
-          </p:cNvSpPr>
-          <p:nvPr>
-            <p:ph type="title"/>
-          </p:nvPr>
-        </p:nvSpPr>
-        <p:spPr/>
-        <p:txBody>
-          <a:bodyPr/>
-          <a:lstStyle/>
-          <a:p>
-            <a:pPr algn="ctr"/>
-            <a:r>
-              <a:rPr lang="en-US" dirty="0" smtClean="0"/>
-              <a:t>Project Plan: Management </a:t>
-            </a:r>
-            <a:r>
-              <a:rPr lang="en-US" sz="2000" i="1" dirty="0" smtClean="0"/>
-              <a:t>(Cont.)</a:t>
-            </a:r>
-            <a:endParaRPr lang="en-US" sz="2000" i="1" dirty="0"/>
-          </a:p>
-        </p:txBody>
-      </p:sp>
-      <p:sp>
-        <p:nvSpPr>
-          <p:cNvPr id="4" name="Date Placeholder 3"/>
-          <p:cNvSpPr>
-            <a:spLocks noGrp="1"/>
-          </p:cNvSpPr>
-          <p:nvPr>
-            <p:ph type="dt" sz="half" idx="10"/>
-          </p:nvPr>
-        </p:nvSpPr>
-        <p:spPr/>
-        <p:txBody>
-          <a:bodyPr/>
-          <a:lstStyle/>
-          <a:p>
-            <a:r>
-              <a:rPr lang="en-US" dirty="0"/>
-              <a:t>04/15/2016</a:t>
-            </a:r>
-            <a:endParaRPr lang="en-US" dirty="0"/>
-          </a:p>
-        </p:txBody>
-      </p:sp>
-      <p:sp>
-        <p:nvSpPr>
-          <p:cNvPr id="5" name="Footer Placeholder 4"/>
-          <p:cNvSpPr>
-            <a:spLocks noGrp="1"/>
-          </p:cNvSpPr>
-          <p:nvPr>
-            <p:ph type="ftr" sz="quarter" idx="11"/>
-          </p:nvPr>
-        </p:nvSpPr>
-        <p:spPr/>
-        <p:txBody>
-          <a:bodyPr/>
-          <a:lstStyle/>
-          <a:p>
-            <a:r>
-              <a:rPr lang="en-US" dirty="0"/>
-              <a:t>CS499 Team Hotspotter</a:t>
-            </a:r>
-          </a:p>
-        </p:txBody>
-      </p:sp>
-      <p:sp>
-        <p:nvSpPr>
-          <p:cNvPr id="6" name="Slide Number Placeholder 5"/>
-          <p:cNvSpPr>
-            <a:spLocks noGrp="1"/>
-          </p:cNvSpPr>
-          <p:nvPr>
-            <p:ph type="sldNum" sz="quarter" idx="12"/>
-          </p:nvPr>
-        </p:nvSpPr>
-        <p:spPr/>
-        <p:txBody>
-          <a:bodyPr/>
-          <a:lstStyle/>
-          <a:p>
-            <a:fld id="{E5FD5434-F838-4DD4-A17B-1CB1A1850DF4}" type="slidenum">
-              <a:rPr lang="en-US" sz="1050" smtClean="0"/>
-              <a:t>6</a:t>
-            </a:fld>
-            <a:endParaRPr lang="en-US" sz="1050" dirty="0"/>
-          </a:p>
-        </p:txBody>
-      </p:sp>
-      <p:pic>
-        <p:nvPicPr>
-          <p:cNvPr id="7" name="Picture 6"/>
-          <p:cNvPicPr>
-            <a:picLocks noChangeAspect="1"/>
-          </p:cNvPicPr>
-          <p:nvPr/>
-        </p:nvPicPr>
-        <p:blipFill>
-          <a:blip r:embed="rId2"/>
-          <a:stretch>
-            <a:fillRect/>
-          </a:stretch>
-        </p:blipFill>
-        <p:spPr>
-          <a:xfrm>
-            <a:off x="2985644" y="4047633"/>
-            <a:ext cx="5322223" cy="2557784"/>
-          </a:xfrm>
-          <a:prstGeom prst="rect">
-            <a:avLst/>
-          </a:prstGeom>
-        </p:spPr>
-      </p:pic>
-      <p:pic>
-        <p:nvPicPr>
-          <p:cNvPr id="3" name="Picture 2"/>
-          <p:cNvPicPr>
-            <a:picLocks noChangeAspect="1"/>
-          </p:cNvPicPr>
-          <p:nvPr/>
-        </p:nvPicPr>
-        <p:blipFill>
-          <a:blip r:embed="rId3"/>
-          <a:stretch>
-            <a:fillRect/>
-          </a:stretch>
-        </p:blipFill>
-        <p:spPr>
-          <a:xfrm>
-            <a:off x="6780212" y="1774167"/>
-            <a:ext cx="5313491" cy="2546906"/>
-          </a:xfrm>
-          <a:prstGeom prst="rect">
-            <a:avLst/>
-          </a:prstGeom>
-        </p:spPr>
-      </p:pic>
-      <p:pic>
-        <p:nvPicPr>
-          <p:cNvPr id="8" name="Picture 7"/>
-          <p:cNvPicPr>
-            <a:picLocks noChangeAspect="1"/>
-          </p:cNvPicPr>
-          <p:nvPr/>
-        </p:nvPicPr>
-        <p:blipFill>
-          <a:blip r:embed="rId4" cstate="print">
-            <a:extLst>
-              <a:ext uri="{28A0092B-C50C-407E-A947-70E740481C1C}">
-                <a14:useLocalDpi xmlns:a14="http://schemas.microsoft.com/office/drawing/2010/main" val="0"/>
-              </a:ext>
-            </a:extLst>
-          </a:blip>
-          <a:stretch>
-            <a:fillRect/>
-          </a:stretch>
-        </p:blipFill>
-        <p:spPr>
-          <a:xfrm>
-            <a:off x="9877" y="1828801"/>
-            <a:ext cx="4789136" cy="2349726"/>
-          </a:xfrm>
-          <a:prstGeom prst="rect">
-            <a:avLst/>
-          </a:prstGeom>
-        </p:spPr>
-      </p:pic>
-    </p:spTree>
-    <p:extLst>
-      <p:ext uri="{BB962C8B-B14F-4D97-AF65-F5344CB8AC3E}">
-        <p14:creationId xmlns:p14="http://schemas.microsoft.com/office/powerpoint/2010/main" val="3747307126"/>
-      </p:ext>
-    </p:extLst>
-  </p:cSld>
-  <p:clrMapOvr>
-    <a:masterClrMapping/>
-  </p:clrMapOvr>
-  <mc:AlternateContent xmlns:mc="http://schemas.openxmlformats.org/markup-compatibility/2006" xmlns:p14="http://schemas.microsoft.com/office/powerpoint/2010/main">
-    <mc:Choice Requires="p14">
-      <p:transition spd="med" p14:dur="700">
-        <p:fade/>
-      </p:transition>
-    </mc:Choice>
-    <mc:Fallback xmlns="">
-      <p:transition spd="med">
-        <p:fade/>
-      </p:transition>
-    </mc:Fallback>
-  </mc:AlternateContent>
-  <p:timing>
-    <p:tnLst>
-      <p:par>
-        <p:cTn id="1" dur="indefinite" restart="never" nodeType="tmRoot"/>
-      </p:par>
-    </p:tnLst>
-  </p:timing>
-</p:sld>
-</file>
-
-<file path=ppt/slides/slide7.xml><?xml version="1.0" encoding="utf-8"?>
-<p:sld xmlns:a="http://schemas.openxmlformats.org/drawingml/2006/main" xmlns:r="http://schemas.openxmlformats.org/officeDocument/2006/relationships" xmlns:p="http://schemas.openxmlformats.org/presentationml/2006/main">
-  <p:cSld>
-    <p:spTree>
-      <p:nvGrpSpPr>
-        <p:cNvPr id="1" name=""/>
-        <p:cNvGrpSpPr/>
-        <p:nvPr/>
-      </p:nvGrpSpPr>
-      <p:grpSpPr>
-        <a:xfrm>
-          <a:off x="0" y="0"/>
-          <a:ext cx="0" cy="0"/>
-          <a:chOff x="0" y="0"/>
-          <a:chExt cx="0" cy="0"/>
-        </a:xfrm>
-      </p:grpSpPr>
-      <p:sp>
-        <p:nvSpPr>
           <p:cNvPr id="3" name="Rectangle 2"/>
           <p:cNvSpPr/>
           <p:nvPr/>
@@ -9545,27 +9661,53 @@
             <p:ph type="dt" sz="half" idx="10"/>
           </p:nvPr>
         </p:nvSpPr>
+        <p:spPr>
+          <a:xfrm>
+            <a:off x="394991" y="6404209"/>
+            <a:ext cx="3000113" cy="365125"/>
+          </a:xfrm>
+        </p:spPr>
+        <p:txBody>
+          <a:bodyPr/>
+          <a:lstStyle/>
+          <a:p>
+            <a:r>
+              <a:rPr lang="en-US" sz="1600" dirty="0"/>
+              <a:t>04/15/2016</a:t>
+            </a:r>
+          </a:p>
+        </p:txBody>
+      </p:sp>
+      <p:sp>
+        <p:nvSpPr>
+          <p:cNvPr id="5" name="Footer Placeholder 4"/>
+          <p:cNvSpPr>
+            <a:spLocks noGrp="1"/>
+          </p:cNvSpPr>
+          <p:nvPr>
+            <p:ph type="ftr" sz="quarter" idx="11"/>
+          </p:nvPr>
+        </p:nvSpPr>
         <p:spPr/>
         <p:txBody>
           <a:bodyPr/>
           <a:lstStyle/>
           <a:p>
             <a:r>
-              <a:rPr lang="en-US" dirty="0"/>
-              <a:t>04/15/2016</a:t>
-            </a:r>
-            <a:endParaRPr lang="en-US" dirty="0"/>
-          </a:p>
-        </p:txBody>
-      </p:sp>
-      <p:sp>
-        <p:nvSpPr>
-          <p:cNvPr id="5" name="Footer Placeholder 4"/>
-          <p:cNvSpPr>
-            <a:spLocks noGrp="1"/>
-          </p:cNvSpPr>
-          <p:nvPr>
-            <p:ph type="ftr" sz="quarter" idx="11"/>
+              <a:rPr lang="en-US" sz="1600" dirty="0"/>
+              <a:t>CS499 Team Hotspotter</a:t>
+            </a:r>
+          </a:p>
+        </p:txBody>
+      </p:sp>
+      <p:sp>
+        <p:nvSpPr>
+          <p:cNvPr id="6" name="Slide Number Placeholder 5"/>
+          <p:cNvSpPr>
+            <a:spLocks noGrp="1"/>
+          </p:cNvSpPr>
+          <p:nvPr>
+            <p:ph type="sldNum" sz="quarter" idx="12"/>
           </p:nvPr>
         </p:nvSpPr>
         <p:spPr/>
@@ -9573,33 +9715,11 @@
           <a:bodyPr/>
           <a:lstStyle/>
           <a:p>
-            <a:r>
-              <a:rPr lang="en-US" dirty="0"/>
-              <a:t>CS499 Team Hotspotter</a:t>
-            </a:r>
-          </a:p>
-        </p:txBody>
-      </p:sp>
-      <p:sp>
-        <p:nvSpPr>
-          <p:cNvPr id="6" name="Slide Number Placeholder 5"/>
-          <p:cNvSpPr>
-            <a:spLocks noGrp="1"/>
-          </p:cNvSpPr>
-          <p:nvPr>
-            <p:ph type="sldNum" sz="quarter" idx="12"/>
-          </p:nvPr>
-        </p:nvSpPr>
-        <p:spPr/>
-        <p:txBody>
-          <a:bodyPr/>
-          <a:lstStyle/>
-          <a:p>
             <a:fld id="{E5FD5434-F838-4DD4-A17B-1CB1A1850DF4}" type="slidenum">
-              <a:rPr lang="en-US" sz="1050" smtClean="0"/>
-              <a:t>7</a:t>
+              <a:rPr lang="en-US" sz="1600" smtClean="0"/>
+              <a:t>6</a:t>
             </a:fld>
-            <a:endParaRPr lang="en-US" sz="1050" dirty="0"/>
+            <a:endParaRPr lang="en-US" sz="1600" dirty="0"/>
           </a:p>
         </p:txBody>
       </p:sp>
@@ -9625,7 +9745,7 @@
         </p:blipFill>
         <p:spPr>
           <a:xfrm>
-            <a:off x="1839713" y="1226077"/>
+            <a:off x="1919501" y="1297125"/>
             <a:ext cx="7628741" cy="5366427"/>
           </a:xfrm>
           <a:prstGeom prst="rect">
@@ -9752,6 +9872,37 @@
           </a:prstGeom>
         </p:spPr>
       </p:pic>
+      <p:sp>
+        <p:nvSpPr>
+          <p:cNvPr id="12" name="TextBox 11"/>
+          <p:cNvSpPr txBox="1"/>
+          <p:nvPr/>
+        </p:nvSpPr>
+        <p:spPr>
+          <a:xfrm>
+            <a:off x="829603" y="6430780"/>
+            <a:ext cx="2895600" cy="338554"/>
+          </a:xfrm>
+          <a:prstGeom prst="rect">
+            <a:avLst/>
+          </a:prstGeom>
+          <a:noFill/>
+        </p:spPr>
+        <p:txBody>
+          <a:bodyPr wrap="square" rtlCol="0">
+            <a:spAutoFit/>
+          </a:bodyPr>
+          <a:lstStyle/>
+          <a:p>
+            <a:pPr algn="ctr"/>
+            <a:r>
+              <a:rPr lang="en-US" sz="1600" dirty="0" smtClean="0"/>
+              <a:t>Spencer Smith</a:t>
+            </a:r>
+            <a:endParaRPr lang="en-US" sz="1600" dirty="0"/>
+          </a:p>
+        </p:txBody>
+      </p:sp>
     </p:spTree>
     <p:extLst>
       <p:ext uri="{BB962C8B-B14F-4D97-AF65-F5344CB8AC3E}">
@@ -9774,10 +9925,17 @@
       </p:transition>
     </mc:Fallback>
   </mc:AlternateContent>
+  <p:timing>
+    <p:tnLst>
+      <p:par>
+        <p:cTn id="1" dur="indefinite" restart="never" nodeType="tmRoot"/>
+      </p:par>
+    </p:tnLst>
+  </p:timing>
 </p:sld>
 </file>
 
-<file path=ppt/slides/slide8.xml><?xml version="1.0" encoding="utf-8"?>
+<file path=ppt/slides/slide7.xml><?xml version="1.0" encoding="utf-8"?>
 <p:sld xmlns:a="http://schemas.openxmlformats.org/drawingml/2006/main" xmlns:r="http://schemas.openxmlformats.org/officeDocument/2006/relationships" xmlns:p="http://schemas.openxmlformats.org/presentationml/2006/main">
   <p:cSld>
     <p:spTree>
@@ -9805,21 +9963,27 @@
           </p:nvPr>
         </p:nvSpPr>
         <p:spPr>
-          <a:xfrm>
-            <a:off x="-1" y="284176"/>
-            <a:ext cx="12188825" cy="1508760"/>
+          <a:xfrm rot="1518443">
+            <a:off x="-25458" y="2571527"/>
+            <a:ext cx="12341374" cy="1508760"/>
           </a:xfrm>
         </p:spPr>
         <p:txBody>
           <a:bodyPr/>
           <a:lstStyle/>
           <a:p>
-            <a:pPr algn="ctr"/>
-            <a:r>
-              <a:rPr lang="en-US" dirty="0" smtClean="0"/>
-              <a:t>Project Capabilities</a:t>
-            </a:r>
-            <a:endParaRPr lang="en-US" dirty="0"/>
+            <a:r>
+              <a:rPr lang="en-US" dirty="0"/>
+              <a:t>DEMO DEMO </a:t>
+            </a:r>
+            <a:r>
+              <a:rPr lang="en-US" dirty="0">
+                <a:solidFill>
+                  <a:schemeClr val="tx1"/>
+                </a:solidFill>
+              </a:rPr>
+              <a:t>DEMO DEMO DEMO DEMO DEMO DEMO</a:t>
+            </a:r>
           </a:p>
         </p:txBody>
       </p:sp>
@@ -9839,10 +10003,10 @@
           <a:lstStyle/>
           <a:p>
             <a:r>
-              <a:rPr lang="en-US" smtClean="0"/>
+              <a:rPr lang="en-US" sz="1600" dirty="0" smtClean="0"/>
               <a:t>04/15/2016</a:t>
             </a:r>
-            <a:endParaRPr lang="en-US"/>
+            <a:endParaRPr lang="en-US" sz="1600" dirty="0"/>
           </a:p>
         </p:txBody>
       </p:sp>
@@ -9862,7 +10026,7 @@
           <a:lstStyle/>
           <a:p>
             <a:r>
-              <a:rPr lang="en-US"/>
+              <a:rPr lang="en-US" sz="1600"/>
               <a:t>CS499 Team Hotspotter</a:t>
             </a:r>
           </a:p>
@@ -9884,24 +10048,24 @@
           <a:lstStyle/>
           <a:p>
             <a:fld id="{E5FD5434-F838-4DD4-A17B-1CB1A1850DF4}" type="slidenum">
-              <a:rPr lang="en-US" smtClean="0"/>
+              <a:rPr lang="en-US" sz="1600" smtClean="0"/>
               <a:pPr/>
-              <a:t>8</a:t>
+              <a:t>7</a:t>
             </a:fld>
-            <a:endParaRPr lang="en-US"/>
-          </a:p>
-        </p:txBody>
-      </p:sp>
-      <p:sp>
-        <p:nvSpPr>
-          <p:cNvPr id="12" name="TextBox 11"/>
+            <a:endParaRPr lang="en-US" sz="1600"/>
+          </a:p>
+        </p:txBody>
+      </p:sp>
+      <p:sp>
+        <p:nvSpPr>
+          <p:cNvPr id="8" name="TextBox 7"/>
           <p:cNvSpPr txBox="1"/>
           <p:nvPr/>
         </p:nvSpPr>
         <p:spPr>
           <a:xfrm>
-            <a:off x="2055812" y="2438400"/>
-            <a:ext cx="8379351" cy="2554545"/>
+            <a:off x="4646611" y="6478459"/>
+            <a:ext cx="2895600" cy="338554"/>
           </a:xfrm>
           <a:prstGeom prst="rect">
             <a:avLst/>
@@ -9914,211 +10078,12 @@
           </a:bodyPr>
           <a:lstStyle/>
           <a:p>
-            <a:pPr marL="342900" indent="-342900">
-              <a:buFont typeface="Arial"/>
-              <a:buChar char="•"/>
-            </a:pPr>
-            <a:r>
-              <a:rPr lang="en-US" sz="4000" dirty="0"/>
-              <a:t>Clone a public git based repository</a:t>
-            </a:r>
-          </a:p>
-          <a:p>
-            <a:pPr marL="342900" indent="-342900">
-              <a:buFont typeface="Arial"/>
-              <a:buChar char="•"/>
-            </a:pPr>
-            <a:r>
-              <a:rPr lang="en-US" sz="4000" dirty="0"/>
-              <a:t>Run metrics </a:t>
-            </a:r>
-            <a:r>
-              <a:rPr lang="en-US" sz="4000" dirty="0" smtClean="0"/>
-              <a:t>on </a:t>
-            </a:r>
-            <a:r>
-              <a:rPr lang="en-US" sz="4000" dirty="0"/>
-              <a:t>cloned repository</a:t>
-            </a:r>
-          </a:p>
-          <a:p>
-            <a:pPr marL="342900" indent="-342900">
-              <a:buFont typeface="Arial"/>
-              <a:buChar char="•"/>
-            </a:pPr>
-            <a:r>
-              <a:rPr lang="en-US" sz="4000" dirty="0"/>
-              <a:t>Create graph of </a:t>
-            </a:r>
-            <a:r>
-              <a:rPr lang="en-US" sz="4000" dirty="0" smtClean="0"/>
-              <a:t>metrics</a:t>
-            </a:r>
-            <a:endParaRPr lang="en-US" sz="4000" dirty="0"/>
-          </a:p>
-          <a:p>
-            <a:pPr marL="342900" indent="-342900">
-              <a:buFont typeface="Arial"/>
-              <a:buChar char="•"/>
-            </a:pPr>
-            <a:r>
-              <a:rPr lang="en-US" sz="4000" dirty="0"/>
-              <a:t>Export </a:t>
-            </a:r>
-            <a:r>
-              <a:rPr lang="en-US" sz="4000" dirty="0" smtClean="0"/>
-              <a:t>data to </a:t>
-            </a:r>
-            <a:r>
-              <a:rPr lang="en-US" sz="4000" dirty="0"/>
-              <a:t>a CSV file</a:t>
-            </a:r>
-          </a:p>
-        </p:txBody>
-      </p:sp>
-    </p:spTree>
-    <p:extLst>
-      <p:ext uri="{BB962C8B-B14F-4D97-AF65-F5344CB8AC3E}">
-        <p14:creationId xmlns:p14="http://schemas.microsoft.com/office/powerpoint/2010/main" val="2128315463"/>
-      </p:ext>
-    </p:extLst>
-  </p:cSld>
-  <p:clrMapOvr>
-    <a:masterClrMapping/>
-  </p:clrMapOvr>
-  <mc:AlternateContent xmlns:mc="http://schemas.openxmlformats.org/markup-compatibility/2006" xmlns:p14="http://schemas.microsoft.com/office/powerpoint/2010/main">
-    <mc:Choice Requires="p14">
-      <p:transition spd="med" p14:dur="700">
-        <p:fade/>
-      </p:transition>
-    </mc:Choice>
-    <mc:Fallback xmlns="">
-      <p:transition spd="med">
-        <p:fade/>
-      </p:transition>
-    </mc:Fallback>
-  </mc:AlternateContent>
-</p:sld>
-</file>
-
-<file path=ppt/slides/slide9.xml><?xml version="1.0" encoding="utf-8"?>
-<p:sld xmlns:a="http://schemas.openxmlformats.org/drawingml/2006/main" xmlns:r="http://schemas.openxmlformats.org/officeDocument/2006/relationships" xmlns:p="http://schemas.openxmlformats.org/presentationml/2006/main">
-  <p:cSld>
-    <p:spTree>
-      <p:nvGrpSpPr>
-        <p:cNvPr id="1" name=""/>
-        <p:cNvGrpSpPr/>
-        <p:nvPr/>
-      </p:nvGrpSpPr>
-      <p:grpSpPr>
-        <a:xfrm>
-          <a:off x="0" y="0"/>
-          <a:ext cx="0" cy="0"/>
-          <a:chOff x="0" y="0"/>
-          <a:chExt cx="0" cy="0"/>
-        </a:xfrm>
-      </p:grpSpPr>
-      <p:sp>
-        <p:nvSpPr>
-          <p:cNvPr id="2" name="Title 1"/>
-          <p:cNvSpPr>
-            <a:spLocks noGrp="1"/>
-          </p:cNvSpPr>
-          <p:nvPr>
-            <p:ph type="title"/>
-          </p:nvPr>
-        </p:nvSpPr>
-        <p:spPr>
-          <a:xfrm rot="1518443">
-            <a:off x="-25458" y="2571527"/>
-            <a:ext cx="12341374" cy="1508760"/>
-          </a:xfrm>
-        </p:spPr>
-        <p:txBody>
-          <a:bodyPr/>
-          <a:lstStyle/>
-          <a:p>
-            <a:r>
-              <a:rPr lang="en-US" dirty="0"/>
-              <a:t>DEMO DEMO </a:t>
-            </a:r>
-            <a:r>
-              <a:rPr lang="en-US" dirty="0">
-                <a:solidFill>
-                  <a:schemeClr val="tx1"/>
-                </a:solidFill>
-              </a:rPr>
-              <a:t>DEMO DEMO DEMO DEMO DEMO DEMO</a:t>
-            </a:r>
-          </a:p>
-        </p:txBody>
-      </p:sp>
-      <p:sp>
-        <p:nvSpPr>
-          <p:cNvPr id="5" name="Date Placeholder 4"/>
-          <p:cNvSpPr>
-            <a:spLocks noGrp="1"/>
-          </p:cNvSpPr>
-          <p:nvPr>
-            <p:ph type="dt" sz="half" idx="10"/>
-          </p:nvPr>
-        </p:nvSpPr>
-        <p:spPr/>
-        <p:txBody>
-          <a:bodyPr/>
-          <a:lstStyle/>
-          <a:p>
-            <a:r>
-              <a:rPr lang="en-US" dirty="0" smtClean="0"/>
-              <a:t>04/15/2016</a:t>
-            </a:r>
-            <a:endParaRPr lang="en-US" dirty="0"/>
-          </a:p>
-        </p:txBody>
-      </p:sp>
-      <p:sp>
-        <p:nvSpPr>
-          <p:cNvPr id="6" name="Footer Placeholder 5"/>
-          <p:cNvSpPr>
-            <a:spLocks noGrp="1"/>
-          </p:cNvSpPr>
-          <p:nvPr>
-            <p:ph type="ftr" sz="quarter" idx="11"/>
-          </p:nvPr>
-        </p:nvSpPr>
-        <p:spPr/>
-        <p:txBody>
-          <a:bodyPr/>
-          <a:lstStyle/>
-          <a:p>
-            <a:r>
-              <a:rPr lang="en-US"/>
-              <a:t>CS499 Team Hotspotter</a:t>
-            </a:r>
-          </a:p>
-        </p:txBody>
-      </p:sp>
-      <p:sp>
-        <p:nvSpPr>
-          <p:cNvPr id="7" name="Slide Number Placeholder 6"/>
-          <p:cNvSpPr>
-            <a:spLocks noGrp="1"/>
-          </p:cNvSpPr>
-          <p:nvPr>
-            <p:ph type="sldNum" sz="quarter" idx="12"/>
-          </p:nvPr>
-        </p:nvSpPr>
-        <p:spPr/>
-        <p:txBody>
-          <a:bodyPr/>
-          <a:lstStyle/>
-          <a:p>
-            <a:fld id="{E5FD5434-F838-4DD4-A17B-1CB1A1850DF4}" type="slidenum">
-              <a:rPr lang="en-US" smtClean="0"/>
-              <a:pPr/>
-              <a:t>9</a:t>
-            </a:fld>
-            <a:endParaRPr lang="en-US"/>
+            <a:pPr algn="ctr"/>
+            <a:r>
+              <a:rPr lang="en-US" sz="1600" dirty="0" smtClean="0"/>
+              <a:t>Spencer Smith</a:t>
+            </a:r>
+            <a:endParaRPr lang="en-US" sz="1600" dirty="0"/>
           </a:p>
         </p:txBody>
       </p:sp>
@@ -10144,13 +10109,602 @@
       </p:transition>
     </mc:Fallback>
   </mc:AlternateContent>
+  <p:timing>
+    <p:tnLst>
+      <p:par>
+        <p:cTn id="1" dur="indefinite" restart="never" nodeType="tmRoot"/>
+      </p:par>
+    </p:tnLst>
+  </p:timing>
+</p:sld>
+</file>
+
+<file path=ppt/slides/slide8.xml><?xml version="1.0" encoding="utf-8"?>
+<p:sld xmlns:a="http://schemas.openxmlformats.org/drawingml/2006/main" xmlns:r="http://schemas.openxmlformats.org/officeDocument/2006/relationships" xmlns:p="http://schemas.openxmlformats.org/presentationml/2006/main">
+  <p:cSld>
+    <p:spTree>
+      <p:nvGrpSpPr>
+        <p:cNvPr id="1" name=""/>
+        <p:cNvGrpSpPr/>
+        <p:nvPr/>
+      </p:nvGrpSpPr>
+      <p:grpSpPr>
+        <a:xfrm>
+          <a:off x="0" y="0"/>
+          <a:ext cx="0" cy="0"/>
+          <a:chOff x="0" y="0"/>
+          <a:chExt cx="0" cy="0"/>
+        </a:xfrm>
+      </p:grpSpPr>
+      <p:sp>
+        <p:nvSpPr>
+          <p:cNvPr id="2" name="Title 1"/>
+          <p:cNvSpPr>
+            <a:spLocks noGrp="1"/>
+          </p:cNvSpPr>
+          <p:nvPr>
+            <p:ph type="title"/>
+          </p:nvPr>
+        </p:nvSpPr>
+        <p:spPr/>
+        <p:txBody>
+          <a:bodyPr/>
+          <a:lstStyle/>
+          <a:p>
+            <a:pPr algn="ctr"/>
+            <a:r>
+              <a:rPr lang="en-US" dirty="0" smtClean="0"/>
+              <a:t>Project Management</a:t>
+            </a:r>
+            <a:endParaRPr lang="en-US" dirty="0"/>
+          </a:p>
+        </p:txBody>
+      </p:sp>
+      <p:sp>
+        <p:nvSpPr>
+          <p:cNvPr id="3" name="Content Placeholder 2"/>
+          <p:cNvSpPr>
+            <a:spLocks noGrp="1"/>
+          </p:cNvSpPr>
+          <p:nvPr>
+            <p:ph idx="1"/>
+          </p:nvPr>
+        </p:nvSpPr>
+        <p:spPr/>
+        <p:txBody>
+          <a:bodyPr>
+            <a:normAutofit/>
+          </a:bodyPr>
+          <a:lstStyle/>
+          <a:p>
+            <a:r>
+              <a:rPr lang="en-US" dirty="0" smtClean="0"/>
+              <a:t>Defined GIT practices</a:t>
+            </a:r>
+          </a:p>
+          <a:p>
+            <a:pPr lvl="2"/>
+            <a:r>
+              <a:rPr lang="en-US" dirty="0" smtClean="0"/>
+              <a:t>Collaboration and responsibility</a:t>
+            </a:r>
+          </a:p>
+          <a:p>
+            <a:r>
+              <a:rPr lang="en-US" dirty="0" smtClean="0"/>
+              <a:t>Jira</a:t>
+            </a:r>
+          </a:p>
+          <a:p>
+            <a:pPr lvl="1"/>
+            <a:r>
+              <a:rPr lang="en-US" dirty="0" smtClean="0"/>
+              <a:t>Agile Planning</a:t>
+            </a:r>
+          </a:p>
+          <a:p>
+            <a:r>
+              <a:rPr lang="en-US" dirty="0" smtClean="0"/>
+              <a:t>Jenkins</a:t>
+            </a:r>
+          </a:p>
+          <a:p>
+            <a:pPr lvl="1"/>
+            <a:r>
+              <a:rPr lang="en-US" dirty="0" smtClean="0"/>
+              <a:t>Automated quality/tests</a:t>
+            </a:r>
+          </a:p>
+          <a:p>
+            <a:pPr lvl="1"/>
+            <a:r>
+              <a:rPr lang="en-US" dirty="0" smtClean="0"/>
+              <a:t>Automated deployment</a:t>
+            </a:r>
+          </a:p>
+        </p:txBody>
+      </p:sp>
+      <p:sp>
+        <p:nvSpPr>
+          <p:cNvPr id="4" name="Date Placeholder 3"/>
+          <p:cNvSpPr>
+            <a:spLocks noGrp="1"/>
+          </p:cNvSpPr>
+          <p:nvPr>
+            <p:ph type="dt" sz="half" idx="10"/>
+          </p:nvPr>
+        </p:nvSpPr>
+        <p:spPr/>
+        <p:txBody>
+          <a:bodyPr/>
+          <a:lstStyle/>
+          <a:p>
+            <a:r>
+              <a:rPr lang="en-US" sz="1600" dirty="0"/>
+              <a:t>04/15/2016</a:t>
+            </a:r>
+          </a:p>
+        </p:txBody>
+      </p:sp>
+      <p:sp>
+        <p:nvSpPr>
+          <p:cNvPr id="5" name="Footer Placeholder 4"/>
+          <p:cNvSpPr>
+            <a:spLocks noGrp="1"/>
+          </p:cNvSpPr>
+          <p:nvPr>
+            <p:ph type="ftr" sz="quarter" idx="11"/>
+          </p:nvPr>
+        </p:nvSpPr>
+        <p:spPr/>
+        <p:txBody>
+          <a:bodyPr/>
+          <a:lstStyle/>
+          <a:p>
+            <a:r>
+              <a:rPr lang="en-US" sz="1600" dirty="0"/>
+              <a:t>CS499 Team Hotspotter</a:t>
+            </a:r>
+          </a:p>
+        </p:txBody>
+      </p:sp>
+      <p:sp>
+        <p:nvSpPr>
+          <p:cNvPr id="6" name="Slide Number Placeholder 5"/>
+          <p:cNvSpPr>
+            <a:spLocks noGrp="1"/>
+          </p:cNvSpPr>
+          <p:nvPr>
+            <p:ph type="sldNum" sz="quarter" idx="12"/>
+          </p:nvPr>
+        </p:nvSpPr>
+        <p:spPr/>
+        <p:txBody>
+          <a:bodyPr/>
+          <a:lstStyle/>
+          <a:p>
+            <a:fld id="{E5FD5434-F838-4DD4-A17B-1CB1A1850DF4}" type="slidenum">
+              <a:rPr lang="en-US" sz="1600" smtClean="0"/>
+              <a:t>8</a:t>
+            </a:fld>
+            <a:endParaRPr lang="en-US" sz="1600" dirty="0"/>
+          </a:p>
+        </p:txBody>
+      </p:sp>
+      <p:pic>
+        <p:nvPicPr>
+          <p:cNvPr id="9" name="Picture 8"/>
+          <p:cNvPicPr>
+            <a:picLocks noChangeAspect="1"/>
+          </p:cNvPicPr>
+          <p:nvPr/>
+        </p:nvPicPr>
+        <p:blipFill>
+          <a:blip r:embed="rId2">
+            <a:extLst>
+              <a:ext uri="{28A0092B-C50C-407E-A947-70E740481C1C}">
+                <a14:useLocalDpi xmlns:a14="http://schemas.microsoft.com/office/drawing/2010/main" val="0"/>
+              </a:ext>
+            </a:extLst>
+          </a:blip>
+          <a:stretch>
+            <a:fillRect/>
+          </a:stretch>
+        </p:blipFill>
+        <p:spPr>
+          <a:xfrm>
+            <a:off x="8058974" y="3637522"/>
+            <a:ext cx="2461877" cy="1157082"/>
+          </a:xfrm>
+          <a:prstGeom prst="rect">
+            <a:avLst/>
+          </a:prstGeom>
+        </p:spPr>
+      </p:pic>
+      <p:pic>
+        <p:nvPicPr>
+          <p:cNvPr id="10" name="Picture 9"/>
+          <p:cNvPicPr>
+            <a:picLocks noChangeAspect="1"/>
+          </p:cNvPicPr>
+          <p:nvPr/>
+        </p:nvPicPr>
+        <p:blipFill>
+          <a:blip r:embed="rId3">
+            <a:extLst>
+              <a:ext uri="{28A0092B-C50C-407E-A947-70E740481C1C}">
+                <a14:useLocalDpi xmlns:a14="http://schemas.microsoft.com/office/drawing/2010/main" val="0"/>
+              </a:ext>
+            </a:extLst>
+          </a:blip>
+          <a:stretch>
+            <a:fillRect/>
+          </a:stretch>
+        </p:blipFill>
+        <p:spPr>
+          <a:xfrm>
+            <a:off x="7847012" y="5162934"/>
+            <a:ext cx="3028950" cy="971550"/>
+          </a:xfrm>
+          <a:prstGeom prst="rect">
+            <a:avLst/>
+          </a:prstGeom>
+        </p:spPr>
+      </p:pic>
+      <p:pic>
+        <p:nvPicPr>
+          <p:cNvPr id="14" name="Picture 13"/>
+          <p:cNvPicPr>
+            <a:picLocks noChangeAspect="1"/>
+          </p:cNvPicPr>
+          <p:nvPr/>
+        </p:nvPicPr>
+        <p:blipFill>
+          <a:blip r:embed="rId4" cstate="print">
+            <a:extLst>
+              <a:ext uri="{28A0092B-C50C-407E-A947-70E740481C1C}">
+                <a14:useLocalDpi xmlns:a14="http://schemas.microsoft.com/office/drawing/2010/main" val="0"/>
+              </a:ext>
+            </a:extLst>
+          </a:blip>
+          <a:stretch>
+            <a:fillRect/>
+          </a:stretch>
+        </p:blipFill>
+        <p:spPr>
+          <a:xfrm>
+            <a:off x="8690449" y="2070266"/>
+            <a:ext cx="1198926" cy="1198926"/>
+          </a:xfrm>
+          <a:prstGeom prst="rect">
+            <a:avLst/>
+          </a:prstGeom>
+        </p:spPr>
+      </p:pic>
+      <p:sp>
+        <p:nvSpPr>
+          <p:cNvPr id="11" name="TextBox 10"/>
+          <p:cNvSpPr txBox="1"/>
+          <p:nvPr/>
+        </p:nvSpPr>
+        <p:spPr>
+          <a:xfrm>
+            <a:off x="4646611" y="6478459"/>
+            <a:ext cx="2895600" cy="338554"/>
+          </a:xfrm>
+          <a:prstGeom prst="rect">
+            <a:avLst/>
+          </a:prstGeom>
+          <a:noFill/>
+        </p:spPr>
+        <p:txBody>
+          <a:bodyPr wrap="square" rtlCol="0">
+            <a:spAutoFit/>
+          </a:bodyPr>
+          <a:lstStyle/>
+          <a:p>
+            <a:pPr algn="ctr"/>
+            <a:r>
+              <a:rPr lang="en-US" sz="1600" dirty="0" smtClean="0"/>
+              <a:t>Nathan Reinhardt</a:t>
+            </a:r>
+            <a:endParaRPr lang="en-US" sz="1600" dirty="0"/>
+          </a:p>
+        </p:txBody>
+      </p:sp>
+    </p:spTree>
+    <p:extLst>
+      <p:ext uri="{BB962C8B-B14F-4D97-AF65-F5344CB8AC3E}">
+        <p14:creationId xmlns:p14="http://schemas.microsoft.com/office/powerpoint/2010/main" val="2806046062"/>
+      </p:ext>
+    </p:extLst>
+  </p:cSld>
+  <p:clrMapOvr>
+    <a:masterClrMapping/>
+  </p:clrMapOvr>
+  <mc:AlternateContent xmlns:mc="http://schemas.openxmlformats.org/markup-compatibility/2006" xmlns:p14="http://schemas.microsoft.com/office/powerpoint/2010/main">
+    <mc:Choice Requires="p14">
+      <p:transition spd="med" p14:dur="700">
+        <p:fade/>
+      </p:transition>
+    </mc:Choice>
+    <mc:Fallback xmlns="">
+      <p:transition spd="med">
+        <p:fade/>
+      </p:transition>
+    </mc:Fallback>
+  </mc:AlternateContent>
+  <p:timing>
+    <p:tnLst>
+      <p:par>
+        <p:cTn id="1" dur="indefinite" restart="never" nodeType="tmRoot"/>
+      </p:par>
+    </p:tnLst>
+  </p:timing>
+</p:sld>
+</file>
+
+<file path=ppt/slides/slide9.xml><?xml version="1.0" encoding="utf-8"?>
+<p:sld xmlns:a="http://schemas.openxmlformats.org/drawingml/2006/main" xmlns:r="http://schemas.openxmlformats.org/officeDocument/2006/relationships" xmlns:p="http://schemas.openxmlformats.org/presentationml/2006/main">
+  <p:cSld>
+    <p:spTree>
+      <p:nvGrpSpPr>
+        <p:cNvPr id="1" name=""/>
+        <p:cNvGrpSpPr/>
+        <p:nvPr/>
+      </p:nvGrpSpPr>
+      <p:grpSpPr>
+        <a:xfrm>
+          <a:off x="0" y="0"/>
+          <a:ext cx="0" cy="0"/>
+          <a:chOff x="0" y="0"/>
+          <a:chExt cx="0" cy="0"/>
+        </a:xfrm>
+      </p:grpSpPr>
+      <p:sp>
+        <p:nvSpPr>
+          <p:cNvPr id="2" name="Title 1"/>
+          <p:cNvSpPr>
+            <a:spLocks noGrp="1"/>
+          </p:cNvSpPr>
+          <p:nvPr>
+            <p:ph type="title"/>
+          </p:nvPr>
+        </p:nvSpPr>
+        <p:spPr/>
+        <p:txBody>
+          <a:bodyPr/>
+          <a:lstStyle/>
+          <a:p>
+            <a:pPr algn="ctr"/>
+            <a:r>
+              <a:rPr lang="en-US" dirty="0" smtClean="0"/>
+              <a:t>Project </a:t>
+            </a:r>
+            <a:r>
+              <a:rPr lang="en-US" dirty="0" smtClean="0"/>
+              <a:t>Management </a:t>
+            </a:r>
+            <a:r>
+              <a:rPr lang="en-US" sz="2000" i="1" dirty="0" smtClean="0"/>
+              <a:t>(Cont.)</a:t>
+            </a:r>
+            <a:endParaRPr lang="en-US" sz="2000" i="1" dirty="0"/>
+          </a:p>
+        </p:txBody>
+      </p:sp>
+      <p:sp>
+        <p:nvSpPr>
+          <p:cNvPr id="4" name="Date Placeholder 3"/>
+          <p:cNvSpPr>
+            <a:spLocks noGrp="1"/>
+          </p:cNvSpPr>
+          <p:nvPr>
+            <p:ph type="dt" sz="half" idx="10"/>
+          </p:nvPr>
+        </p:nvSpPr>
+        <p:spPr/>
+        <p:txBody>
+          <a:bodyPr/>
+          <a:lstStyle/>
+          <a:p>
+            <a:r>
+              <a:rPr lang="en-US" sz="1600" dirty="0"/>
+              <a:t>04/15/2016</a:t>
+            </a:r>
+          </a:p>
+        </p:txBody>
+      </p:sp>
+      <p:sp>
+        <p:nvSpPr>
+          <p:cNvPr id="5" name="Footer Placeholder 4"/>
+          <p:cNvSpPr>
+            <a:spLocks noGrp="1"/>
+          </p:cNvSpPr>
+          <p:nvPr>
+            <p:ph type="ftr" sz="quarter" idx="11"/>
+          </p:nvPr>
+        </p:nvSpPr>
+        <p:spPr/>
+        <p:txBody>
+          <a:bodyPr/>
+          <a:lstStyle/>
+          <a:p>
+            <a:r>
+              <a:rPr lang="en-US" sz="1600" dirty="0"/>
+              <a:t>CS499 Team Hotspotter</a:t>
+            </a:r>
+          </a:p>
+        </p:txBody>
+      </p:sp>
+      <p:sp>
+        <p:nvSpPr>
+          <p:cNvPr id="6" name="Slide Number Placeholder 5"/>
+          <p:cNvSpPr>
+            <a:spLocks noGrp="1"/>
+          </p:cNvSpPr>
+          <p:nvPr>
+            <p:ph type="sldNum" sz="quarter" idx="12"/>
+          </p:nvPr>
+        </p:nvSpPr>
+        <p:spPr/>
+        <p:txBody>
+          <a:bodyPr/>
+          <a:lstStyle/>
+          <a:p>
+            <a:fld id="{E5FD5434-F838-4DD4-A17B-1CB1A1850DF4}" type="slidenum">
+              <a:rPr lang="en-US" sz="1600" smtClean="0"/>
+              <a:t>9</a:t>
+            </a:fld>
+            <a:endParaRPr lang="en-US" sz="1600" dirty="0"/>
+          </a:p>
+        </p:txBody>
+      </p:sp>
+      <p:pic>
+        <p:nvPicPr>
+          <p:cNvPr id="7" name="Picture 6"/>
+          <p:cNvPicPr>
+            <a:picLocks noChangeAspect="1"/>
+          </p:cNvPicPr>
+          <p:nvPr/>
+        </p:nvPicPr>
+        <p:blipFill>
+          <a:blip r:embed="rId2"/>
+          <a:stretch>
+            <a:fillRect/>
+          </a:stretch>
+        </p:blipFill>
+        <p:spPr>
+          <a:xfrm>
+            <a:off x="2985644" y="4047633"/>
+            <a:ext cx="5322223" cy="2557784"/>
+          </a:xfrm>
+          <a:prstGeom prst="rect">
+            <a:avLst/>
+          </a:prstGeom>
+        </p:spPr>
+      </p:pic>
+      <p:pic>
+        <p:nvPicPr>
+          <p:cNvPr id="3" name="Picture 2"/>
+          <p:cNvPicPr>
+            <a:picLocks noChangeAspect="1"/>
+          </p:cNvPicPr>
+          <p:nvPr/>
+        </p:nvPicPr>
+        <p:blipFill>
+          <a:blip r:embed="rId3"/>
+          <a:stretch>
+            <a:fillRect/>
+          </a:stretch>
+        </p:blipFill>
+        <p:spPr>
+          <a:xfrm>
+            <a:off x="6780212" y="1774167"/>
+            <a:ext cx="5313491" cy="2546906"/>
+          </a:xfrm>
+          <a:prstGeom prst="rect">
+            <a:avLst/>
+          </a:prstGeom>
+        </p:spPr>
+      </p:pic>
+      <p:pic>
+        <p:nvPicPr>
+          <p:cNvPr id="8" name="Picture 7"/>
+          <p:cNvPicPr>
+            <a:picLocks noChangeAspect="1"/>
+          </p:cNvPicPr>
+          <p:nvPr/>
+        </p:nvPicPr>
+        <p:blipFill>
+          <a:blip r:embed="rId4" cstate="print">
+            <a:extLst>
+              <a:ext uri="{28A0092B-C50C-407E-A947-70E740481C1C}">
+                <a14:useLocalDpi xmlns:a14="http://schemas.microsoft.com/office/drawing/2010/main" val="0"/>
+              </a:ext>
+            </a:extLst>
+          </a:blip>
+          <a:stretch>
+            <a:fillRect/>
+          </a:stretch>
+        </p:blipFill>
+        <p:spPr>
+          <a:xfrm>
+            <a:off x="9877" y="1828801"/>
+            <a:ext cx="4789136" cy="2349726"/>
+          </a:xfrm>
+          <a:prstGeom prst="rect">
+            <a:avLst/>
+          </a:prstGeom>
+        </p:spPr>
+      </p:pic>
+      <p:sp>
+        <p:nvSpPr>
+          <p:cNvPr id="9" name="TextBox 8"/>
+          <p:cNvSpPr txBox="1"/>
+          <p:nvPr/>
+        </p:nvSpPr>
+        <p:spPr>
+          <a:xfrm>
+            <a:off x="4647184" y="6569741"/>
+            <a:ext cx="2895600" cy="338554"/>
+          </a:xfrm>
+          <a:prstGeom prst="rect">
+            <a:avLst/>
+          </a:prstGeom>
+          <a:noFill/>
+        </p:spPr>
+        <p:txBody>
+          <a:bodyPr wrap="square" rtlCol="0">
+            <a:spAutoFit/>
+          </a:bodyPr>
+          <a:lstStyle/>
+          <a:p>
+            <a:pPr algn="ctr"/>
+            <a:r>
+              <a:rPr lang="en-US" sz="1600" dirty="0" smtClean="0"/>
+              <a:t>Nathan Reinhardt</a:t>
+            </a:r>
+            <a:endParaRPr lang="en-US" sz="1600" dirty="0"/>
+          </a:p>
+        </p:txBody>
+      </p:sp>
+    </p:spTree>
+    <p:extLst>
+      <p:ext uri="{BB962C8B-B14F-4D97-AF65-F5344CB8AC3E}">
+        <p14:creationId xmlns:p14="http://schemas.microsoft.com/office/powerpoint/2010/main" val="3747307126"/>
+      </p:ext>
+    </p:extLst>
+  </p:cSld>
+  <p:clrMapOvr>
+    <a:masterClrMapping/>
+  </p:clrMapOvr>
+  <mc:AlternateContent xmlns:mc="http://schemas.openxmlformats.org/markup-compatibility/2006" xmlns:p14="http://schemas.microsoft.com/office/powerpoint/2010/main">
+    <mc:Choice Requires="p14">
+      <p:transition spd="med" p14:dur="700">
+        <p:fade/>
+      </p:transition>
+    </mc:Choice>
+    <mc:Fallback xmlns="">
+      <p:transition spd="med">
+        <p:fade/>
+      </p:transition>
+    </mc:Fallback>
+  </mc:AlternateContent>
+  <p:timing>
+    <p:tnLst>
+      <p:par>
+        <p:cTn id="1" dur="indefinite" restart="never" nodeType="tmRoot"/>
+      </p:par>
+    </p:tnLst>
+  </p:timing>
 </p:sld>
 </file>
 
 <file path=ppt/theme/theme1.xml><?xml version="1.0" encoding="utf-8"?>
 <a:theme xmlns:a="http://schemas.openxmlformats.org/drawingml/2006/main" name="Banded">
   <a:themeElements>
-    <a:clrScheme name="Aspect">
+    <a:clrScheme name="Custom 1">
       <a:dk1>
         <a:sysClr val="windowText" lastClr="000000"/>
       </a:dk1>
@@ -10158,7 +10712,7 @@
         <a:sysClr val="window" lastClr="FFFFFF"/>
       </a:lt1>
       <a:dk2>
-        <a:srgbClr val="323232"/>
+        <a:srgbClr val="000000"/>
       </a:dk2>
       <a:lt2>
         <a:srgbClr val="E3DED1"/>

</xml_diff>

<commit_message>
Added time and checked graph
</commit_message>
<xml_diff>
--- a/Documentation/Presentations/CS499 Final Presentation.pptx
+++ b/Documentation/Presentations/CS499 Final Presentation.pptx
@@ -211,7 +211,7 @@
 </file>
 
 <file path=ppt/charts/chart1.xml><?xml version="1.0" encoding="utf-8"?>
-<c:chartSpace xmlns:c="http://schemas.openxmlformats.org/drawingml/2006/chart" xmlns:a="http://schemas.openxmlformats.org/drawingml/2006/main" xmlns:r="http://schemas.openxmlformats.org/officeDocument/2006/relationships" xmlns:c16r2="http://schemas.microsoft.com/office/drawing/2015/06/chart">
+<c:chartSpace xmlns:c="http://schemas.openxmlformats.org/drawingml/2006/chart" xmlns:a="http://schemas.openxmlformats.org/drawingml/2006/main" xmlns:r="http://schemas.openxmlformats.org/officeDocument/2006/relationships">
   <c:date1904 val="0"/>
   <c:lang val="en-US"/>
   <c:roundedCorners val="0"/>
@@ -395,15 +395,15 @@
                   <c:v>0</c:v>
                 </c:pt>
                 <c:pt idx="21">
-                  <c:v>0</c:v>
+                  <c:v>5</c:v>
                 </c:pt>
                 <c:pt idx="22">
-                  <c:v>0</c:v>
+                  <c:v>9</c:v>
                 </c:pt>
               </c:numCache>
             </c:numRef>
           </c:val>
-          <c:extLst>
+          <c:extLst xmlns:c16r2="http://schemas.microsoft.com/office/drawing/2015/06/chart">
             <c:ext xmlns:c16="http://schemas.microsoft.com/office/drawing/2014/chart" uri="{C3380CC4-5D6E-409C-BE32-E72D297353CC}">
               <c16:uniqueId val="{00000000-C998-45E2-B113-3A76F2ADAB4D}"/>
             </c:ext>
@@ -581,15 +581,15 @@
                   <c:v>18</c:v>
                 </c:pt>
                 <c:pt idx="21">
-                  <c:v>0</c:v>
+                  <c:v>10</c:v>
                 </c:pt>
                 <c:pt idx="22">
-                  <c:v>0</c:v>
+                  <c:v>7</c:v>
                 </c:pt>
               </c:numCache>
             </c:numRef>
           </c:val>
-          <c:extLst>
+          <c:extLst xmlns:c16r2="http://schemas.microsoft.com/office/drawing/2015/06/chart">
             <c:ext xmlns:c16="http://schemas.microsoft.com/office/drawing/2014/chart" uri="{C3380CC4-5D6E-409C-BE32-E72D297353CC}">
               <c16:uniqueId val="{00000001-C998-45E2-B113-3A76F2ADAB4D}"/>
             </c:ext>
@@ -605,8 +605,8 @@
         </c:dLbls>
         <c:gapWidth val="150"/>
         <c:overlap val="100"/>
-        <c:axId val="864288720"/>
-        <c:axId val="864289808"/>
+        <c:axId val="941421408"/>
+        <c:axId val="941421952"/>
       </c:barChart>
       <c:lineChart>
         <c:grouping val="standard"/>
@@ -708,16 +708,16 @@
                   <c:v>16.958571428571428</c:v>
                 </c:pt>
                 <c:pt idx="21">
-                  <c:v>16.187727272727273</c:v>
+                  <c:v>16.869545454545456</c:v>
                 </c:pt>
                 <c:pt idx="22">
-                  <c:v>15.48391304347826</c:v>
+                  <c:v>16.831739130434784</c:v>
                 </c:pt>
               </c:numCache>
             </c:numRef>
           </c:val>
           <c:smooth val="0"/>
-          <c:extLst>
+          <c:extLst xmlns:c16r2="http://schemas.microsoft.com/office/drawing/2015/06/chart">
             <c:ext xmlns:c16="http://schemas.microsoft.com/office/drawing/2014/chart" uri="{C3380CC4-5D6E-409C-BE32-E72D297353CC}">
               <c16:uniqueId val="{00000002-C998-45E2-B113-3A76F2ADAB4D}"/>
             </c:ext>
@@ -733,11 +733,11 @@
         </c:dLbls>
         <c:marker val="1"/>
         <c:smooth val="0"/>
-        <c:axId val="864288720"/>
-        <c:axId val="864289808"/>
+        <c:axId val="941421408"/>
+        <c:axId val="941421952"/>
       </c:lineChart>
       <c:catAx>
-        <c:axId val="864288720"/>
+        <c:axId val="941421408"/>
         <c:scaling>
           <c:orientation val="minMax"/>
         </c:scaling>
@@ -836,7 +836,7 @@
             <a:endParaRPr lang="en-US"/>
           </a:p>
         </c:txPr>
-        <c:crossAx val="864289808"/>
+        <c:crossAx val="941421952"/>
         <c:crosses val="autoZero"/>
         <c:auto val="0"/>
         <c:lblAlgn val="ctr"/>
@@ -844,7 +844,7 @@
         <c:noMultiLvlLbl val="0"/>
       </c:catAx>
       <c:valAx>
-        <c:axId val="864289808"/>
+        <c:axId val="941421952"/>
         <c:scaling>
           <c:orientation val="minMax"/>
         </c:scaling>
@@ -955,7 +955,7 @@
             <a:endParaRPr lang="en-US"/>
           </a:p>
         </c:txPr>
-        <c:crossAx val="864288720"/>
+        <c:crossAx val="941421408"/>
         <c:crosses val="autoZero"/>
         <c:crossBetween val="between"/>
       </c:valAx>
@@ -1027,7 +1027,7 @@
 </file>
 
 <file path=ppt/charts/chart2.xml><?xml version="1.0" encoding="utf-8"?>
-<c:chartSpace xmlns:c="http://schemas.openxmlformats.org/drawingml/2006/chart" xmlns:a="http://schemas.openxmlformats.org/drawingml/2006/main" xmlns:r="http://schemas.openxmlformats.org/officeDocument/2006/relationships" xmlns:c16r2="http://schemas.microsoft.com/office/drawing/2015/06/chart">
+<c:chartSpace xmlns:c="http://schemas.openxmlformats.org/drawingml/2006/chart" xmlns:a="http://schemas.openxmlformats.org/drawingml/2006/main" xmlns:r="http://schemas.openxmlformats.org/officeDocument/2006/relationships">
   <c:date1904 val="0"/>
   <c:lang val="en-US"/>
   <c:roundedCorners val="0"/>
@@ -1174,7 +1174,7 @@
             <c:showPercent val="0"/>
             <c:showBubbleSize val="0"/>
             <c:showLeaderLines val="0"/>
-            <c:extLst>
+            <c:extLst xmlns:c16r2="http://schemas.microsoft.com/office/drawing/2015/06/chart">
               <c:ext xmlns:c15="http://schemas.microsoft.com/office/drawing/2012/chart" uri="{CE6537A1-D6FC-4f65-9D91-7224C49458BB}">
                 <c15:layout/>
                 <c15:showLeaderLines val="1"/>
@@ -1274,7 +1274,7 @@
             </c:numRef>
           </c:val>
           <c:smooth val="0"/>
-          <c:extLst>
+          <c:extLst xmlns:c16r2="http://schemas.microsoft.com/office/drawing/2015/06/chart">
             <c:ext xmlns:c16="http://schemas.microsoft.com/office/drawing/2014/chart" uri="{C3380CC4-5D6E-409C-BE32-E72D297353CC}">
               <c16:uniqueId val="{00000000-7036-49FB-A3F7-6BDC1515C86F}"/>
             </c:ext>
@@ -1308,48 +1308,6 @@
             <c:symbol val="none"/>
           </c:marker>
           <c:dLbls>
-            <c:dLbl>
-              <c:idx val="5"/>
-              <c:spPr>
-                <a:noFill/>
-                <a:ln>
-                  <a:noFill/>
-                </a:ln>
-                <a:effectLst/>
-              </c:spPr>
-              <c:txPr>
-                <a:bodyPr rot="0" spcFirstLastPara="1" vertOverflow="ellipsis" vert="horz" wrap="square" anchor="ctr" anchorCtr="1"/>
-                <a:lstStyle/>
-                <a:p>
-                  <a:pPr>
-                    <a:defRPr sz="900" b="0" i="0" u="none" strike="noStrike" kern="1200" baseline="0">
-                      <a:ln w="3175">
-                        <a:noFill/>
-                      </a:ln>
-                      <a:solidFill>
-                        <a:schemeClr val="tx1"/>
-                      </a:solidFill>
-                      <a:latin typeface="+mn-lt"/>
-                      <a:ea typeface="+mn-ea"/>
-                      <a:cs typeface="+mn-cs"/>
-                    </a:defRPr>
-                  </a:pPr>
-                  <a:endParaRPr lang="en-US"/>
-                </a:p>
-              </c:txPr>
-              <c:dLblPos val="t"/>
-              <c:showLegendKey val="0"/>
-              <c:showVal val="1"/>
-              <c:showCatName val="0"/>
-              <c:showSerName val="0"/>
-              <c:showPercent val="0"/>
-              <c:showBubbleSize val="0"/>
-              <c:extLst>
-                <c:ext xmlns:c16="http://schemas.microsoft.com/office/drawing/2014/chart" uri="{C3380CC4-5D6E-409C-BE32-E72D297353CC}">
-                  <c16:uniqueId val="{00000000-2500-4A8D-B785-4468F25DBC69}"/>
-                </c:ext>
-              </c:extLst>
-            </c:dLbl>
             <c:spPr>
               <a:noFill/>
               <a:ln>
@@ -1385,7 +1343,7 @@
             <c:showPercent val="0"/>
             <c:showBubbleSize val="0"/>
             <c:showLeaderLines val="0"/>
-            <c:extLst>
+            <c:extLst xmlns:c16r2="http://schemas.microsoft.com/office/drawing/2015/06/chart">
               <c:ext xmlns:c15="http://schemas.microsoft.com/office/drawing/2012/chart" uri="{CE6537A1-D6FC-4f65-9D91-7224C49458BB}">
                 <c15:layout/>
                 <c15:showLeaderLines val="1"/>
@@ -1485,7 +1443,7 @@
             </c:numRef>
           </c:val>
           <c:smooth val="0"/>
-          <c:extLst>
+          <c:extLst xmlns:c16r2="http://schemas.microsoft.com/office/drawing/2015/06/chart">
             <c:ext xmlns:c16="http://schemas.microsoft.com/office/drawing/2014/chart" uri="{C3380CC4-5D6E-409C-BE32-E72D297353CC}">
               <c16:uniqueId val="{00000001-7036-49FB-A3F7-6BDC1515C86F}"/>
             </c:ext>
@@ -1501,11 +1459,11 @@
           <c:showBubbleSize val="0"/>
         </c:dLbls>
         <c:smooth val="0"/>
-        <c:axId val="864293616"/>
-        <c:axId val="764927824"/>
+        <c:axId val="838099200"/>
+        <c:axId val="1002964224"/>
       </c:lineChart>
       <c:catAx>
-        <c:axId val="864293616"/>
+        <c:axId val="838099200"/>
         <c:scaling>
           <c:orientation val="minMax"/>
         </c:scaling>
@@ -1625,7 +1583,7 @@
             <a:endParaRPr lang="en-US"/>
           </a:p>
         </c:txPr>
-        <c:crossAx val="764927824"/>
+        <c:crossAx val="1002964224"/>
         <c:crosses val="autoZero"/>
         <c:auto val="1"/>
         <c:lblAlgn val="ctr"/>
@@ -1634,7 +1592,7 @@
         <c:noMultiLvlLbl val="0"/>
       </c:catAx>
       <c:valAx>
-        <c:axId val="764927824"/>
+        <c:axId val="1002964224"/>
         <c:scaling>
           <c:orientation val="minMax"/>
         </c:scaling>
@@ -1754,7 +1712,7 @@
             <a:endParaRPr lang="en-US"/>
           </a:p>
         </c:txPr>
-        <c:crossAx val="864293616"/>
+        <c:crossAx val="838099200"/>
         <c:crosses val="autoZero"/>
         <c:crossBetween val="midCat"/>
       </c:valAx>
@@ -3035,7 +2993,7 @@
           <a:p>
             <a:fld id="{4954C6E1-AF92-4FB7-A013-0B520EBC30AE}" type="datetimeFigureOut">
               <a:rPr lang="en-US"/>
-              <a:t>04/12/2016</a:t>
+              <a:t>04/14/2016</a:t>
             </a:fld>
             <a:endParaRPr/>
           </a:p>
@@ -3201,7 +3159,7 @@
           <a:p>
             <a:fld id="{95C10850-0874-4A61-99B4-D613C5E8D9EA}" type="datetimeFigureOut">
               <a:rPr lang="en-US"/>
-              <a:t>04/12/2016</a:t>
+              <a:t>04/14/2016</a:t>
             </a:fld>
             <a:endParaRPr/>
           </a:p>
@@ -7642,7 +7600,7 @@
             <p:ph idx="1"/>
             <p:extLst>
               <p:ext uri="{D42A27DB-BD31-4B8C-83A1-F6EECF244321}">
-                <p14:modId xmlns:p14="http://schemas.microsoft.com/office/powerpoint/2010/main" val="3661578689"/>
+                <p14:modId xmlns:p14="http://schemas.microsoft.com/office/powerpoint/2010/main" val="4279899388"/>
               </p:ext>
             </p:extLst>
           </p:nvPr>
@@ -10479,11 +10437,7 @@
             <a:pPr algn="ctr"/>
             <a:r>
               <a:rPr lang="en-US" dirty="0" smtClean="0"/>
-              <a:t>Project </a:t>
-            </a:r>
-            <a:r>
-              <a:rPr lang="en-US" dirty="0" smtClean="0"/>
-              <a:t>Management </a:t>
+              <a:t>Project Management </a:t>
             </a:r>
             <a:r>
               <a:rPr lang="en-US" sz="2000" i="1" dirty="0" smtClean="0"/>

</xml_diff>